<commit_message>
new figure for tree-rotation
</commit_message>
<xml_diff>
--- a/datastruct/tree/red-black-tree/img/rbtree.pptx
+++ b/datastruct/tree/red-black-tree/img/rbtree.pptx
@@ -5,11 +5,12 @@
     <p:sldMasterId id="2147483648" r:id="rId1"/>
   </p:sldMasterIdLst>
   <p:notesMasterIdLst>
-    <p:notesMasterId r:id="rId4"/>
+    <p:notesMasterId r:id="rId5"/>
   </p:notesMasterIdLst>
   <p:sldIdLst>
-    <p:sldId id="256" r:id="rId2"/>
-    <p:sldId id="257" r:id="rId3"/>
+    <p:sldId id="258" r:id="rId2"/>
+    <p:sldId id="256" r:id="rId3"/>
+    <p:sldId id="257" r:id="rId4"/>
   </p:sldIdLst>
   <p:sldSz cx="12192000" cy="6858000"/>
   <p:notesSz cx="6858000" cy="9144000"/>
@@ -505,47 +506,11 @@
           <a:bodyPr/>
           <a:lstStyle/>
           <a:p>
-            <a:pPr marL="0" marR="0" lvl="0" indent="0" algn="l" defTabSz="914400" rtl="0" eaLnBrk="1" fontAlgn="auto" latinLnBrk="0" hangingPunct="1">
-              <a:lnSpc>
-                <a:spcPct val="100000"/>
-              </a:lnSpc>
-              <a:spcBef>
-                <a:spcPts val="0"/>
-              </a:spcBef>
-              <a:spcAft>
-                <a:spcPts val="0"/>
-              </a:spcAft>
-              <a:buClrTx/>
-              <a:buSzTx/>
-              <a:buFontTx/>
-              <a:buNone/>
-              <a:tabLst/>
-              <a:defRPr/>
-            </a:pPr>
             <a:r>
               <a:rPr lang="en-US" dirty="0"/>
-              <a:t>D</a:t>
+              <a:t>Tree rotation</a:t>
             </a:r>
-            <a:r>
-              <a:rPr lang="en-CN" dirty="0"/>
-              <a:t>elete case 1: </a:t>
-            </a:r>
-            <a:r>
-              <a:rPr lang="en-US" sz="1200" kern="1200" dirty="0">
-                <a:solidFill>
-                  <a:schemeClr val="tx1"/>
-                </a:solidFill>
-                <a:effectLst/>
-                <a:latin typeface="+mn-lt"/>
-                <a:ea typeface="+mn-ea"/>
-                <a:cs typeface="+mn-cs"/>
-              </a:rPr>
-              <a:t>The sibling of the doubly-black node is black, and it has a red sub-tree. </a:t>
-            </a:r>
-            <a:r>
-              <a:rPr lang="en-CN" dirty="0"/>
-              <a:t>There are 4 sub-cases.</a:t>
-            </a:r>
+            <a:endParaRPr lang="en-CN" dirty="0"/>
           </a:p>
         </p:txBody>
       </p:sp>
@@ -575,7 +540,7 @@
     </p:spTree>
     <p:extLst>
       <p:ext uri="{BB962C8B-B14F-4D97-AF65-F5344CB8AC3E}">
-        <p14:creationId xmlns:p14="http://schemas.microsoft.com/office/powerpoint/2010/main" val="1857193540"/>
+        <p14:creationId xmlns:p14="http://schemas.microsoft.com/office/powerpoint/2010/main" val="3791963242"/>
       </p:ext>
     </p:extLst>
   </p:cSld>
@@ -629,15 +594,47 @@
           <a:bodyPr/>
           <a:lstStyle/>
           <a:p>
+            <a:pPr marL="0" marR="0" lvl="0" indent="0" algn="l" defTabSz="914400" rtl="0" eaLnBrk="1" fontAlgn="auto" latinLnBrk="0" hangingPunct="1">
+              <a:lnSpc>
+                <a:spcPct val="100000"/>
+              </a:lnSpc>
+              <a:spcBef>
+                <a:spcPts val="0"/>
+              </a:spcBef>
+              <a:spcAft>
+                <a:spcPts val="0"/>
+              </a:spcAft>
+              <a:buClrTx/>
+              <a:buSzTx/>
+              <a:buFontTx/>
+              <a:buNone/>
+              <a:tabLst/>
+              <a:defRPr/>
+            </a:pPr>
+            <a:r>
+              <a:rPr lang="en-US" dirty="0"/>
+              <a:t>D</a:t>
+            </a:r>
             <a:r>
               <a:rPr lang="en-CN" dirty="0"/>
-              <a:t>Delete case 2: </a:t>
+              <a:t>elete case 1: </a:t>
             </a:r>
             <a:r>
-              <a:rPr lang="en-US" dirty="0"/>
-              <a:t>The sibling of the doubly-black is red. 2 sub-cases</a:t>
+              <a:rPr lang="en-US" sz="1200" kern="1200" dirty="0">
+                <a:solidFill>
+                  <a:schemeClr val="tx1"/>
+                </a:solidFill>
+                <a:effectLst/>
+                <a:latin typeface="+mn-lt"/>
+                <a:ea typeface="+mn-ea"/>
+                <a:cs typeface="+mn-cs"/>
+              </a:rPr>
+              <a:t>The sibling of the doubly-black node is black, and it has a red sub-tree. </a:t>
             </a:r>
-            <a:endParaRPr lang="en-CN" dirty="0"/>
+            <a:r>
+              <a:rPr lang="en-CN" dirty="0"/>
+              <a:t>There are 4 sub-cases.</a:t>
+            </a:r>
           </a:p>
         </p:txBody>
       </p:sp>
@@ -659,6 +656,98 @@
             <a:fld id="{5A7F411E-DD35-8744-9F99-82262987EC7F}" type="slidenum">
               <a:rPr lang="en-CN" smtClean="0"/>
               <a:t>2</a:t>
+            </a:fld>
+            <a:endParaRPr lang="en-CN"/>
+          </a:p>
+        </p:txBody>
+      </p:sp>
+    </p:spTree>
+    <p:extLst>
+      <p:ext uri="{BB962C8B-B14F-4D97-AF65-F5344CB8AC3E}">
+        <p14:creationId xmlns:p14="http://schemas.microsoft.com/office/powerpoint/2010/main" val="1857193540"/>
+      </p:ext>
+    </p:extLst>
+  </p:cSld>
+  <p:clrMapOvr>
+    <a:masterClrMapping/>
+  </p:clrMapOvr>
+</p:notes>
+</file>
+
+<file path=ppt/notesSlides/notesSlide3.xml><?xml version="1.0" encoding="utf-8"?>
+<p:notes xmlns:a="http://schemas.openxmlformats.org/drawingml/2006/main" xmlns:r="http://schemas.openxmlformats.org/officeDocument/2006/relationships" xmlns:p="http://schemas.openxmlformats.org/presentationml/2006/main">
+  <p:cSld>
+    <p:spTree>
+      <p:nvGrpSpPr>
+        <p:cNvPr id="1" name=""/>
+        <p:cNvGrpSpPr/>
+        <p:nvPr/>
+      </p:nvGrpSpPr>
+      <p:grpSpPr>
+        <a:xfrm>
+          <a:off x="0" y="0"/>
+          <a:ext cx="0" cy="0"/>
+          <a:chOff x="0" y="0"/>
+          <a:chExt cx="0" cy="0"/>
+        </a:xfrm>
+      </p:grpSpPr>
+      <p:sp>
+        <p:nvSpPr>
+          <p:cNvPr id="2" name="Slide Image Placeholder 1"/>
+          <p:cNvSpPr>
+            <a:spLocks noGrp="1" noRot="1" noChangeAspect="1"/>
+          </p:cNvSpPr>
+          <p:nvPr>
+            <p:ph type="sldImg"/>
+          </p:nvPr>
+        </p:nvSpPr>
+        <p:spPr/>
+      </p:sp>
+      <p:sp>
+        <p:nvSpPr>
+          <p:cNvPr id="3" name="Notes Placeholder 2"/>
+          <p:cNvSpPr>
+            <a:spLocks noGrp="1"/>
+          </p:cNvSpPr>
+          <p:nvPr>
+            <p:ph type="body" idx="1"/>
+          </p:nvPr>
+        </p:nvSpPr>
+        <p:spPr/>
+        <p:txBody>
+          <a:bodyPr/>
+          <a:lstStyle/>
+          <a:p>
+            <a:r>
+              <a:rPr lang="en-CN" dirty="0"/>
+              <a:t>Delete case 2: </a:t>
+            </a:r>
+            <a:r>
+              <a:rPr lang="en-US" dirty="0"/>
+              <a:t>The sibling of the doubly-black is red. 2 sub-cases</a:t>
+            </a:r>
+            <a:endParaRPr lang="en-CN" dirty="0"/>
+          </a:p>
+        </p:txBody>
+      </p:sp>
+      <p:sp>
+        <p:nvSpPr>
+          <p:cNvPr id="4" name="Slide Number Placeholder 3"/>
+          <p:cNvSpPr>
+            <a:spLocks noGrp="1"/>
+          </p:cNvSpPr>
+          <p:nvPr>
+            <p:ph type="sldNum" sz="quarter" idx="5"/>
+          </p:nvPr>
+        </p:nvSpPr>
+        <p:spPr/>
+        <p:txBody>
+          <a:bodyPr/>
+          <a:lstStyle/>
+          <a:p>
+            <a:fld id="{5A7F411E-DD35-8744-9F99-82262987EC7F}" type="slidenum">
+              <a:rPr lang="en-CN" smtClean="0"/>
+              <a:t>3</a:t>
             </a:fld>
             <a:endParaRPr lang="en-CN"/>
           </a:p>
@@ -3912,6 +4001,940 @@
           <a:chExt cx="0" cy="0"/>
         </a:xfrm>
       </p:grpSpPr>
+      <p:cxnSp>
+        <p:nvCxnSpPr>
+          <p:cNvPr id="67" name="Straight Arrow Connector 66">
+            <a:extLst>
+              <a:ext uri="{FF2B5EF4-FFF2-40B4-BE49-F238E27FC236}">
+                <a16:creationId xmlns:a16="http://schemas.microsoft.com/office/drawing/2014/main" id="{17FF87D7-DF6D-9B40-B439-ED233F74E7E5}"/>
+              </a:ext>
+            </a:extLst>
+          </p:cNvPr>
+          <p:cNvCxnSpPr>
+            <a:cxnSpLocks/>
+          </p:cNvCxnSpPr>
+          <p:nvPr/>
+        </p:nvCxnSpPr>
+        <p:spPr>
+          <a:xfrm>
+            <a:off x="5362807" y="3327521"/>
+            <a:ext cx="733193" cy="0"/>
+          </a:xfrm>
+          <a:prstGeom prst="straightConnector1">
+            <a:avLst/>
+          </a:prstGeom>
+          <a:ln>
+            <a:headEnd type="triangle" w="med" len="med"/>
+            <a:tailEnd type="triangle" w="med" len="med"/>
+          </a:ln>
+        </p:spPr>
+        <p:style>
+          <a:lnRef idx="3">
+            <a:schemeClr val="dk1"/>
+          </a:lnRef>
+          <a:fillRef idx="0">
+            <a:schemeClr val="dk1"/>
+          </a:fillRef>
+          <a:effectRef idx="2">
+            <a:schemeClr val="dk1"/>
+          </a:effectRef>
+          <a:fontRef idx="minor">
+            <a:schemeClr val="tx1"/>
+          </a:fontRef>
+        </p:style>
+      </p:cxnSp>
+      <p:grpSp>
+        <p:nvGrpSpPr>
+          <p:cNvPr id="114" name="Group 113">
+            <a:extLst>
+              <a:ext uri="{FF2B5EF4-FFF2-40B4-BE49-F238E27FC236}">
+                <a16:creationId xmlns:a16="http://schemas.microsoft.com/office/drawing/2014/main" id="{270797AA-7932-6C43-A535-BF4317DB933A}"/>
+              </a:ext>
+            </a:extLst>
+          </p:cNvPr>
+          <p:cNvGrpSpPr/>
+          <p:nvPr/>
+        </p:nvGrpSpPr>
+        <p:grpSpPr>
+          <a:xfrm>
+            <a:off x="6558464" y="2313395"/>
+            <a:ext cx="2322838" cy="2028252"/>
+            <a:chOff x="5462818" y="578514"/>
+            <a:chExt cx="2322838" cy="2028252"/>
+          </a:xfrm>
+        </p:grpSpPr>
+        <p:sp>
+          <p:nvSpPr>
+            <p:cNvPr id="115" name="Oval 114">
+              <a:extLst>
+                <a:ext uri="{FF2B5EF4-FFF2-40B4-BE49-F238E27FC236}">
+                  <a16:creationId xmlns:a16="http://schemas.microsoft.com/office/drawing/2014/main" id="{85D9A3A3-3F74-A341-B4A9-A7A9F23C527D}"/>
+                </a:ext>
+              </a:extLst>
+            </p:cNvPr>
+            <p:cNvSpPr/>
+            <p:nvPr/>
+          </p:nvSpPr>
+          <p:spPr>
+            <a:xfrm>
+              <a:off x="6511466" y="578514"/>
+              <a:ext cx="531629" cy="542261"/>
+            </a:xfrm>
+            <a:prstGeom prst="ellipse">
+              <a:avLst/>
+            </a:prstGeom>
+          </p:spPr>
+          <p:style>
+            <a:lnRef idx="2">
+              <a:schemeClr val="dk1"/>
+            </a:lnRef>
+            <a:fillRef idx="1">
+              <a:schemeClr val="lt1"/>
+            </a:fillRef>
+            <a:effectRef idx="0">
+              <a:schemeClr val="dk1"/>
+            </a:effectRef>
+            <a:fontRef idx="minor">
+              <a:schemeClr val="dk1"/>
+            </a:fontRef>
+          </p:style>
+          <p:txBody>
+            <a:bodyPr lIns="36000" tIns="36000" rIns="36000" bIns="36000" rtlCol="0" anchor="ctr" anchorCtr="1"/>
+            <a:lstStyle/>
+            <a:p>
+              <a:pPr algn="ctr"/>
+              <a:r>
+                <a:rPr lang="en-CN" i="1" dirty="0">
+                  <a:latin typeface="Times New Roman" panose="02020603050405020304" pitchFamily="18" charset="0"/>
+                  <a:cs typeface="Times New Roman" panose="02020603050405020304" pitchFamily="18" charset="0"/>
+                </a:rPr>
+                <a:t>y</a:t>
+              </a:r>
+            </a:p>
+          </p:txBody>
+        </p:sp>
+        <p:sp>
+          <p:nvSpPr>
+            <p:cNvPr id="129" name="Oval 128">
+              <a:extLst>
+                <a:ext uri="{FF2B5EF4-FFF2-40B4-BE49-F238E27FC236}">
+                  <a16:creationId xmlns:a16="http://schemas.microsoft.com/office/drawing/2014/main" id="{150B8AFC-45F1-2645-BFDC-8EE037EF0F4F}"/>
+                </a:ext>
+              </a:extLst>
+            </p:cNvPr>
+            <p:cNvSpPr/>
+            <p:nvPr/>
+          </p:nvSpPr>
+          <p:spPr>
+            <a:xfrm>
+              <a:off x="5462818" y="2046472"/>
+              <a:ext cx="531629" cy="542261"/>
+            </a:xfrm>
+            <a:prstGeom prst="ellipse">
+              <a:avLst/>
+            </a:prstGeom>
+          </p:spPr>
+          <p:style>
+            <a:lnRef idx="2">
+              <a:schemeClr val="dk1"/>
+            </a:lnRef>
+            <a:fillRef idx="1">
+              <a:schemeClr val="lt1"/>
+            </a:fillRef>
+            <a:effectRef idx="0">
+              <a:schemeClr val="dk1"/>
+            </a:effectRef>
+            <a:fontRef idx="minor">
+              <a:schemeClr val="dk1"/>
+            </a:fontRef>
+          </p:style>
+          <p:txBody>
+            <a:bodyPr lIns="36000" tIns="36000" rIns="36000" bIns="36000" rtlCol="0" anchor="ctr" anchorCtr="1"/>
+            <a:lstStyle/>
+            <a:p>
+              <a:pPr algn="ctr"/>
+              <a:r>
+                <a:rPr lang="en-CN" i="1" dirty="0">
+                  <a:latin typeface="Times New Roman" panose="02020603050405020304" pitchFamily="18" charset="0"/>
+                  <a:cs typeface="Times New Roman" panose="02020603050405020304" pitchFamily="18" charset="0"/>
+                </a:rPr>
+                <a:t>a</a:t>
+              </a:r>
+            </a:p>
+          </p:txBody>
+        </p:sp>
+        <p:cxnSp>
+          <p:nvCxnSpPr>
+            <p:cNvPr id="130" name="Straight Connector 129">
+              <a:extLst>
+                <a:ext uri="{FF2B5EF4-FFF2-40B4-BE49-F238E27FC236}">
+                  <a16:creationId xmlns:a16="http://schemas.microsoft.com/office/drawing/2014/main" id="{37EDA364-B325-3546-85F5-D221317F7499}"/>
+                </a:ext>
+              </a:extLst>
+            </p:cNvPr>
+            <p:cNvCxnSpPr>
+              <a:cxnSpLocks/>
+              <a:stCxn id="115" idx="3"/>
+              <a:endCxn id="134" idx="7"/>
+            </p:cNvCxnSpPr>
+            <p:nvPr/>
+          </p:nvCxnSpPr>
+          <p:spPr>
+            <a:xfrm flipH="1">
+              <a:off x="6351416" y="1041363"/>
+              <a:ext cx="237905" cy="326839"/>
+            </a:xfrm>
+            <a:prstGeom prst="line">
+              <a:avLst/>
+            </a:prstGeom>
+          </p:spPr>
+          <p:style>
+            <a:lnRef idx="2">
+              <a:schemeClr val="dk1"/>
+            </a:lnRef>
+            <a:fillRef idx="1">
+              <a:schemeClr val="lt1"/>
+            </a:fillRef>
+            <a:effectRef idx="0">
+              <a:schemeClr val="dk1"/>
+            </a:effectRef>
+            <a:fontRef idx="minor">
+              <a:schemeClr val="dk1"/>
+            </a:fontRef>
+          </p:style>
+        </p:cxnSp>
+        <p:cxnSp>
+          <p:nvCxnSpPr>
+            <p:cNvPr id="131" name="Straight Connector 130">
+              <a:extLst>
+                <a:ext uri="{FF2B5EF4-FFF2-40B4-BE49-F238E27FC236}">
+                  <a16:creationId xmlns:a16="http://schemas.microsoft.com/office/drawing/2014/main" id="{51725920-D2C1-2C49-B67C-99F0162643D7}"/>
+                </a:ext>
+              </a:extLst>
+            </p:cNvPr>
+            <p:cNvCxnSpPr>
+              <a:cxnSpLocks/>
+              <a:stCxn id="129" idx="0"/>
+              <a:endCxn id="134" idx="3"/>
+            </p:cNvCxnSpPr>
+            <p:nvPr/>
+          </p:nvCxnSpPr>
+          <p:spPr>
+            <a:xfrm flipV="1">
+              <a:off x="5728633" y="1751639"/>
+              <a:ext cx="246864" cy="294833"/>
+            </a:xfrm>
+            <a:prstGeom prst="line">
+              <a:avLst/>
+            </a:prstGeom>
+          </p:spPr>
+          <p:style>
+            <a:lnRef idx="2">
+              <a:schemeClr val="dk1"/>
+            </a:lnRef>
+            <a:fillRef idx="1">
+              <a:schemeClr val="lt1"/>
+            </a:fillRef>
+            <a:effectRef idx="0">
+              <a:schemeClr val="dk1"/>
+            </a:effectRef>
+            <a:fontRef idx="minor">
+              <a:schemeClr val="dk1"/>
+            </a:fontRef>
+          </p:style>
+        </p:cxnSp>
+        <p:cxnSp>
+          <p:nvCxnSpPr>
+            <p:cNvPr id="132" name="Straight Connector 131">
+              <a:extLst>
+                <a:ext uri="{FF2B5EF4-FFF2-40B4-BE49-F238E27FC236}">
+                  <a16:creationId xmlns:a16="http://schemas.microsoft.com/office/drawing/2014/main" id="{6BBEF1E5-FFB4-4441-8691-986427E6EE2D}"/>
+                </a:ext>
+              </a:extLst>
+            </p:cNvPr>
+            <p:cNvCxnSpPr>
+              <a:cxnSpLocks/>
+              <a:stCxn id="115" idx="5"/>
+              <a:endCxn id="136" idx="1"/>
+            </p:cNvCxnSpPr>
+            <p:nvPr/>
+          </p:nvCxnSpPr>
+          <p:spPr>
+            <a:xfrm>
+              <a:off x="6965240" y="1041363"/>
+              <a:ext cx="366642" cy="326839"/>
+            </a:xfrm>
+            <a:prstGeom prst="line">
+              <a:avLst/>
+            </a:prstGeom>
+          </p:spPr>
+          <p:style>
+            <a:lnRef idx="2">
+              <a:schemeClr val="dk1"/>
+            </a:lnRef>
+            <a:fillRef idx="1">
+              <a:schemeClr val="lt1"/>
+            </a:fillRef>
+            <a:effectRef idx="0">
+              <a:schemeClr val="dk1"/>
+            </a:effectRef>
+            <a:fontRef idx="minor">
+              <a:schemeClr val="dk1"/>
+            </a:fontRef>
+          </p:style>
+        </p:cxnSp>
+        <p:cxnSp>
+          <p:nvCxnSpPr>
+            <p:cNvPr id="133" name="Straight Connector 132">
+              <a:extLst>
+                <a:ext uri="{FF2B5EF4-FFF2-40B4-BE49-F238E27FC236}">
+                  <a16:creationId xmlns:a16="http://schemas.microsoft.com/office/drawing/2014/main" id="{231E0CDB-6DAA-3D40-9C58-DD797CAEAC98}"/>
+                </a:ext>
+              </a:extLst>
+            </p:cNvPr>
+            <p:cNvCxnSpPr>
+              <a:cxnSpLocks/>
+              <a:stCxn id="135" idx="0"/>
+              <a:endCxn id="134" idx="5"/>
+            </p:cNvCxnSpPr>
+            <p:nvPr/>
+          </p:nvCxnSpPr>
+          <p:spPr>
+            <a:xfrm flipH="1" flipV="1">
+              <a:off x="6351416" y="1751639"/>
+              <a:ext cx="237905" cy="312866"/>
+            </a:xfrm>
+            <a:prstGeom prst="line">
+              <a:avLst/>
+            </a:prstGeom>
+          </p:spPr>
+          <p:style>
+            <a:lnRef idx="2">
+              <a:schemeClr val="dk1"/>
+            </a:lnRef>
+            <a:fillRef idx="1">
+              <a:schemeClr val="lt1"/>
+            </a:fillRef>
+            <a:effectRef idx="0">
+              <a:schemeClr val="dk1"/>
+            </a:effectRef>
+            <a:fontRef idx="minor">
+              <a:schemeClr val="dk1"/>
+            </a:fontRef>
+          </p:style>
+        </p:cxnSp>
+        <p:sp>
+          <p:nvSpPr>
+            <p:cNvPr id="134" name="Oval 133">
+              <a:extLst>
+                <a:ext uri="{FF2B5EF4-FFF2-40B4-BE49-F238E27FC236}">
+                  <a16:creationId xmlns:a16="http://schemas.microsoft.com/office/drawing/2014/main" id="{132D9A3C-16D5-6B40-9CB8-5E4A41378589}"/>
+                </a:ext>
+              </a:extLst>
+            </p:cNvPr>
+            <p:cNvSpPr/>
+            <p:nvPr/>
+          </p:nvSpPr>
+          <p:spPr>
+            <a:xfrm>
+              <a:off x="5897642" y="1288790"/>
+              <a:ext cx="531629" cy="542261"/>
+            </a:xfrm>
+            <a:prstGeom prst="ellipse">
+              <a:avLst/>
+            </a:prstGeom>
+          </p:spPr>
+          <p:style>
+            <a:lnRef idx="2">
+              <a:schemeClr val="dk1"/>
+            </a:lnRef>
+            <a:fillRef idx="1">
+              <a:schemeClr val="lt1"/>
+            </a:fillRef>
+            <a:effectRef idx="0">
+              <a:schemeClr val="dk1"/>
+            </a:effectRef>
+            <a:fontRef idx="minor">
+              <a:schemeClr val="dk1"/>
+            </a:fontRef>
+          </p:style>
+          <p:txBody>
+            <a:bodyPr lIns="36000" tIns="36000" rIns="36000" bIns="36000" rtlCol="0" anchor="ctr" anchorCtr="1"/>
+            <a:lstStyle/>
+            <a:p>
+              <a:pPr algn="ctr"/>
+              <a:r>
+                <a:rPr lang="en-CN" i="1" dirty="0">
+                  <a:latin typeface="Times New Roman" panose="02020603050405020304" pitchFamily="18" charset="0"/>
+                  <a:cs typeface="Times New Roman" panose="02020603050405020304" pitchFamily="18" charset="0"/>
+                </a:rPr>
+                <a:t>x</a:t>
+              </a:r>
+            </a:p>
+          </p:txBody>
+        </p:sp>
+        <p:sp>
+          <p:nvSpPr>
+            <p:cNvPr id="135" name="Oval 134">
+              <a:extLst>
+                <a:ext uri="{FF2B5EF4-FFF2-40B4-BE49-F238E27FC236}">
+                  <a16:creationId xmlns:a16="http://schemas.microsoft.com/office/drawing/2014/main" id="{A02954FB-1F99-6841-ADF3-879E06717502}"/>
+                </a:ext>
+              </a:extLst>
+            </p:cNvPr>
+            <p:cNvSpPr/>
+            <p:nvPr/>
+          </p:nvSpPr>
+          <p:spPr>
+            <a:xfrm>
+              <a:off x="6323506" y="2064505"/>
+              <a:ext cx="531629" cy="542261"/>
+            </a:xfrm>
+            <a:prstGeom prst="ellipse">
+              <a:avLst/>
+            </a:prstGeom>
+          </p:spPr>
+          <p:style>
+            <a:lnRef idx="2">
+              <a:schemeClr val="dk1"/>
+            </a:lnRef>
+            <a:fillRef idx="1">
+              <a:schemeClr val="lt1"/>
+            </a:fillRef>
+            <a:effectRef idx="0">
+              <a:schemeClr val="dk1"/>
+            </a:effectRef>
+            <a:fontRef idx="minor">
+              <a:schemeClr val="dk1"/>
+            </a:fontRef>
+          </p:style>
+          <p:txBody>
+            <a:bodyPr lIns="36000" tIns="36000" rIns="36000" bIns="36000" rtlCol="0" anchor="ctr" anchorCtr="1"/>
+            <a:lstStyle/>
+            <a:p>
+              <a:pPr algn="ctr"/>
+              <a:r>
+                <a:rPr lang="en-CN" i="1" dirty="0">
+                  <a:latin typeface="Times New Roman" panose="02020603050405020304" pitchFamily="18" charset="0"/>
+                  <a:cs typeface="Times New Roman" panose="02020603050405020304" pitchFamily="18" charset="0"/>
+                </a:rPr>
+                <a:t>b</a:t>
+              </a:r>
+            </a:p>
+          </p:txBody>
+        </p:sp>
+        <p:sp>
+          <p:nvSpPr>
+            <p:cNvPr id="136" name="Oval 135">
+              <a:extLst>
+                <a:ext uri="{FF2B5EF4-FFF2-40B4-BE49-F238E27FC236}">
+                  <a16:creationId xmlns:a16="http://schemas.microsoft.com/office/drawing/2014/main" id="{CD2C77E9-68B0-524F-AEFE-9FF974CA9DDB}"/>
+                </a:ext>
+              </a:extLst>
+            </p:cNvPr>
+            <p:cNvSpPr/>
+            <p:nvPr/>
+          </p:nvSpPr>
+          <p:spPr>
+            <a:xfrm>
+              <a:off x="7254027" y="1288790"/>
+              <a:ext cx="531629" cy="542261"/>
+            </a:xfrm>
+            <a:prstGeom prst="ellipse">
+              <a:avLst/>
+            </a:prstGeom>
+          </p:spPr>
+          <p:style>
+            <a:lnRef idx="2">
+              <a:schemeClr val="dk1"/>
+            </a:lnRef>
+            <a:fillRef idx="1">
+              <a:schemeClr val="lt1"/>
+            </a:fillRef>
+            <a:effectRef idx="0">
+              <a:schemeClr val="dk1"/>
+            </a:effectRef>
+            <a:fontRef idx="minor">
+              <a:schemeClr val="dk1"/>
+            </a:fontRef>
+          </p:style>
+          <p:txBody>
+            <a:bodyPr lIns="36000" tIns="36000" rIns="36000" bIns="36000" rtlCol="0" anchor="ctr" anchorCtr="1"/>
+            <a:lstStyle/>
+            <a:p>
+              <a:pPr algn="ctr"/>
+              <a:r>
+                <a:rPr lang="en-CN" i="1" dirty="0">
+                  <a:latin typeface="Times New Roman" panose="02020603050405020304" pitchFamily="18" charset="0"/>
+                  <a:cs typeface="Times New Roman" panose="02020603050405020304" pitchFamily="18" charset="0"/>
+                </a:rPr>
+                <a:t>c</a:t>
+              </a:r>
+            </a:p>
+          </p:txBody>
+        </p:sp>
+      </p:grpSp>
+      <p:grpSp>
+        <p:nvGrpSpPr>
+          <p:cNvPr id="45" name="Group 44">
+            <a:extLst>
+              <a:ext uri="{FF2B5EF4-FFF2-40B4-BE49-F238E27FC236}">
+                <a16:creationId xmlns:a16="http://schemas.microsoft.com/office/drawing/2014/main" id="{DB1B2119-EB67-3B49-B58F-D27B35C34BD1}"/>
+              </a:ext>
+            </a:extLst>
+          </p:cNvPr>
+          <p:cNvGrpSpPr/>
+          <p:nvPr/>
+        </p:nvGrpSpPr>
+        <p:grpSpPr>
+          <a:xfrm>
+            <a:off x="2493923" y="2254728"/>
+            <a:ext cx="2409224" cy="2086919"/>
+            <a:chOff x="926422" y="578514"/>
+            <a:chExt cx="2409224" cy="2086919"/>
+          </a:xfrm>
+        </p:grpSpPr>
+        <p:sp>
+          <p:nvSpPr>
+            <p:cNvPr id="46" name="Oval 45">
+              <a:extLst>
+                <a:ext uri="{FF2B5EF4-FFF2-40B4-BE49-F238E27FC236}">
+                  <a16:creationId xmlns:a16="http://schemas.microsoft.com/office/drawing/2014/main" id="{EC0017B1-58F2-6D4E-B5B1-ACBEC8D79CFC}"/>
+                </a:ext>
+              </a:extLst>
+            </p:cNvPr>
+            <p:cNvSpPr/>
+            <p:nvPr/>
+          </p:nvSpPr>
+          <p:spPr>
+            <a:xfrm>
+              <a:off x="1665363" y="578514"/>
+              <a:ext cx="531629" cy="542261"/>
+            </a:xfrm>
+            <a:prstGeom prst="ellipse">
+              <a:avLst/>
+            </a:prstGeom>
+          </p:spPr>
+          <p:style>
+            <a:lnRef idx="2">
+              <a:schemeClr val="dk1"/>
+            </a:lnRef>
+            <a:fillRef idx="1">
+              <a:schemeClr val="lt1"/>
+            </a:fillRef>
+            <a:effectRef idx="0">
+              <a:schemeClr val="dk1"/>
+            </a:effectRef>
+            <a:fontRef idx="minor">
+              <a:schemeClr val="dk1"/>
+            </a:fontRef>
+          </p:style>
+          <p:txBody>
+            <a:bodyPr lIns="36000" tIns="36000" rIns="36000" bIns="36000" rtlCol="0" anchor="ctr" anchorCtr="1"/>
+            <a:lstStyle/>
+            <a:p>
+              <a:pPr algn="ctr"/>
+              <a:r>
+                <a:rPr lang="en-CN" i="1" dirty="0">
+                  <a:latin typeface="Times New Roman" panose="02020603050405020304" pitchFamily="18" charset="0"/>
+                  <a:cs typeface="Times New Roman" panose="02020603050405020304" pitchFamily="18" charset="0"/>
+                </a:rPr>
+                <a:t>x</a:t>
+              </a:r>
+            </a:p>
+          </p:txBody>
+        </p:sp>
+        <p:sp>
+          <p:nvSpPr>
+            <p:cNvPr id="47" name="Oval 46">
+              <a:extLst>
+                <a:ext uri="{FF2B5EF4-FFF2-40B4-BE49-F238E27FC236}">
+                  <a16:creationId xmlns:a16="http://schemas.microsoft.com/office/drawing/2014/main" id="{6FD0400C-139D-2E44-91CF-9B152962F658}"/>
+                </a:ext>
+              </a:extLst>
+            </p:cNvPr>
+            <p:cNvSpPr/>
+            <p:nvPr/>
+          </p:nvSpPr>
+          <p:spPr>
+            <a:xfrm>
+              <a:off x="926422" y="1263449"/>
+              <a:ext cx="531629" cy="542261"/>
+            </a:xfrm>
+            <a:prstGeom prst="ellipse">
+              <a:avLst/>
+            </a:prstGeom>
+          </p:spPr>
+          <p:style>
+            <a:lnRef idx="2">
+              <a:schemeClr val="dk1"/>
+            </a:lnRef>
+            <a:fillRef idx="1">
+              <a:schemeClr val="lt1"/>
+            </a:fillRef>
+            <a:effectRef idx="0">
+              <a:schemeClr val="dk1"/>
+            </a:effectRef>
+            <a:fontRef idx="minor">
+              <a:schemeClr val="dk1"/>
+            </a:fontRef>
+          </p:style>
+          <p:txBody>
+            <a:bodyPr lIns="36000" tIns="36000" rIns="36000" bIns="36000" rtlCol="0" anchor="ctr" anchorCtr="1"/>
+            <a:lstStyle/>
+            <a:p>
+              <a:pPr algn="ctr"/>
+              <a:r>
+                <a:rPr lang="en-CN" i="1" dirty="0">
+                  <a:latin typeface="Times New Roman" panose="02020603050405020304" pitchFamily="18" charset="0"/>
+                  <a:cs typeface="Times New Roman" panose="02020603050405020304" pitchFamily="18" charset="0"/>
+                </a:rPr>
+                <a:t>a</a:t>
+              </a:r>
+            </a:p>
+          </p:txBody>
+        </p:sp>
+        <p:cxnSp>
+          <p:nvCxnSpPr>
+            <p:cNvPr id="48" name="Straight Connector 47">
+              <a:extLst>
+                <a:ext uri="{FF2B5EF4-FFF2-40B4-BE49-F238E27FC236}">
+                  <a16:creationId xmlns:a16="http://schemas.microsoft.com/office/drawing/2014/main" id="{8605CAA0-2A09-E741-B9FD-F6B3A7E0A2A3}"/>
+                </a:ext>
+              </a:extLst>
+            </p:cNvPr>
+            <p:cNvCxnSpPr>
+              <a:cxnSpLocks/>
+              <a:stCxn id="46" idx="3"/>
+              <a:endCxn id="47" idx="7"/>
+            </p:cNvCxnSpPr>
+            <p:nvPr/>
+          </p:nvCxnSpPr>
+          <p:spPr>
+            <a:xfrm flipH="1">
+              <a:off x="1380196" y="1041363"/>
+              <a:ext cx="363022" cy="301498"/>
+            </a:xfrm>
+            <a:prstGeom prst="line">
+              <a:avLst/>
+            </a:prstGeom>
+          </p:spPr>
+          <p:style>
+            <a:lnRef idx="2">
+              <a:schemeClr val="dk1"/>
+            </a:lnRef>
+            <a:fillRef idx="0">
+              <a:schemeClr val="dk1"/>
+            </a:fillRef>
+            <a:effectRef idx="1">
+              <a:schemeClr val="dk1"/>
+            </a:effectRef>
+            <a:fontRef idx="minor">
+              <a:schemeClr val="tx1"/>
+            </a:fontRef>
+          </p:style>
+        </p:cxnSp>
+        <p:cxnSp>
+          <p:nvCxnSpPr>
+            <p:cNvPr id="49" name="Straight Connector 48">
+              <a:extLst>
+                <a:ext uri="{FF2B5EF4-FFF2-40B4-BE49-F238E27FC236}">
+                  <a16:creationId xmlns:a16="http://schemas.microsoft.com/office/drawing/2014/main" id="{3225DE53-8478-7440-9878-25115CF64721}"/>
+                </a:ext>
+              </a:extLst>
+            </p:cNvPr>
+            <p:cNvCxnSpPr>
+              <a:cxnSpLocks/>
+              <a:stCxn id="55" idx="0"/>
+              <a:endCxn id="54" idx="3"/>
+            </p:cNvCxnSpPr>
+            <p:nvPr/>
+          </p:nvCxnSpPr>
+          <p:spPr>
+            <a:xfrm flipV="1">
+              <a:off x="2152699" y="1703980"/>
+              <a:ext cx="207963" cy="419192"/>
+            </a:xfrm>
+            <a:prstGeom prst="line">
+              <a:avLst/>
+            </a:prstGeom>
+          </p:spPr>
+          <p:style>
+            <a:lnRef idx="2">
+              <a:schemeClr val="dk1"/>
+            </a:lnRef>
+            <a:fillRef idx="0">
+              <a:schemeClr val="dk1"/>
+            </a:fillRef>
+            <a:effectRef idx="1">
+              <a:schemeClr val="dk1"/>
+            </a:effectRef>
+            <a:fontRef idx="minor">
+              <a:schemeClr val="tx1"/>
+            </a:fontRef>
+          </p:style>
+        </p:cxnSp>
+        <p:cxnSp>
+          <p:nvCxnSpPr>
+            <p:cNvPr id="50" name="Straight Connector 49">
+              <a:extLst>
+                <a:ext uri="{FF2B5EF4-FFF2-40B4-BE49-F238E27FC236}">
+                  <a16:creationId xmlns:a16="http://schemas.microsoft.com/office/drawing/2014/main" id="{FB07DE23-A505-6448-AB66-6A96BC91F970}"/>
+                </a:ext>
+              </a:extLst>
+            </p:cNvPr>
+            <p:cNvCxnSpPr>
+              <a:cxnSpLocks/>
+              <a:stCxn id="46" idx="5"/>
+              <a:endCxn id="54" idx="1"/>
+            </p:cNvCxnSpPr>
+            <p:nvPr/>
+          </p:nvCxnSpPr>
+          <p:spPr>
+            <a:xfrm>
+              <a:off x="2119137" y="1041363"/>
+              <a:ext cx="241525" cy="279180"/>
+            </a:xfrm>
+            <a:prstGeom prst="line">
+              <a:avLst/>
+            </a:prstGeom>
+          </p:spPr>
+          <p:style>
+            <a:lnRef idx="2">
+              <a:schemeClr val="dk1"/>
+            </a:lnRef>
+            <a:fillRef idx="0">
+              <a:schemeClr val="dk1"/>
+            </a:fillRef>
+            <a:effectRef idx="1">
+              <a:schemeClr val="dk1"/>
+            </a:effectRef>
+            <a:fontRef idx="minor">
+              <a:schemeClr val="tx1"/>
+            </a:fontRef>
+          </p:style>
+        </p:cxnSp>
+        <p:cxnSp>
+          <p:nvCxnSpPr>
+            <p:cNvPr id="51" name="Straight Connector 50">
+              <a:extLst>
+                <a:ext uri="{FF2B5EF4-FFF2-40B4-BE49-F238E27FC236}">
+                  <a16:creationId xmlns:a16="http://schemas.microsoft.com/office/drawing/2014/main" id="{FC9BA48D-034C-AA41-850F-A109346CCD07}"/>
+                </a:ext>
+              </a:extLst>
+            </p:cNvPr>
+            <p:cNvCxnSpPr>
+              <a:cxnSpLocks/>
+              <a:stCxn id="56" idx="0"/>
+              <a:endCxn id="54" idx="5"/>
+            </p:cNvCxnSpPr>
+            <p:nvPr/>
+          </p:nvCxnSpPr>
+          <p:spPr>
+            <a:xfrm flipH="1" flipV="1">
+              <a:off x="2736581" y="1703980"/>
+              <a:ext cx="333251" cy="419192"/>
+            </a:xfrm>
+            <a:prstGeom prst="line">
+              <a:avLst/>
+            </a:prstGeom>
+          </p:spPr>
+          <p:style>
+            <a:lnRef idx="2">
+              <a:schemeClr val="dk1"/>
+            </a:lnRef>
+            <a:fillRef idx="0">
+              <a:schemeClr val="dk1"/>
+            </a:fillRef>
+            <a:effectRef idx="1">
+              <a:schemeClr val="dk1"/>
+            </a:effectRef>
+            <a:fontRef idx="minor">
+              <a:schemeClr val="tx1"/>
+            </a:fontRef>
+          </p:style>
+        </p:cxnSp>
+        <p:sp>
+          <p:nvSpPr>
+            <p:cNvPr id="54" name="Oval 53">
+              <a:extLst>
+                <a:ext uri="{FF2B5EF4-FFF2-40B4-BE49-F238E27FC236}">
+                  <a16:creationId xmlns:a16="http://schemas.microsoft.com/office/drawing/2014/main" id="{CEC70DD7-00BB-4549-B4AF-4469D75BCC5B}"/>
+                </a:ext>
+              </a:extLst>
+            </p:cNvPr>
+            <p:cNvSpPr/>
+            <p:nvPr/>
+          </p:nvSpPr>
+          <p:spPr>
+            <a:xfrm>
+              <a:off x="2282807" y="1241131"/>
+              <a:ext cx="531629" cy="542261"/>
+            </a:xfrm>
+            <a:prstGeom prst="ellipse">
+              <a:avLst/>
+            </a:prstGeom>
+          </p:spPr>
+          <p:style>
+            <a:lnRef idx="2">
+              <a:schemeClr val="dk1"/>
+            </a:lnRef>
+            <a:fillRef idx="1">
+              <a:schemeClr val="lt1"/>
+            </a:fillRef>
+            <a:effectRef idx="0">
+              <a:schemeClr val="dk1"/>
+            </a:effectRef>
+            <a:fontRef idx="minor">
+              <a:schemeClr val="dk1"/>
+            </a:fontRef>
+          </p:style>
+          <p:txBody>
+            <a:bodyPr lIns="36000" tIns="36000" rIns="36000" bIns="36000" rtlCol="0" anchor="ctr" anchorCtr="1"/>
+            <a:lstStyle/>
+            <a:p>
+              <a:pPr algn="ctr"/>
+              <a:r>
+                <a:rPr lang="en-CN" i="1" dirty="0">
+                  <a:latin typeface="Times New Roman" panose="02020603050405020304" pitchFamily="18" charset="0"/>
+                  <a:cs typeface="Times New Roman" panose="02020603050405020304" pitchFamily="18" charset="0"/>
+                </a:rPr>
+                <a:t>y</a:t>
+              </a:r>
+            </a:p>
+          </p:txBody>
+        </p:sp>
+        <p:sp>
+          <p:nvSpPr>
+            <p:cNvPr id="55" name="Oval 54">
+              <a:extLst>
+                <a:ext uri="{FF2B5EF4-FFF2-40B4-BE49-F238E27FC236}">
+                  <a16:creationId xmlns:a16="http://schemas.microsoft.com/office/drawing/2014/main" id="{37E7DB1A-2769-C04F-8CD8-A048F0E8B8C2}"/>
+                </a:ext>
+              </a:extLst>
+            </p:cNvPr>
+            <p:cNvSpPr/>
+            <p:nvPr/>
+          </p:nvSpPr>
+          <p:spPr>
+            <a:xfrm>
+              <a:off x="1886884" y="2123172"/>
+              <a:ext cx="531629" cy="542261"/>
+            </a:xfrm>
+            <a:prstGeom prst="ellipse">
+              <a:avLst/>
+            </a:prstGeom>
+          </p:spPr>
+          <p:style>
+            <a:lnRef idx="2">
+              <a:schemeClr val="dk1"/>
+            </a:lnRef>
+            <a:fillRef idx="1">
+              <a:schemeClr val="lt1"/>
+            </a:fillRef>
+            <a:effectRef idx="0">
+              <a:schemeClr val="dk1"/>
+            </a:effectRef>
+            <a:fontRef idx="minor">
+              <a:schemeClr val="dk1"/>
+            </a:fontRef>
+          </p:style>
+          <p:txBody>
+            <a:bodyPr lIns="36000" tIns="36000" rIns="36000" bIns="36000" rtlCol="0" anchor="ctr" anchorCtr="1"/>
+            <a:lstStyle/>
+            <a:p>
+              <a:pPr algn="ctr"/>
+              <a:r>
+                <a:rPr lang="en-CN" i="1" dirty="0">
+                  <a:latin typeface="Times New Roman" panose="02020603050405020304" pitchFamily="18" charset="0"/>
+                  <a:cs typeface="Times New Roman" panose="02020603050405020304" pitchFamily="18" charset="0"/>
+                </a:rPr>
+                <a:t>b</a:t>
+              </a:r>
+            </a:p>
+          </p:txBody>
+        </p:sp>
+        <p:sp>
+          <p:nvSpPr>
+            <p:cNvPr id="56" name="Oval 55">
+              <a:extLst>
+                <a:ext uri="{FF2B5EF4-FFF2-40B4-BE49-F238E27FC236}">
+                  <a16:creationId xmlns:a16="http://schemas.microsoft.com/office/drawing/2014/main" id="{6544533A-D870-644D-9D0C-14638A4138A6}"/>
+                </a:ext>
+              </a:extLst>
+            </p:cNvPr>
+            <p:cNvSpPr/>
+            <p:nvPr/>
+          </p:nvSpPr>
+          <p:spPr>
+            <a:xfrm>
+              <a:off x="2804017" y="2123172"/>
+              <a:ext cx="531629" cy="542261"/>
+            </a:xfrm>
+            <a:prstGeom prst="ellipse">
+              <a:avLst/>
+            </a:prstGeom>
+          </p:spPr>
+          <p:style>
+            <a:lnRef idx="2">
+              <a:schemeClr val="dk1"/>
+            </a:lnRef>
+            <a:fillRef idx="1">
+              <a:schemeClr val="lt1"/>
+            </a:fillRef>
+            <a:effectRef idx="0">
+              <a:schemeClr val="dk1"/>
+            </a:effectRef>
+            <a:fontRef idx="minor">
+              <a:schemeClr val="dk1"/>
+            </a:fontRef>
+          </p:style>
+          <p:txBody>
+            <a:bodyPr lIns="36000" tIns="36000" rIns="36000" bIns="36000" rtlCol="0" anchor="ctr" anchorCtr="1"/>
+            <a:lstStyle/>
+            <a:p>
+              <a:pPr algn="ctr"/>
+              <a:r>
+                <a:rPr lang="en-CN" i="1" dirty="0">
+                  <a:latin typeface="Times New Roman" panose="02020603050405020304" pitchFamily="18" charset="0"/>
+                  <a:cs typeface="Times New Roman" panose="02020603050405020304" pitchFamily="18" charset="0"/>
+                </a:rPr>
+                <a:t>c</a:t>
+              </a:r>
+            </a:p>
+          </p:txBody>
+        </p:sp>
+      </p:grpSp>
+    </p:spTree>
+    <p:extLst>
+      <p:ext uri="{BB962C8B-B14F-4D97-AF65-F5344CB8AC3E}">
+        <p14:creationId xmlns:p14="http://schemas.microsoft.com/office/powerpoint/2010/main" val="4154081172"/>
+      </p:ext>
+    </p:extLst>
+  </p:cSld>
+  <p:clrMapOvr>
+    <a:masterClrMapping/>
+  </p:clrMapOvr>
+</p:sld>
+</file>
+
+<file path=ppt/slides/slide2.xml><?xml version="1.0" encoding="utf-8"?>
+<p:sld xmlns:a="http://schemas.openxmlformats.org/drawingml/2006/main" xmlns:r="http://schemas.openxmlformats.org/officeDocument/2006/relationships" xmlns:p="http://schemas.openxmlformats.org/presentationml/2006/main">
+  <p:cSld>
+    <p:spTree>
+      <p:nvGrpSpPr>
+        <p:cNvPr id="1" name=""/>
+        <p:cNvGrpSpPr/>
+        <p:nvPr/>
+      </p:nvGrpSpPr>
+      <p:grpSpPr>
+        <a:xfrm>
+          <a:off x="0" y="0"/>
+          <a:ext cx="0" cy="0"/>
+          <a:chOff x="0" y="0"/>
+          <a:chExt cx="0" cy="0"/>
+        </a:xfrm>
+      </p:grpSpPr>
       <p:grpSp>
         <p:nvGrpSpPr>
           <p:cNvPr id="68" name="Group 67">
@@ -7027,7 +8050,7 @@
 </p:sld>
 </file>
 
-<file path=ppt/slides/slide2.xml><?xml version="1.0" encoding="utf-8"?>
+<file path=ppt/slides/slide3.xml><?xml version="1.0" encoding="utf-8"?>
 <p:sld xmlns:a="http://schemas.openxmlformats.org/drawingml/2006/main" xmlns:r="http://schemas.openxmlformats.org/officeDocument/2006/relationships" xmlns:p="http://schemas.openxmlformats.org/presentationml/2006/main">
   <p:cSld>
     <p:spTree>

</xml_diff>

<commit_message>
Rewrite ch04 - lower case for all tree nodes
</commit_message>
<xml_diff>
--- a/datastruct/tree/red-black-tree/img/rbtree.pptx
+++ b/datastruct/tree/red-black-tree/img/rbtree.pptx
@@ -5,12 +5,13 @@
     <p:sldMasterId id="2147483648" r:id="rId1"/>
   </p:sldMasterIdLst>
   <p:notesMasterIdLst>
-    <p:notesMasterId r:id="rId5"/>
+    <p:notesMasterId r:id="rId6"/>
   </p:notesMasterIdLst>
   <p:sldIdLst>
     <p:sldId id="258" r:id="rId2"/>
     <p:sldId id="256" r:id="rId3"/>
-    <p:sldId id="257" r:id="rId4"/>
+    <p:sldId id="259" r:id="rId4"/>
+    <p:sldId id="257" r:id="rId5"/>
   </p:sldIdLst>
   <p:sldSz cx="12192000" cy="6858000"/>
   <p:notesSz cx="6858000" cy="9144000"/>
@@ -613,28 +614,9 @@
             </a:pPr>
             <a:r>
               <a:rPr lang="en-US" dirty="0"/>
-              <a:t>D</a:t>
+              <a:t>Insert fixing, 4 sub-cases</a:t>
             </a:r>
-            <a:r>
-              <a:rPr lang="en-CN" dirty="0"/>
-              <a:t>elete case 1: </a:t>
-            </a:r>
-            <a:r>
-              <a:rPr lang="en-US" sz="1200" kern="1200" dirty="0">
-                <a:solidFill>
-                  <a:schemeClr val="tx1"/>
-                </a:solidFill>
-                <a:effectLst/>
-                <a:latin typeface="+mn-lt"/>
-                <a:ea typeface="+mn-ea"/>
-                <a:cs typeface="+mn-cs"/>
-              </a:rPr>
-              <a:t>The sibling of the doubly-black node is black, and it has a red sub-tree. </a:t>
-            </a:r>
-            <a:r>
-              <a:rPr lang="en-CN" dirty="0"/>
-              <a:t>There are 4 sub-cases.</a:t>
-            </a:r>
+            <a:endParaRPr lang="en-CN" dirty="0"/>
           </a:p>
         </p:txBody>
       </p:sp>
@@ -718,6 +700,130 @@
           <a:bodyPr/>
           <a:lstStyle/>
           <a:p>
+            <a:pPr marL="0" marR="0" lvl="0" indent="0" algn="l" defTabSz="914400" rtl="0" eaLnBrk="1" fontAlgn="auto" latinLnBrk="0" hangingPunct="1">
+              <a:lnSpc>
+                <a:spcPct val="100000"/>
+              </a:lnSpc>
+              <a:spcBef>
+                <a:spcPts val="0"/>
+              </a:spcBef>
+              <a:spcAft>
+                <a:spcPts val="0"/>
+              </a:spcAft>
+              <a:buClrTx/>
+              <a:buSzTx/>
+              <a:buFontTx/>
+              <a:buNone/>
+              <a:tabLst/>
+              <a:defRPr/>
+            </a:pPr>
+            <a:r>
+              <a:rPr lang="en-US" dirty="0"/>
+              <a:t>D</a:t>
+            </a:r>
+            <a:r>
+              <a:rPr lang="en-CN" dirty="0"/>
+              <a:t>elete case 1: </a:t>
+            </a:r>
+            <a:r>
+              <a:rPr lang="en-US" sz="1200" kern="1200" dirty="0">
+                <a:solidFill>
+                  <a:schemeClr val="tx1"/>
+                </a:solidFill>
+                <a:effectLst/>
+                <a:latin typeface="+mn-lt"/>
+                <a:ea typeface="+mn-ea"/>
+                <a:cs typeface="+mn-cs"/>
+              </a:rPr>
+              <a:t>The sibling of the doubly-black node is black, and it has a red sub-tree. </a:t>
+            </a:r>
+            <a:r>
+              <a:rPr lang="en-CN" dirty="0"/>
+              <a:t>There are 4 sub-cases.</a:t>
+            </a:r>
+          </a:p>
+        </p:txBody>
+      </p:sp>
+      <p:sp>
+        <p:nvSpPr>
+          <p:cNvPr id="4" name="Slide Number Placeholder 3"/>
+          <p:cNvSpPr>
+            <a:spLocks noGrp="1"/>
+          </p:cNvSpPr>
+          <p:nvPr>
+            <p:ph type="sldNum" sz="quarter" idx="5"/>
+          </p:nvPr>
+        </p:nvSpPr>
+        <p:spPr/>
+        <p:txBody>
+          <a:bodyPr/>
+          <a:lstStyle/>
+          <a:p>
+            <a:fld id="{5A7F411E-DD35-8744-9F99-82262987EC7F}" type="slidenum">
+              <a:rPr lang="en-CN" smtClean="0"/>
+              <a:t>3</a:t>
+            </a:fld>
+            <a:endParaRPr lang="en-CN"/>
+          </a:p>
+        </p:txBody>
+      </p:sp>
+    </p:spTree>
+    <p:extLst>
+      <p:ext uri="{BB962C8B-B14F-4D97-AF65-F5344CB8AC3E}">
+        <p14:creationId xmlns:p14="http://schemas.microsoft.com/office/powerpoint/2010/main" val="3244888549"/>
+      </p:ext>
+    </p:extLst>
+  </p:cSld>
+  <p:clrMapOvr>
+    <a:masterClrMapping/>
+  </p:clrMapOvr>
+</p:notes>
+</file>
+
+<file path=ppt/notesSlides/notesSlide4.xml><?xml version="1.0" encoding="utf-8"?>
+<p:notes xmlns:a="http://schemas.openxmlformats.org/drawingml/2006/main" xmlns:r="http://schemas.openxmlformats.org/officeDocument/2006/relationships" xmlns:p="http://schemas.openxmlformats.org/presentationml/2006/main">
+  <p:cSld>
+    <p:spTree>
+      <p:nvGrpSpPr>
+        <p:cNvPr id="1" name=""/>
+        <p:cNvGrpSpPr/>
+        <p:nvPr/>
+      </p:nvGrpSpPr>
+      <p:grpSpPr>
+        <a:xfrm>
+          <a:off x="0" y="0"/>
+          <a:ext cx="0" cy="0"/>
+          <a:chOff x="0" y="0"/>
+          <a:chExt cx="0" cy="0"/>
+        </a:xfrm>
+      </p:grpSpPr>
+      <p:sp>
+        <p:nvSpPr>
+          <p:cNvPr id="2" name="Slide Image Placeholder 1"/>
+          <p:cNvSpPr>
+            <a:spLocks noGrp="1" noRot="1" noChangeAspect="1"/>
+          </p:cNvSpPr>
+          <p:nvPr>
+            <p:ph type="sldImg"/>
+          </p:nvPr>
+        </p:nvSpPr>
+        <p:spPr/>
+      </p:sp>
+      <p:sp>
+        <p:nvSpPr>
+          <p:cNvPr id="3" name="Notes Placeholder 2"/>
+          <p:cNvSpPr>
+            <a:spLocks noGrp="1"/>
+          </p:cNvSpPr>
+          <p:nvPr>
+            <p:ph type="body" idx="1"/>
+          </p:nvPr>
+        </p:nvSpPr>
+        <p:spPr/>
+        <p:txBody>
+          <a:bodyPr/>
+          <a:lstStyle/>
+          <a:p>
             <a:r>
               <a:rPr lang="en-CN" dirty="0"/>
               <a:t>Delete case 2: </a:t>
@@ -747,7 +853,7 @@
           <a:p>
             <a:fld id="{5A7F411E-DD35-8744-9F99-82262987EC7F}" type="slidenum">
               <a:rPr lang="en-CN" smtClean="0"/>
-              <a:t>3</a:t>
+              <a:t>4</a:t>
             </a:fld>
             <a:endParaRPr lang="en-CN"/>
           </a:p>
@@ -4975,6 +5081,3135 @@
             <a:prstGeom prst="ellipse">
               <a:avLst/>
             </a:prstGeom>
+            <a:solidFill>
+              <a:schemeClr val="bg1">
+                <a:lumMod val="65000"/>
+              </a:schemeClr>
+            </a:solidFill>
+          </p:spPr>
+          <p:style>
+            <a:lnRef idx="2">
+              <a:schemeClr val="dk1"/>
+            </a:lnRef>
+            <a:fillRef idx="1">
+              <a:schemeClr val="lt1"/>
+            </a:fillRef>
+            <a:effectRef idx="0">
+              <a:schemeClr val="dk1"/>
+            </a:effectRef>
+            <a:fontRef idx="minor">
+              <a:schemeClr val="dk1"/>
+            </a:fontRef>
+          </p:style>
+          <p:txBody>
+            <a:bodyPr lIns="36000" tIns="36000" rIns="36000" bIns="36000" rtlCol="0" anchor="ctr" anchorCtr="1"/>
+            <a:lstStyle/>
+            <a:p>
+              <a:pPr algn="ctr"/>
+              <a:r>
+                <a:rPr lang="en-CN" i="1" dirty="0">
+                  <a:latin typeface="Times New Roman" panose="02020603050405020304" pitchFamily="18" charset="0"/>
+                  <a:cs typeface="Times New Roman" panose="02020603050405020304" pitchFamily="18" charset="0"/>
+                </a:rPr>
+                <a:t>y</a:t>
+              </a:r>
+            </a:p>
+          </p:txBody>
+        </p:sp>
+        <p:sp>
+          <p:nvSpPr>
+            <p:cNvPr id="5" name="Oval 4">
+              <a:extLst>
+                <a:ext uri="{FF2B5EF4-FFF2-40B4-BE49-F238E27FC236}">
+                  <a16:creationId xmlns:a16="http://schemas.microsoft.com/office/drawing/2014/main" id="{717FB2B2-E1B7-A247-8A36-31D90451A0B4}"/>
+                </a:ext>
+              </a:extLst>
+            </p:cNvPr>
+            <p:cNvSpPr/>
+            <p:nvPr/>
+          </p:nvSpPr>
+          <p:spPr>
+            <a:xfrm>
+              <a:off x="4777562" y="3001925"/>
+              <a:ext cx="531629" cy="542261"/>
+            </a:xfrm>
+            <a:prstGeom prst="ellipse">
+              <a:avLst/>
+            </a:prstGeom>
+          </p:spPr>
+          <p:style>
+            <a:lnRef idx="2">
+              <a:schemeClr val="dk1">
+                <a:shade val="50000"/>
+              </a:schemeClr>
+            </a:lnRef>
+            <a:fillRef idx="1">
+              <a:schemeClr val="dk1"/>
+            </a:fillRef>
+            <a:effectRef idx="0">
+              <a:schemeClr val="dk1"/>
+            </a:effectRef>
+            <a:fontRef idx="minor">
+              <a:schemeClr val="lt1"/>
+            </a:fontRef>
+          </p:style>
+          <p:txBody>
+            <a:bodyPr lIns="36000" tIns="36000" rIns="36000" bIns="36000" rtlCol="0" anchor="ctr" anchorCtr="1"/>
+            <a:lstStyle/>
+            <a:p>
+              <a:pPr algn="ctr"/>
+              <a:r>
+                <a:rPr lang="en-CN" i="1" dirty="0">
+                  <a:latin typeface="Times New Roman" panose="02020603050405020304" pitchFamily="18" charset="0"/>
+                  <a:cs typeface="Times New Roman" panose="02020603050405020304" pitchFamily="18" charset="0"/>
+                </a:rPr>
+                <a:t>x</a:t>
+              </a:r>
+            </a:p>
+          </p:txBody>
+        </p:sp>
+        <p:sp>
+          <p:nvSpPr>
+            <p:cNvPr id="7" name="Oval 6">
+              <a:extLst>
+                <a:ext uri="{FF2B5EF4-FFF2-40B4-BE49-F238E27FC236}">
+                  <a16:creationId xmlns:a16="http://schemas.microsoft.com/office/drawing/2014/main" id="{9A0496C0-1CE0-974D-9494-8BF09FD33E5E}"/>
+                </a:ext>
+              </a:extLst>
+            </p:cNvPr>
+            <p:cNvSpPr/>
+            <p:nvPr/>
+          </p:nvSpPr>
+          <p:spPr>
+            <a:xfrm>
+              <a:off x="6680789" y="3001925"/>
+              <a:ext cx="531629" cy="542261"/>
+            </a:xfrm>
+            <a:prstGeom prst="ellipse">
+              <a:avLst/>
+            </a:prstGeom>
+          </p:spPr>
+          <p:style>
+            <a:lnRef idx="2">
+              <a:schemeClr val="dk1">
+                <a:shade val="50000"/>
+              </a:schemeClr>
+            </a:lnRef>
+            <a:fillRef idx="1">
+              <a:schemeClr val="dk1"/>
+            </a:fillRef>
+            <a:effectRef idx="0">
+              <a:schemeClr val="dk1"/>
+            </a:effectRef>
+            <a:fontRef idx="minor">
+              <a:schemeClr val="lt1"/>
+            </a:fontRef>
+          </p:style>
+          <p:txBody>
+            <a:bodyPr lIns="36000" tIns="36000" rIns="36000" bIns="36000" rtlCol="0" anchor="ctr" anchorCtr="1"/>
+            <a:lstStyle/>
+            <a:p>
+              <a:pPr algn="ctr"/>
+              <a:r>
+                <a:rPr lang="en-CN" i="1" dirty="0">
+                  <a:latin typeface="Times New Roman" panose="02020603050405020304" pitchFamily="18" charset="0"/>
+                  <a:cs typeface="Times New Roman" panose="02020603050405020304" pitchFamily="18" charset="0"/>
+                </a:rPr>
+                <a:t>z</a:t>
+              </a:r>
+            </a:p>
+          </p:txBody>
+        </p:sp>
+        <p:sp>
+          <p:nvSpPr>
+            <p:cNvPr id="8" name="TextBox 7">
+              <a:extLst>
+                <a:ext uri="{FF2B5EF4-FFF2-40B4-BE49-F238E27FC236}">
+                  <a16:creationId xmlns:a16="http://schemas.microsoft.com/office/drawing/2014/main" id="{0E9F8456-3C86-6A47-9E56-0589891988A8}"/>
+                </a:ext>
+              </a:extLst>
+            </p:cNvPr>
+            <p:cNvSpPr txBox="1"/>
+            <p:nvPr/>
+          </p:nvSpPr>
+          <p:spPr>
+            <a:xfrm>
+              <a:off x="4495263" y="3902149"/>
+              <a:ext cx="300082" cy="369332"/>
+            </a:xfrm>
+            <a:prstGeom prst="rect">
+              <a:avLst/>
+            </a:prstGeom>
+            <a:noFill/>
+          </p:spPr>
+          <p:txBody>
+            <a:bodyPr wrap="none" rtlCol="0">
+              <a:spAutoFit/>
+            </a:bodyPr>
+            <a:lstStyle/>
+            <a:p>
+              <a:r>
+                <a:rPr lang="en-CN" i="1" dirty="0">
+                  <a:latin typeface="Times New Roman" panose="02020603050405020304" pitchFamily="18" charset="0"/>
+                  <a:cs typeface="Times New Roman" panose="02020603050405020304" pitchFamily="18" charset="0"/>
+                </a:rPr>
+                <a:t>a</a:t>
+              </a:r>
+            </a:p>
+          </p:txBody>
+        </p:sp>
+        <p:sp>
+          <p:nvSpPr>
+            <p:cNvPr id="9" name="TextBox 8">
+              <a:extLst>
+                <a:ext uri="{FF2B5EF4-FFF2-40B4-BE49-F238E27FC236}">
+                  <a16:creationId xmlns:a16="http://schemas.microsoft.com/office/drawing/2014/main" id="{4BB135D8-47D6-4040-8A27-37D3D7AD1910}"/>
+                </a:ext>
+              </a:extLst>
+            </p:cNvPr>
+            <p:cNvSpPr txBox="1"/>
+            <p:nvPr/>
+          </p:nvSpPr>
+          <p:spPr>
+            <a:xfrm>
+              <a:off x="5362353" y="3941872"/>
+              <a:ext cx="300082" cy="369332"/>
+            </a:xfrm>
+            <a:prstGeom prst="rect">
+              <a:avLst/>
+            </a:prstGeom>
+            <a:noFill/>
+          </p:spPr>
+          <p:txBody>
+            <a:bodyPr wrap="none" rtlCol="0">
+              <a:spAutoFit/>
+            </a:bodyPr>
+            <a:lstStyle/>
+            <a:p>
+              <a:r>
+                <a:rPr lang="en-CN" i="1" dirty="0">
+                  <a:latin typeface="Times New Roman" panose="02020603050405020304" pitchFamily="18" charset="0"/>
+                  <a:cs typeface="Times New Roman" panose="02020603050405020304" pitchFamily="18" charset="0"/>
+                </a:rPr>
+                <a:t>b</a:t>
+              </a:r>
+            </a:p>
+          </p:txBody>
+        </p:sp>
+        <p:sp>
+          <p:nvSpPr>
+            <p:cNvPr id="10" name="TextBox 9">
+              <a:extLst>
+                <a:ext uri="{FF2B5EF4-FFF2-40B4-BE49-F238E27FC236}">
+                  <a16:creationId xmlns:a16="http://schemas.microsoft.com/office/drawing/2014/main" id="{5CE03C28-F0D5-864D-A888-B22BC1798965}"/>
+                </a:ext>
+              </a:extLst>
+            </p:cNvPr>
+            <p:cNvSpPr txBox="1"/>
+            <p:nvPr/>
+          </p:nvSpPr>
+          <p:spPr>
+            <a:xfrm>
+              <a:off x="6393531" y="3909975"/>
+              <a:ext cx="287258" cy="369332"/>
+            </a:xfrm>
+            <a:prstGeom prst="rect">
+              <a:avLst/>
+            </a:prstGeom>
+            <a:noFill/>
+          </p:spPr>
+          <p:txBody>
+            <a:bodyPr wrap="none" rtlCol="0">
+              <a:spAutoFit/>
+            </a:bodyPr>
+            <a:lstStyle/>
+            <a:p>
+              <a:r>
+                <a:rPr lang="en-CN" i="1" dirty="0">
+                  <a:latin typeface="Times New Roman" panose="02020603050405020304" pitchFamily="18" charset="0"/>
+                  <a:cs typeface="Times New Roman" panose="02020603050405020304" pitchFamily="18" charset="0"/>
+                </a:rPr>
+                <a:t>c</a:t>
+              </a:r>
+            </a:p>
+          </p:txBody>
+        </p:sp>
+        <p:sp>
+          <p:nvSpPr>
+            <p:cNvPr id="11" name="TextBox 10">
+              <a:extLst>
+                <a:ext uri="{FF2B5EF4-FFF2-40B4-BE49-F238E27FC236}">
+                  <a16:creationId xmlns:a16="http://schemas.microsoft.com/office/drawing/2014/main" id="{555BC14F-0B41-8041-B1B2-C6286C9C9069}"/>
+                </a:ext>
+              </a:extLst>
+            </p:cNvPr>
+            <p:cNvSpPr txBox="1"/>
+            <p:nvPr/>
+          </p:nvSpPr>
+          <p:spPr>
+            <a:xfrm>
+              <a:off x="7325655" y="3902149"/>
+              <a:ext cx="300082" cy="369332"/>
+            </a:xfrm>
+            <a:prstGeom prst="rect">
+              <a:avLst/>
+            </a:prstGeom>
+            <a:noFill/>
+          </p:spPr>
+          <p:txBody>
+            <a:bodyPr wrap="none" rtlCol="0">
+              <a:spAutoFit/>
+            </a:bodyPr>
+            <a:lstStyle/>
+            <a:p>
+              <a:r>
+                <a:rPr lang="en-CN" i="1" dirty="0">
+                  <a:latin typeface="Times New Roman" panose="02020603050405020304" pitchFamily="18" charset="0"/>
+                  <a:cs typeface="Times New Roman" panose="02020603050405020304" pitchFamily="18" charset="0"/>
+                </a:rPr>
+                <a:t>d</a:t>
+              </a:r>
+            </a:p>
+          </p:txBody>
+        </p:sp>
+        <p:cxnSp>
+          <p:nvCxnSpPr>
+            <p:cNvPr id="13" name="Straight Connector 12">
+              <a:extLst>
+                <a:ext uri="{FF2B5EF4-FFF2-40B4-BE49-F238E27FC236}">
+                  <a16:creationId xmlns:a16="http://schemas.microsoft.com/office/drawing/2014/main" id="{458AA416-41F0-6E44-A507-C8267CA503AB}"/>
+                </a:ext>
+              </a:extLst>
+            </p:cNvPr>
+            <p:cNvCxnSpPr>
+              <a:stCxn id="4" idx="3"/>
+              <a:endCxn id="5" idx="7"/>
+            </p:cNvCxnSpPr>
+            <p:nvPr/>
+          </p:nvCxnSpPr>
+          <p:spPr>
+            <a:xfrm flipH="1">
+              <a:off x="5231336" y="2833910"/>
+              <a:ext cx="513671" cy="247427"/>
+            </a:xfrm>
+            <a:prstGeom prst="line">
+              <a:avLst/>
+            </a:prstGeom>
+          </p:spPr>
+          <p:style>
+            <a:lnRef idx="2">
+              <a:schemeClr val="dk1"/>
+            </a:lnRef>
+            <a:fillRef idx="0">
+              <a:schemeClr val="dk1"/>
+            </a:fillRef>
+            <a:effectRef idx="1">
+              <a:schemeClr val="dk1"/>
+            </a:effectRef>
+            <a:fontRef idx="minor">
+              <a:schemeClr val="tx1"/>
+            </a:fontRef>
+          </p:style>
+        </p:cxnSp>
+        <p:cxnSp>
+          <p:nvCxnSpPr>
+            <p:cNvPr id="14" name="Straight Connector 13">
+              <a:extLst>
+                <a:ext uri="{FF2B5EF4-FFF2-40B4-BE49-F238E27FC236}">
+                  <a16:creationId xmlns:a16="http://schemas.microsoft.com/office/drawing/2014/main" id="{6767A533-176E-C14F-BA36-D00315106507}"/>
+                </a:ext>
+              </a:extLst>
+            </p:cNvPr>
+            <p:cNvCxnSpPr>
+              <a:cxnSpLocks/>
+              <a:stCxn id="9" idx="0"/>
+              <a:endCxn id="5" idx="5"/>
+            </p:cNvCxnSpPr>
+            <p:nvPr/>
+          </p:nvCxnSpPr>
+          <p:spPr>
+            <a:xfrm flipH="1" flipV="1">
+              <a:off x="5231336" y="3464774"/>
+              <a:ext cx="281058" cy="477098"/>
+            </a:xfrm>
+            <a:prstGeom prst="line">
+              <a:avLst/>
+            </a:prstGeom>
+          </p:spPr>
+          <p:style>
+            <a:lnRef idx="2">
+              <a:schemeClr val="dk1"/>
+            </a:lnRef>
+            <a:fillRef idx="0">
+              <a:schemeClr val="dk1"/>
+            </a:fillRef>
+            <a:effectRef idx="1">
+              <a:schemeClr val="dk1"/>
+            </a:effectRef>
+            <a:fontRef idx="minor">
+              <a:schemeClr val="tx1"/>
+            </a:fontRef>
+          </p:style>
+        </p:cxnSp>
+        <p:cxnSp>
+          <p:nvCxnSpPr>
+            <p:cNvPr id="15" name="Straight Connector 14">
+              <a:extLst>
+                <a:ext uri="{FF2B5EF4-FFF2-40B4-BE49-F238E27FC236}">
+                  <a16:creationId xmlns:a16="http://schemas.microsoft.com/office/drawing/2014/main" id="{91606350-F07D-514D-B265-202FAB0549BC}"/>
+                </a:ext>
+              </a:extLst>
+            </p:cNvPr>
+            <p:cNvCxnSpPr>
+              <a:cxnSpLocks/>
+              <a:stCxn id="4" idx="5"/>
+              <a:endCxn id="7" idx="1"/>
+            </p:cNvCxnSpPr>
+            <p:nvPr/>
+          </p:nvCxnSpPr>
+          <p:spPr>
+            <a:xfrm>
+              <a:off x="6120926" y="2833910"/>
+              <a:ext cx="637718" cy="247427"/>
+            </a:xfrm>
+            <a:prstGeom prst="line">
+              <a:avLst/>
+            </a:prstGeom>
+          </p:spPr>
+          <p:style>
+            <a:lnRef idx="2">
+              <a:schemeClr val="dk1"/>
+            </a:lnRef>
+            <a:fillRef idx="0">
+              <a:schemeClr val="dk1"/>
+            </a:fillRef>
+            <a:effectRef idx="1">
+              <a:schemeClr val="dk1"/>
+            </a:effectRef>
+            <a:fontRef idx="minor">
+              <a:schemeClr val="tx1"/>
+            </a:fontRef>
+          </p:style>
+        </p:cxnSp>
+        <p:cxnSp>
+          <p:nvCxnSpPr>
+            <p:cNvPr id="21" name="Straight Connector 20">
+              <a:extLst>
+                <a:ext uri="{FF2B5EF4-FFF2-40B4-BE49-F238E27FC236}">
+                  <a16:creationId xmlns:a16="http://schemas.microsoft.com/office/drawing/2014/main" id="{940BFE9A-381E-DF45-8259-0A70839652CC}"/>
+                </a:ext>
+              </a:extLst>
+            </p:cNvPr>
+            <p:cNvCxnSpPr>
+              <a:cxnSpLocks/>
+              <a:stCxn id="8" idx="0"/>
+              <a:endCxn id="5" idx="3"/>
+            </p:cNvCxnSpPr>
+            <p:nvPr/>
+          </p:nvCxnSpPr>
+          <p:spPr>
+            <a:xfrm flipV="1">
+              <a:off x="4645304" y="3464774"/>
+              <a:ext cx="210113" cy="437375"/>
+            </a:xfrm>
+            <a:prstGeom prst="line">
+              <a:avLst/>
+            </a:prstGeom>
+          </p:spPr>
+          <p:style>
+            <a:lnRef idx="2">
+              <a:schemeClr val="dk1"/>
+            </a:lnRef>
+            <a:fillRef idx="0">
+              <a:schemeClr val="dk1"/>
+            </a:fillRef>
+            <a:effectRef idx="1">
+              <a:schemeClr val="dk1"/>
+            </a:effectRef>
+            <a:fontRef idx="minor">
+              <a:schemeClr val="tx1"/>
+            </a:fontRef>
+          </p:style>
+        </p:cxnSp>
+        <p:cxnSp>
+          <p:nvCxnSpPr>
+            <p:cNvPr id="25" name="Straight Connector 24">
+              <a:extLst>
+                <a:ext uri="{FF2B5EF4-FFF2-40B4-BE49-F238E27FC236}">
+                  <a16:creationId xmlns:a16="http://schemas.microsoft.com/office/drawing/2014/main" id="{2CD3E167-6336-D044-94F4-EE3736F4AD62}"/>
+                </a:ext>
+              </a:extLst>
+            </p:cNvPr>
+            <p:cNvCxnSpPr>
+              <a:cxnSpLocks/>
+              <a:stCxn id="10" idx="0"/>
+              <a:endCxn id="7" idx="3"/>
+            </p:cNvCxnSpPr>
+            <p:nvPr/>
+          </p:nvCxnSpPr>
+          <p:spPr>
+            <a:xfrm flipV="1">
+              <a:off x="6537160" y="3464774"/>
+              <a:ext cx="221484" cy="445201"/>
+            </a:xfrm>
+            <a:prstGeom prst="line">
+              <a:avLst/>
+            </a:prstGeom>
+          </p:spPr>
+          <p:style>
+            <a:lnRef idx="2">
+              <a:schemeClr val="dk1"/>
+            </a:lnRef>
+            <a:fillRef idx="0">
+              <a:schemeClr val="dk1"/>
+            </a:fillRef>
+            <a:effectRef idx="1">
+              <a:schemeClr val="dk1"/>
+            </a:effectRef>
+            <a:fontRef idx="minor">
+              <a:schemeClr val="tx1"/>
+            </a:fontRef>
+          </p:style>
+        </p:cxnSp>
+        <p:cxnSp>
+          <p:nvCxnSpPr>
+            <p:cNvPr id="28" name="Straight Connector 27">
+              <a:extLst>
+                <a:ext uri="{FF2B5EF4-FFF2-40B4-BE49-F238E27FC236}">
+                  <a16:creationId xmlns:a16="http://schemas.microsoft.com/office/drawing/2014/main" id="{B00E8DDD-AA85-F848-8451-69E593778EBE}"/>
+                </a:ext>
+              </a:extLst>
+            </p:cNvPr>
+            <p:cNvCxnSpPr>
+              <a:cxnSpLocks/>
+              <a:stCxn id="11" idx="0"/>
+              <a:endCxn id="7" idx="5"/>
+            </p:cNvCxnSpPr>
+            <p:nvPr/>
+          </p:nvCxnSpPr>
+          <p:spPr>
+            <a:xfrm flipH="1" flipV="1">
+              <a:off x="7134563" y="3464774"/>
+              <a:ext cx="341133" cy="437375"/>
+            </a:xfrm>
+            <a:prstGeom prst="line">
+              <a:avLst/>
+            </a:prstGeom>
+          </p:spPr>
+          <p:style>
+            <a:lnRef idx="2">
+              <a:schemeClr val="dk1"/>
+            </a:lnRef>
+            <a:fillRef idx="0">
+              <a:schemeClr val="dk1"/>
+            </a:fillRef>
+            <a:effectRef idx="1">
+              <a:schemeClr val="dk1"/>
+            </a:effectRef>
+            <a:fontRef idx="minor">
+              <a:schemeClr val="tx1"/>
+            </a:fontRef>
+          </p:style>
+        </p:cxnSp>
+      </p:grpSp>
+      <p:grpSp>
+        <p:nvGrpSpPr>
+          <p:cNvPr id="69" name="Group 68">
+            <a:extLst>
+              <a:ext uri="{FF2B5EF4-FFF2-40B4-BE49-F238E27FC236}">
+                <a16:creationId xmlns:a16="http://schemas.microsoft.com/office/drawing/2014/main" id="{4776C64B-9534-904C-BDF1-4B79F6A55BC0}"/>
+              </a:ext>
+            </a:extLst>
+          </p:cNvPr>
+          <p:cNvGrpSpPr/>
+          <p:nvPr/>
+        </p:nvGrpSpPr>
+        <p:grpSpPr>
+          <a:xfrm>
+            <a:off x="8447048" y="3976382"/>
+            <a:ext cx="2744116" cy="2601412"/>
+            <a:chOff x="1014566" y="620233"/>
+            <a:chExt cx="2744116" cy="2601412"/>
+          </a:xfrm>
+        </p:grpSpPr>
+        <p:sp>
+          <p:nvSpPr>
+            <p:cNvPr id="34" name="Oval 33">
+              <a:extLst>
+                <a:ext uri="{FF2B5EF4-FFF2-40B4-BE49-F238E27FC236}">
+                  <a16:creationId xmlns:a16="http://schemas.microsoft.com/office/drawing/2014/main" id="{9D41FAFA-11FB-4242-86B1-FBB16A82BB7B}"/>
+                </a:ext>
+              </a:extLst>
+            </p:cNvPr>
+            <p:cNvSpPr/>
+            <p:nvPr/>
+          </p:nvSpPr>
+          <p:spPr>
+            <a:xfrm>
+              <a:off x="1904156" y="620233"/>
+              <a:ext cx="531629" cy="542261"/>
+            </a:xfrm>
+            <a:prstGeom prst="ellipse">
+              <a:avLst/>
+            </a:prstGeom>
+          </p:spPr>
+          <p:style>
+            <a:lnRef idx="2">
+              <a:schemeClr val="dk1">
+                <a:shade val="50000"/>
+              </a:schemeClr>
+            </a:lnRef>
+            <a:fillRef idx="1">
+              <a:schemeClr val="dk1"/>
+            </a:fillRef>
+            <a:effectRef idx="0">
+              <a:schemeClr val="dk1"/>
+            </a:effectRef>
+            <a:fontRef idx="minor">
+              <a:schemeClr val="lt1"/>
+            </a:fontRef>
+          </p:style>
+          <p:txBody>
+            <a:bodyPr lIns="36000" tIns="36000" rIns="36000" bIns="36000" rtlCol="0" anchor="ctr" anchorCtr="1"/>
+            <a:lstStyle/>
+            <a:p>
+              <a:pPr algn="ctr"/>
+              <a:r>
+                <a:rPr lang="en-CN" i="1" dirty="0">
+                  <a:latin typeface="Times New Roman" panose="02020603050405020304" pitchFamily="18" charset="0"/>
+                  <a:cs typeface="Times New Roman" panose="02020603050405020304" pitchFamily="18" charset="0"/>
+                </a:rPr>
+                <a:t>x</a:t>
+              </a:r>
+            </a:p>
+          </p:txBody>
+        </p:sp>
+        <p:sp>
+          <p:nvSpPr>
+            <p:cNvPr id="35" name="Oval 34">
+              <a:extLst>
+                <a:ext uri="{FF2B5EF4-FFF2-40B4-BE49-F238E27FC236}">
+                  <a16:creationId xmlns:a16="http://schemas.microsoft.com/office/drawing/2014/main" id="{6DBEF67F-0AB2-2A4A-8DD4-B421D05789F3}"/>
+                </a:ext>
+              </a:extLst>
+            </p:cNvPr>
+            <p:cNvSpPr/>
+            <p:nvPr/>
+          </p:nvSpPr>
+          <p:spPr>
+            <a:xfrm>
+              <a:off x="1014566" y="1251097"/>
+              <a:ext cx="531629" cy="542261"/>
+            </a:xfrm>
+            <a:prstGeom prst="ellipse">
+              <a:avLst/>
+            </a:prstGeom>
+            <a:noFill/>
+            <a:ln>
+              <a:noFill/>
+            </a:ln>
+          </p:spPr>
+          <p:style>
+            <a:lnRef idx="2">
+              <a:schemeClr val="dk1"/>
+            </a:lnRef>
+            <a:fillRef idx="1">
+              <a:schemeClr val="lt1"/>
+            </a:fillRef>
+            <a:effectRef idx="0">
+              <a:schemeClr val="dk1"/>
+            </a:effectRef>
+            <a:fontRef idx="minor">
+              <a:schemeClr val="dk1"/>
+            </a:fontRef>
+          </p:style>
+          <p:txBody>
+            <a:bodyPr lIns="36000" tIns="36000" rIns="36000" bIns="36000" rtlCol="0" anchor="ctr" anchorCtr="1"/>
+            <a:lstStyle/>
+            <a:p>
+              <a:pPr algn="ctr"/>
+              <a:r>
+                <a:rPr lang="en-CN" i="1" dirty="0">
+                  <a:latin typeface="Times New Roman" panose="02020603050405020304" pitchFamily="18" charset="0"/>
+                  <a:cs typeface="Times New Roman" panose="02020603050405020304" pitchFamily="18" charset="0"/>
+                </a:rPr>
+                <a:t>a</a:t>
+              </a:r>
+            </a:p>
+          </p:txBody>
+        </p:sp>
+        <p:sp>
+          <p:nvSpPr>
+            <p:cNvPr id="36" name="Oval 35">
+              <a:extLst>
+                <a:ext uri="{FF2B5EF4-FFF2-40B4-BE49-F238E27FC236}">
+                  <a16:creationId xmlns:a16="http://schemas.microsoft.com/office/drawing/2014/main" id="{90075B1D-A502-2846-8981-EF8B897078E7}"/>
+                </a:ext>
+              </a:extLst>
+            </p:cNvPr>
+            <p:cNvSpPr/>
+            <p:nvPr/>
+          </p:nvSpPr>
+          <p:spPr>
+            <a:xfrm>
+              <a:off x="2715658" y="1301914"/>
+              <a:ext cx="531629" cy="542261"/>
+            </a:xfrm>
+            <a:prstGeom prst="ellipse">
+              <a:avLst/>
+            </a:prstGeom>
+            <a:solidFill>
+              <a:schemeClr val="bg1">
+                <a:lumMod val="65000"/>
+              </a:schemeClr>
+            </a:solidFill>
+          </p:spPr>
+          <p:style>
+            <a:lnRef idx="2">
+              <a:schemeClr val="dk1"/>
+            </a:lnRef>
+            <a:fillRef idx="1">
+              <a:schemeClr val="lt1"/>
+            </a:fillRef>
+            <a:effectRef idx="0">
+              <a:schemeClr val="dk1"/>
+            </a:effectRef>
+            <a:fontRef idx="minor">
+              <a:schemeClr val="dk1"/>
+            </a:fontRef>
+          </p:style>
+          <p:txBody>
+            <a:bodyPr lIns="36000" tIns="36000" rIns="36000" bIns="36000" rtlCol="0" anchor="ctr" anchorCtr="1"/>
+            <a:lstStyle/>
+            <a:p>
+              <a:pPr algn="ctr"/>
+              <a:r>
+                <a:rPr lang="en-CN" i="1" dirty="0">
+                  <a:latin typeface="Times New Roman" panose="02020603050405020304" pitchFamily="18" charset="0"/>
+                  <a:cs typeface="Times New Roman" panose="02020603050405020304" pitchFamily="18" charset="0"/>
+                </a:rPr>
+                <a:t>z</a:t>
+              </a:r>
+            </a:p>
+          </p:txBody>
+        </p:sp>
+        <p:sp>
+          <p:nvSpPr>
+            <p:cNvPr id="38" name="TextBox 37">
+              <a:extLst>
+                <a:ext uri="{FF2B5EF4-FFF2-40B4-BE49-F238E27FC236}">
+                  <a16:creationId xmlns:a16="http://schemas.microsoft.com/office/drawing/2014/main" id="{4F1DDE80-2E0B-7649-B475-51232625F032}"/>
+                </a:ext>
+              </a:extLst>
+            </p:cNvPr>
+            <p:cNvSpPr txBox="1"/>
+            <p:nvPr/>
+          </p:nvSpPr>
+          <p:spPr>
+            <a:xfrm>
+              <a:off x="2019929" y="2852313"/>
+              <a:ext cx="300082" cy="369332"/>
+            </a:xfrm>
+            <a:prstGeom prst="rect">
+              <a:avLst/>
+            </a:prstGeom>
+            <a:noFill/>
+          </p:spPr>
+          <p:txBody>
+            <a:bodyPr wrap="none" rtlCol="0">
+              <a:spAutoFit/>
+            </a:bodyPr>
+            <a:lstStyle/>
+            <a:p>
+              <a:r>
+                <a:rPr lang="en-CN" i="1" dirty="0">
+                  <a:latin typeface="Times New Roman" panose="02020603050405020304" pitchFamily="18" charset="0"/>
+                  <a:cs typeface="Times New Roman" panose="02020603050405020304" pitchFamily="18" charset="0"/>
+                </a:rPr>
+                <a:t>b</a:t>
+              </a:r>
+            </a:p>
+          </p:txBody>
+        </p:sp>
+        <p:sp>
+          <p:nvSpPr>
+            <p:cNvPr id="39" name="TextBox 38">
+              <a:extLst>
+                <a:ext uri="{FF2B5EF4-FFF2-40B4-BE49-F238E27FC236}">
+                  <a16:creationId xmlns:a16="http://schemas.microsoft.com/office/drawing/2014/main" id="{583ECDBD-CD93-7C4D-A80F-BF2319FBAB5E}"/>
+                </a:ext>
+              </a:extLst>
+            </p:cNvPr>
+            <p:cNvSpPr txBox="1"/>
+            <p:nvPr/>
+          </p:nvSpPr>
+          <p:spPr>
+            <a:xfrm>
+              <a:off x="2850652" y="2852313"/>
+              <a:ext cx="300082" cy="369332"/>
+            </a:xfrm>
+            <a:prstGeom prst="rect">
+              <a:avLst/>
+            </a:prstGeom>
+            <a:noFill/>
+          </p:spPr>
+          <p:txBody>
+            <a:bodyPr wrap="square" rtlCol="0">
+              <a:spAutoFit/>
+            </a:bodyPr>
+            <a:lstStyle/>
+            <a:p>
+              <a:r>
+                <a:rPr lang="en-CN" i="1" dirty="0">
+                  <a:latin typeface="Times New Roman" panose="02020603050405020304" pitchFamily="18" charset="0"/>
+                  <a:cs typeface="Times New Roman" panose="02020603050405020304" pitchFamily="18" charset="0"/>
+                </a:rPr>
+                <a:t>c</a:t>
+              </a:r>
+            </a:p>
+          </p:txBody>
+        </p:sp>
+        <p:sp>
+          <p:nvSpPr>
+            <p:cNvPr id="40" name="TextBox 39">
+              <a:extLst>
+                <a:ext uri="{FF2B5EF4-FFF2-40B4-BE49-F238E27FC236}">
+                  <a16:creationId xmlns:a16="http://schemas.microsoft.com/office/drawing/2014/main" id="{E16FAFA4-7FC7-1E40-831E-F30E0B77CE69}"/>
+                </a:ext>
+              </a:extLst>
+            </p:cNvPr>
+            <p:cNvSpPr txBox="1"/>
+            <p:nvPr/>
+          </p:nvSpPr>
+          <p:spPr>
+            <a:xfrm>
+              <a:off x="3458600" y="2125925"/>
+              <a:ext cx="300082" cy="369332"/>
+            </a:xfrm>
+            <a:prstGeom prst="rect">
+              <a:avLst/>
+            </a:prstGeom>
+            <a:noFill/>
+          </p:spPr>
+          <p:txBody>
+            <a:bodyPr wrap="none" rtlCol="0">
+              <a:spAutoFit/>
+            </a:bodyPr>
+            <a:lstStyle/>
+            <a:p>
+              <a:r>
+                <a:rPr lang="en-CN" i="1" dirty="0">
+                  <a:latin typeface="Times New Roman" panose="02020603050405020304" pitchFamily="18" charset="0"/>
+                  <a:cs typeface="Times New Roman" panose="02020603050405020304" pitchFamily="18" charset="0"/>
+                </a:rPr>
+                <a:t>d</a:t>
+              </a:r>
+            </a:p>
+          </p:txBody>
+        </p:sp>
+        <p:cxnSp>
+          <p:nvCxnSpPr>
+            <p:cNvPr id="41" name="Straight Connector 40">
+              <a:extLst>
+                <a:ext uri="{FF2B5EF4-FFF2-40B4-BE49-F238E27FC236}">
+                  <a16:creationId xmlns:a16="http://schemas.microsoft.com/office/drawing/2014/main" id="{D4418E09-8CE4-B340-8B57-57246748D8D9}"/>
+                </a:ext>
+              </a:extLst>
+            </p:cNvPr>
+            <p:cNvCxnSpPr>
+              <a:cxnSpLocks/>
+              <a:stCxn id="34" idx="3"/>
+              <a:endCxn id="35" idx="7"/>
+            </p:cNvCxnSpPr>
+            <p:nvPr/>
+          </p:nvCxnSpPr>
+          <p:spPr>
+            <a:xfrm flipH="1">
+              <a:off x="1468340" y="1083082"/>
+              <a:ext cx="513671" cy="247427"/>
+            </a:xfrm>
+            <a:prstGeom prst="line">
+              <a:avLst/>
+            </a:prstGeom>
+          </p:spPr>
+          <p:style>
+            <a:lnRef idx="2">
+              <a:schemeClr val="dk1"/>
+            </a:lnRef>
+            <a:fillRef idx="0">
+              <a:schemeClr val="dk1"/>
+            </a:fillRef>
+            <a:effectRef idx="1">
+              <a:schemeClr val="dk1"/>
+            </a:effectRef>
+            <a:fontRef idx="minor">
+              <a:schemeClr val="tx1"/>
+            </a:fontRef>
+          </p:style>
+        </p:cxnSp>
+        <p:cxnSp>
+          <p:nvCxnSpPr>
+            <p:cNvPr id="42" name="Straight Connector 41">
+              <a:extLst>
+                <a:ext uri="{FF2B5EF4-FFF2-40B4-BE49-F238E27FC236}">
+                  <a16:creationId xmlns:a16="http://schemas.microsoft.com/office/drawing/2014/main" id="{1360389F-3295-564A-A95C-547A9FDBFD84}"/>
+                </a:ext>
+              </a:extLst>
+            </p:cNvPr>
+            <p:cNvCxnSpPr>
+              <a:cxnSpLocks/>
+              <a:stCxn id="38" idx="0"/>
+              <a:endCxn id="52" idx="3"/>
+            </p:cNvCxnSpPr>
+            <p:nvPr/>
+          </p:nvCxnSpPr>
+          <p:spPr>
+            <a:xfrm flipV="1">
+              <a:off x="2169970" y="2495257"/>
+              <a:ext cx="202551" cy="357056"/>
+            </a:xfrm>
+            <a:prstGeom prst="line">
+              <a:avLst/>
+            </a:prstGeom>
+          </p:spPr>
+          <p:style>
+            <a:lnRef idx="2">
+              <a:schemeClr val="dk1"/>
+            </a:lnRef>
+            <a:fillRef idx="0">
+              <a:schemeClr val="dk1"/>
+            </a:fillRef>
+            <a:effectRef idx="1">
+              <a:schemeClr val="dk1"/>
+            </a:effectRef>
+            <a:fontRef idx="minor">
+              <a:schemeClr val="tx1"/>
+            </a:fontRef>
+          </p:style>
+        </p:cxnSp>
+        <p:cxnSp>
+          <p:nvCxnSpPr>
+            <p:cNvPr id="43" name="Straight Connector 42">
+              <a:extLst>
+                <a:ext uri="{FF2B5EF4-FFF2-40B4-BE49-F238E27FC236}">
+                  <a16:creationId xmlns:a16="http://schemas.microsoft.com/office/drawing/2014/main" id="{F17CFE58-68D1-BB41-B229-D893A48D606F}"/>
+                </a:ext>
+              </a:extLst>
+            </p:cNvPr>
+            <p:cNvCxnSpPr>
+              <a:cxnSpLocks/>
+              <a:stCxn id="34" idx="5"/>
+              <a:endCxn id="36" idx="1"/>
+            </p:cNvCxnSpPr>
+            <p:nvPr/>
+          </p:nvCxnSpPr>
+          <p:spPr>
+            <a:xfrm>
+              <a:off x="2357930" y="1083082"/>
+              <a:ext cx="435583" cy="298244"/>
+            </a:xfrm>
+            <a:prstGeom prst="line">
+              <a:avLst/>
+            </a:prstGeom>
+          </p:spPr>
+          <p:style>
+            <a:lnRef idx="2">
+              <a:schemeClr val="dk1"/>
+            </a:lnRef>
+            <a:fillRef idx="0">
+              <a:schemeClr val="dk1"/>
+            </a:fillRef>
+            <a:effectRef idx="1">
+              <a:schemeClr val="dk1"/>
+            </a:effectRef>
+            <a:fontRef idx="minor">
+              <a:schemeClr val="tx1"/>
+            </a:fontRef>
+          </p:style>
+        </p:cxnSp>
+        <p:cxnSp>
+          <p:nvCxnSpPr>
+            <p:cNvPr id="44" name="Straight Connector 43">
+              <a:extLst>
+                <a:ext uri="{FF2B5EF4-FFF2-40B4-BE49-F238E27FC236}">
+                  <a16:creationId xmlns:a16="http://schemas.microsoft.com/office/drawing/2014/main" id="{A63D039F-BC2F-B248-9B63-5C25E151FF78}"/>
+                </a:ext>
+              </a:extLst>
+            </p:cNvPr>
+            <p:cNvCxnSpPr>
+              <a:cxnSpLocks/>
+              <a:stCxn id="39" idx="0"/>
+              <a:endCxn id="52" idx="5"/>
+            </p:cNvCxnSpPr>
+            <p:nvPr/>
+          </p:nvCxnSpPr>
+          <p:spPr>
+            <a:xfrm flipH="1" flipV="1">
+              <a:off x="2748440" y="2495257"/>
+              <a:ext cx="252253" cy="357056"/>
+            </a:xfrm>
+            <a:prstGeom prst="line">
+              <a:avLst/>
+            </a:prstGeom>
+          </p:spPr>
+          <p:style>
+            <a:lnRef idx="2">
+              <a:schemeClr val="dk1"/>
+            </a:lnRef>
+            <a:fillRef idx="0">
+              <a:schemeClr val="dk1"/>
+            </a:fillRef>
+            <a:effectRef idx="1">
+              <a:schemeClr val="dk1"/>
+            </a:effectRef>
+            <a:fontRef idx="minor">
+              <a:schemeClr val="tx1"/>
+            </a:fontRef>
+          </p:style>
+        </p:cxnSp>
+        <p:cxnSp>
+          <p:nvCxnSpPr>
+            <p:cNvPr id="45" name="Straight Connector 44">
+              <a:extLst>
+                <a:ext uri="{FF2B5EF4-FFF2-40B4-BE49-F238E27FC236}">
+                  <a16:creationId xmlns:a16="http://schemas.microsoft.com/office/drawing/2014/main" id="{5EAF9D02-08D1-6C42-A3A3-67BAF9D7BF18}"/>
+                </a:ext>
+              </a:extLst>
+            </p:cNvPr>
+            <p:cNvCxnSpPr>
+              <a:cxnSpLocks/>
+              <a:stCxn id="52" idx="0"/>
+              <a:endCxn id="36" idx="3"/>
+            </p:cNvCxnSpPr>
+            <p:nvPr/>
+          </p:nvCxnSpPr>
+          <p:spPr>
+            <a:xfrm flipV="1">
+              <a:off x="2560481" y="1764763"/>
+              <a:ext cx="233032" cy="267645"/>
+            </a:xfrm>
+            <a:prstGeom prst="line">
+              <a:avLst/>
+            </a:prstGeom>
+          </p:spPr>
+          <p:style>
+            <a:lnRef idx="2">
+              <a:schemeClr val="dk1"/>
+            </a:lnRef>
+            <a:fillRef idx="0">
+              <a:schemeClr val="dk1"/>
+            </a:fillRef>
+            <a:effectRef idx="1">
+              <a:schemeClr val="dk1"/>
+            </a:effectRef>
+            <a:fontRef idx="minor">
+              <a:schemeClr val="tx1"/>
+            </a:fontRef>
+          </p:style>
+        </p:cxnSp>
+        <p:cxnSp>
+          <p:nvCxnSpPr>
+            <p:cNvPr id="46" name="Straight Connector 45">
+              <a:extLst>
+                <a:ext uri="{FF2B5EF4-FFF2-40B4-BE49-F238E27FC236}">
+                  <a16:creationId xmlns:a16="http://schemas.microsoft.com/office/drawing/2014/main" id="{153C2C6A-7A9D-B745-B596-DD3E1B327CE8}"/>
+                </a:ext>
+              </a:extLst>
+            </p:cNvPr>
+            <p:cNvCxnSpPr>
+              <a:cxnSpLocks/>
+              <a:stCxn id="40" idx="0"/>
+              <a:endCxn id="36" idx="5"/>
+            </p:cNvCxnSpPr>
+            <p:nvPr/>
+          </p:nvCxnSpPr>
+          <p:spPr>
+            <a:xfrm flipH="1" flipV="1">
+              <a:off x="3169432" y="1764763"/>
+              <a:ext cx="439209" cy="361162"/>
+            </a:xfrm>
+            <a:prstGeom prst="line">
+              <a:avLst/>
+            </a:prstGeom>
+          </p:spPr>
+          <p:style>
+            <a:lnRef idx="2">
+              <a:schemeClr val="dk1"/>
+            </a:lnRef>
+            <a:fillRef idx="0">
+              <a:schemeClr val="dk1"/>
+            </a:fillRef>
+            <a:effectRef idx="1">
+              <a:schemeClr val="dk1"/>
+            </a:effectRef>
+            <a:fontRef idx="minor">
+              <a:schemeClr val="tx1"/>
+            </a:fontRef>
+          </p:style>
+        </p:cxnSp>
+        <p:sp>
+          <p:nvSpPr>
+            <p:cNvPr id="52" name="Oval 51">
+              <a:extLst>
+                <a:ext uri="{FF2B5EF4-FFF2-40B4-BE49-F238E27FC236}">
+                  <a16:creationId xmlns:a16="http://schemas.microsoft.com/office/drawing/2014/main" id="{F73AEB0F-7615-F64F-B8B1-EF9BE21609A9}"/>
+                </a:ext>
+              </a:extLst>
+            </p:cNvPr>
+            <p:cNvSpPr/>
+            <p:nvPr/>
+          </p:nvSpPr>
+          <p:spPr>
+            <a:xfrm>
+              <a:off x="2294666" y="2032408"/>
+              <a:ext cx="531629" cy="542261"/>
+            </a:xfrm>
+            <a:prstGeom prst="ellipse">
+              <a:avLst/>
+            </a:prstGeom>
+            <a:solidFill>
+              <a:schemeClr val="bg1">
+                <a:lumMod val="65000"/>
+              </a:schemeClr>
+            </a:solidFill>
+          </p:spPr>
+          <p:style>
+            <a:lnRef idx="2">
+              <a:schemeClr val="dk1"/>
+            </a:lnRef>
+            <a:fillRef idx="1">
+              <a:schemeClr val="lt1"/>
+            </a:fillRef>
+            <a:effectRef idx="0">
+              <a:schemeClr val="dk1"/>
+            </a:effectRef>
+            <a:fontRef idx="minor">
+              <a:schemeClr val="dk1"/>
+            </a:fontRef>
+          </p:style>
+          <p:txBody>
+            <a:bodyPr lIns="36000" tIns="36000" rIns="36000" bIns="36000" rtlCol="0" anchor="ctr" anchorCtr="1"/>
+            <a:lstStyle/>
+            <a:p>
+              <a:pPr algn="ctr"/>
+              <a:r>
+                <a:rPr lang="en-CN" i="1" dirty="0">
+                  <a:latin typeface="Times New Roman" panose="02020603050405020304" pitchFamily="18" charset="0"/>
+                  <a:cs typeface="Times New Roman" panose="02020603050405020304" pitchFamily="18" charset="0"/>
+                </a:rPr>
+                <a:t>y</a:t>
+              </a:r>
+            </a:p>
+          </p:txBody>
+        </p:sp>
+      </p:grpSp>
+      <p:cxnSp>
+        <p:nvCxnSpPr>
+          <p:cNvPr id="67" name="Straight Arrow Connector 66">
+            <a:extLst>
+              <a:ext uri="{FF2B5EF4-FFF2-40B4-BE49-F238E27FC236}">
+                <a16:creationId xmlns:a16="http://schemas.microsoft.com/office/drawing/2014/main" id="{17FF87D7-DF6D-9B40-B439-ED233F74E7E5}"/>
+              </a:ext>
+            </a:extLst>
+          </p:cNvPr>
+          <p:cNvCxnSpPr>
+            <a:cxnSpLocks/>
+          </p:cNvCxnSpPr>
+          <p:nvPr/>
+        </p:nvCxnSpPr>
+        <p:spPr>
+          <a:xfrm>
+            <a:off x="3618796" y="2751003"/>
+            <a:ext cx="526746" cy="273221"/>
+          </a:xfrm>
+          <a:prstGeom prst="straightConnector1">
+            <a:avLst/>
+          </a:prstGeom>
+          <a:ln>
+            <a:tailEnd type="triangle"/>
+          </a:ln>
+        </p:spPr>
+        <p:style>
+          <a:lnRef idx="3">
+            <a:schemeClr val="dk1"/>
+          </a:lnRef>
+          <a:fillRef idx="0">
+            <a:schemeClr val="dk1"/>
+          </a:fillRef>
+          <a:effectRef idx="2">
+            <a:schemeClr val="dk1"/>
+          </a:effectRef>
+          <a:fontRef idx="minor">
+            <a:schemeClr val="tx1"/>
+          </a:fontRef>
+        </p:style>
+      </p:cxnSp>
+      <p:grpSp>
+        <p:nvGrpSpPr>
+          <p:cNvPr id="110" name="Group 109">
+            <a:extLst>
+              <a:ext uri="{FF2B5EF4-FFF2-40B4-BE49-F238E27FC236}">
+                <a16:creationId xmlns:a16="http://schemas.microsoft.com/office/drawing/2014/main" id="{76521794-36CE-D34E-BAB0-BA0B3D90F56B}"/>
+              </a:ext>
+            </a:extLst>
+          </p:cNvPr>
+          <p:cNvGrpSpPr/>
+          <p:nvPr/>
+        </p:nvGrpSpPr>
+        <p:grpSpPr>
+          <a:xfrm>
+            <a:off x="1108888" y="3902149"/>
+            <a:ext cx="2171417" cy="2650609"/>
+            <a:chOff x="667516" y="4040073"/>
+            <a:chExt cx="2171417" cy="2650609"/>
+          </a:xfrm>
+        </p:grpSpPr>
+        <p:sp>
+          <p:nvSpPr>
+            <p:cNvPr id="71" name="Oval 70">
+              <a:extLst>
+                <a:ext uri="{FF2B5EF4-FFF2-40B4-BE49-F238E27FC236}">
+                  <a16:creationId xmlns:a16="http://schemas.microsoft.com/office/drawing/2014/main" id="{C4BE1311-39BC-8746-BDD0-6A4D53A76DF4}"/>
+                </a:ext>
+              </a:extLst>
+            </p:cNvPr>
+            <p:cNvSpPr/>
+            <p:nvPr/>
+          </p:nvSpPr>
+          <p:spPr>
+            <a:xfrm>
+              <a:off x="1661099" y="4040073"/>
+              <a:ext cx="531629" cy="542261"/>
+            </a:xfrm>
+            <a:prstGeom prst="ellipse">
+              <a:avLst/>
+            </a:prstGeom>
+          </p:spPr>
+          <p:style>
+            <a:lnRef idx="2">
+              <a:schemeClr val="dk1">
+                <a:shade val="50000"/>
+              </a:schemeClr>
+            </a:lnRef>
+            <a:fillRef idx="1">
+              <a:schemeClr val="dk1"/>
+            </a:fillRef>
+            <a:effectRef idx="0">
+              <a:schemeClr val="dk1"/>
+            </a:effectRef>
+            <a:fontRef idx="minor">
+              <a:schemeClr val="lt1"/>
+            </a:fontRef>
+          </p:style>
+          <p:txBody>
+            <a:bodyPr lIns="36000" tIns="36000" rIns="36000" bIns="36000" rtlCol="0" anchor="ctr" anchorCtr="1"/>
+            <a:lstStyle/>
+            <a:p>
+              <a:pPr algn="ctr"/>
+              <a:r>
+                <a:rPr lang="en-CN" i="1" dirty="0">
+                  <a:latin typeface="Times New Roman" panose="02020603050405020304" pitchFamily="18" charset="0"/>
+                  <a:cs typeface="Times New Roman" panose="02020603050405020304" pitchFamily="18" charset="0"/>
+                </a:rPr>
+                <a:t>z</a:t>
+              </a:r>
+            </a:p>
+          </p:txBody>
+        </p:sp>
+        <p:sp>
+          <p:nvSpPr>
+            <p:cNvPr id="72" name="Oval 71">
+              <a:extLst>
+                <a:ext uri="{FF2B5EF4-FFF2-40B4-BE49-F238E27FC236}">
+                  <a16:creationId xmlns:a16="http://schemas.microsoft.com/office/drawing/2014/main" id="{3A92C10D-4D89-2A45-9B39-380B69A74641}"/>
+                </a:ext>
+              </a:extLst>
+            </p:cNvPr>
+            <p:cNvSpPr/>
+            <p:nvPr/>
+          </p:nvSpPr>
+          <p:spPr>
+            <a:xfrm>
+              <a:off x="2307304" y="4692392"/>
+              <a:ext cx="531629" cy="542261"/>
+            </a:xfrm>
+            <a:prstGeom prst="ellipse">
+              <a:avLst/>
+            </a:prstGeom>
+            <a:noFill/>
+            <a:ln>
+              <a:noFill/>
+            </a:ln>
+          </p:spPr>
+          <p:style>
+            <a:lnRef idx="2">
+              <a:schemeClr val="dk1"/>
+            </a:lnRef>
+            <a:fillRef idx="1">
+              <a:schemeClr val="lt1"/>
+            </a:fillRef>
+            <a:effectRef idx="0">
+              <a:schemeClr val="dk1"/>
+            </a:effectRef>
+            <a:fontRef idx="minor">
+              <a:schemeClr val="dk1"/>
+            </a:fontRef>
+          </p:style>
+          <p:txBody>
+            <a:bodyPr lIns="36000" tIns="36000" rIns="36000" bIns="36000" rtlCol="0" anchor="ctr" anchorCtr="1"/>
+            <a:lstStyle/>
+            <a:p>
+              <a:pPr algn="ctr"/>
+              <a:r>
+                <a:rPr lang="en-CN" i="1" dirty="0">
+                  <a:latin typeface="Times New Roman" panose="02020603050405020304" pitchFamily="18" charset="0"/>
+                  <a:cs typeface="Times New Roman" panose="02020603050405020304" pitchFamily="18" charset="0"/>
+                </a:rPr>
+                <a:t>d</a:t>
+              </a:r>
+            </a:p>
+          </p:txBody>
+        </p:sp>
+        <p:sp>
+          <p:nvSpPr>
+            <p:cNvPr id="73" name="Oval 72">
+              <a:extLst>
+                <a:ext uri="{FF2B5EF4-FFF2-40B4-BE49-F238E27FC236}">
+                  <a16:creationId xmlns:a16="http://schemas.microsoft.com/office/drawing/2014/main" id="{C388BC45-33FB-4B49-A76F-58D9DA07EB77}"/>
+                </a:ext>
+              </a:extLst>
+            </p:cNvPr>
+            <p:cNvSpPr/>
+            <p:nvPr/>
+          </p:nvSpPr>
+          <p:spPr>
+            <a:xfrm>
+              <a:off x="1014566" y="4746330"/>
+              <a:ext cx="531629" cy="542261"/>
+            </a:xfrm>
+            <a:prstGeom prst="ellipse">
+              <a:avLst/>
+            </a:prstGeom>
+            <a:solidFill>
+              <a:schemeClr val="bg1">
+                <a:lumMod val="65000"/>
+              </a:schemeClr>
+            </a:solidFill>
+          </p:spPr>
+          <p:style>
+            <a:lnRef idx="2">
+              <a:schemeClr val="dk1"/>
+            </a:lnRef>
+            <a:fillRef idx="1">
+              <a:schemeClr val="lt1"/>
+            </a:fillRef>
+            <a:effectRef idx="0">
+              <a:schemeClr val="dk1"/>
+            </a:effectRef>
+            <a:fontRef idx="minor">
+              <a:schemeClr val="dk1"/>
+            </a:fontRef>
+          </p:style>
+          <p:txBody>
+            <a:bodyPr lIns="36000" tIns="36000" rIns="36000" bIns="36000" rtlCol="0" anchor="ctr" anchorCtr="1"/>
+            <a:lstStyle/>
+            <a:p>
+              <a:pPr algn="ctr"/>
+              <a:r>
+                <a:rPr lang="en-CN" i="1" dirty="0">
+                  <a:latin typeface="Times New Roman" panose="02020603050405020304" pitchFamily="18" charset="0"/>
+                  <a:cs typeface="Times New Roman" panose="02020603050405020304" pitchFamily="18" charset="0"/>
+                </a:rPr>
+                <a:t>x</a:t>
+              </a:r>
+            </a:p>
+          </p:txBody>
+        </p:sp>
+        <p:sp>
+          <p:nvSpPr>
+            <p:cNvPr id="74" name="TextBox 73">
+              <a:extLst>
+                <a:ext uri="{FF2B5EF4-FFF2-40B4-BE49-F238E27FC236}">
+                  <a16:creationId xmlns:a16="http://schemas.microsoft.com/office/drawing/2014/main" id="{49C9107F-F86F-C245-AED4-D47DB85489F9}"/>
+                </a:ext>
+              </a:extLst>
+            </p:cNvPr>
+            <p:cNvSpPr txBox="1"/>
+            <p:nvPr/>
+          </p:nvSpPr>
+          <p:spPr>
+            <a:xfrm>
+              <a:off x="1263589" y="6307258"/>
+              <a:ext cx="300082" cy="369332"/>
+            </a:xfrm>
+            <a:prstGeom prst="rect">
+              <a:avLst/>
+            </a:prstGeom>
+            <a:noFill/>
+          </p:spPr>
+          <p:txBody>
+            <a:bodyPr wrap="none" rtlCol="0">
+              <a:spAutoFit/>
+            </a:bodyPr>
+            <a:lstStyle/>
+            <a:p>
+              <a:r>
+                <a:rPr lang="en-CN" i="1" dirty="0">
+                  <a:latin typeface="Times New Roman" panose="02020603050405020304" pitchFamily="18" charset="0"/>
+                  <a:cs typeface="Times New Roman" panose="02020603050405020304" pitchFamily="18" charset="0"/>
+                </a:rPr>
+                <a:t>b</a:t>
+              </a:r>
+            </a:p>
+          </p:txBody>
+        </p:sp>
+        <p:sp>
+          <p:nvSpPr>
+            <p:cNvPr id="75" name="TextBox 74">
+              <a:extLst>
+                <a:ext uri="{FF2B5EF4-FFF2-40B4-BE49-F238E27FC236}">
+                  <a16:creationId xmlns:a16="http://schemas.microsoft.com/office/drawing/2014/main" id="{4851A735-6D50-784D-86D9-DDB231F9A094}"/>
+                </a:ext>
+              </a:extLst>
+            </p:cNvPr>
+            <p:cNvSpPr txBox="1"/>
+            <p:nvPr/>
+          </p:nvSpPr>
+          <p:spPr>
+            <a:xfrm>
+              <a:off x="2114873" y="6321350"/>
+              <a:ext cx="300082" cy="369332"/>
+            </a:xfrm>
+            <a:prstGeom prst="rect">
+              <a:avLst/>
+            </a:prstGeom>
+            <a:noFill/>
+          </p:spPr>
+          <p:txBody>
+            <a:bodyPr wrap="square" rtlCol="0">
+              <a:spAutoFit/>
+            </a:bodyPr>
+            <a:lstStyle/>
+            <a:p>
+              <a:r>
+                <a:rPr lang="en-CN" i="1" dirty="0">
+                  <a:latin typeface="Times New Roman" panose="02020603050405020304" pitchFamily="18" charset="0"/>
+                  <a:cs typeface="Times New Roman" panose="02020603050405020304" pitchFamily="18" charset="0"/>
+                </a:rPr>
+                <a:t>c</a:t>
+              </a:r>
+            </a:p>
+          </p:txBody>
+        </p:sp>
+        <p:sp>
+          <p:nvSpPr>
+            <p:cNvPr id="76" name="TextBox 75">
+              <a:extLst>
+                <a:ext uri="{FF2B5EF4-FFF2-40B4-BE49-F238E27FC236}">
+                  <a16:creationId xmlns:a16="http://schemas.microsoft.com/office/drawing/2014/main" id="{1582894B-89E0-EC45-A744-46C959FEE397}"/>
+                </a:ext>
+              </a:extLst>
+            </p:cNvPr>
+            <p:cNvSpPr txBox="1"/>
+            <p:nvPr/>
+          </p:nvSpPr>
+          <p:spPr>
+            <a:xfrm>
+              <a:off x="667516" y="5544070"/>
+              <a:ext cx="300082" cy="369332"/>
+            </a:xfrm>
+            <a:prstGeom prst="rect">
+              <a:avLst/>
+            </a:prstGeom>
+            <a:noFill/>
+          </p:spPr>
+          <p:txBody>
+            <a:bodyPr wrap="none" rtlCol="0">
+              <a:spAutoFit/>
+            </a:bodyPr>
+            <a:lstStyle/>
+            <a:p>
+              <a:r>
+                <a:rPr lang="en-CN" i="1" dirty="0">
+                  <a:latin typeface="Times New Roman" panose="02020603050405020304" pitchFamily="18" charset="0"/>
+                  <a:cs typeface="Times New Roman" panose="02020603050405020304" pitchFamily="18" charset="0"/>
+                </a:rPr>
+                <a:t>a</a:t>
+              </a:r>
+            </a:p>
+          </p:txBody>
+        </p:sp>
+        <p:cxnSp>
+          <p:nvCxnSpPr>
+            <p:cNvPr id="77" name="Straight Connector 76">
+              <a:extLst>
+                <a:ext uri="{FF2B5EF4-FFF2-40B4-BE49-F238E27FC236}">
+                  <a16:creationId xmlns:a16="http://schemas.microsoft.com/office/drawing/2014/main" id="{DF53EA20-43D5-1846-8B8D-C3754CC70F86}"/>
+                </a:ext>
+              </a:extLst>
+            </p:cNvPr>
+            <p:cNvCxnSpPr>
+              <a:cxnSpLocks/>
+              <a:stCxn id="71" idx="3"/>
+              <a:endCxn id="73" idx="7"/>
+            </p:cNvCxnSpPr>
+            <p:nvPr/>
+          </p:nvCxnSpPr>
+          <p:spPr>
+            <a:xfrm flipH="1">
+              <a:off x="1468340" y="4502922"/>
+              <a:ext cx="270614" cy="322820"/>
+            </a:xfrm>
+            <a:prstGeom prst="line">
+              <a:avLst/>
+            </a:prstGeom>
+          </p:spPr>
+          <p:style>
+            <a:lnRef idx="2">
+              <a:schemeClr val="dk1"/>
+            </a:lnRef>
+            <a:fillRef idx="0">
+              <a:schemeClr val="dk1"/>
+            </a:fillRef>
+            <a:effectRef idx="1">
+              <a:schemeClr val="dk1"/>
+            </a:effectRef>
+            <a:fontRef idx="minor">
+              <a:schemeClr val="tx1"/>
+            </a:fontRef>
+          </p:style>
+        </p:cxnSp>
+        <p:cxnSp>
+          <p:nvCxnSpPr>
+            <p:cNvPr id="78" name="Straight Connector 77">
+              <a:extLst>
+                <a:ext uri="{FF2B5EF4-FFF2-40B4-BE49-F238E27FC236}">
+                  <a16:creationId xmlns:a16="http://schemas.microsoft.com/office/drawing/2014/main" id="{50ACA540-A104-C449-BC13-2CDEBC8EF3FA}"/>
+                </a:ext>
+              </a:extLst>
+            </p:cNvPr>
+            <p:cNvCxnSpPr>
+              <a:cxnSpLocks/>
+              <a:stCxn id="74" idx="0"/>
+              <a:endCxn id="83" idx="3"/>
+            </p:cNvCxnSpPr>
+            <p:nvPr/>
+          </p:nvCxnSpPr>
+          <p:spPr>
+            <a:xfrm flipV="1">
+              <a:off x="1413630" y="5865322"/>
+              <a:ext cx="238868" cy="441936"/>
+            </a:xfrm>
+            <a:prstGeom prst="line">
+              <a:avLst/>
+            </a:prstGeom>
+          </p:spPr>
+          <p:style>
+            <a:lnRef idx="2">
+              <a:schemeClr val="dk1"/>
+            </a:lnRef>
+            <a:fillRef idx="0">
+              <a:schemeClr val="dk1"/>
+            </a:fillRef>
+            <a:effectRef idx="1">
+              <a:schemeClr val="dk1"/>
+            </a:effectRef>
+            <a:fontRef idx="minor">
+              <a:schemeClr val="tx1"/>
+            </a:fontRef>
+          </p:style>
+        </p:cxnSp>
+        <p:cxnSp>
+          <p:nvCxnSpPr>
+            <p:cNvPr id="79" name="Straight Connector 78">
+              <a:extLst>
+                <a:ext uri="{FF2B5EF4-FFF2-40B4-BE49-F238E27FC236}">
+                  <a16:creationId xmlns:a16="http://schemas.microsoft.com/office/drawing/2014/main" id="{76DE04A3-E5BD-0746-9A7F-51D8B8E91EC6}"/>
+                </a:ext>
+              </a:extLst>
+            </p:cNvPr>
+            <p:cNvCxnSpPr>
+              <a:cxnSpLocks/>
+              <a:stCxn id="71" idx="5"/>
+              <a:endCxn id="72" idx="1"/>
+            </p:cNvCxnSpPr>
+            <p:nvPr/>
+          </p:nvCxnSpPr>
+          <p:spPr>
+            <a:xfrm>
+              <a:off x="2114873" y="4502922"/>
+              <a:ext cx="270286" cy="268882"/>
+            </a:xfrm>
+            <a:prstGeom prst="line">
+              <a:avLst/>
+            </a:prstGeom>
+          </p:spPr>
+          <p:style>
+            <a:lnRef idx="2">
+              <a:schemeClr val="dk1"/>
+            </a:lnRef>
+            <a:fillRef idx="0">
+              <a:schemeClr val="dk1"/>
+            </a:fillRef>
+            <a:effectRef idx="1">
+              <a:schemeClr val="dk1"/>
+            </a:effectRef>
+            <a:fontRef idx="minor">
+              <a:schemeClr val="tx1"/>
+            </a:fontRef>
+          </p:style>
+        </p:cxnSp>
+        <p:cxnSp>
+          <p:nvCxnSpPr>
+            <p:cNvPr id="80" name="Straight Connector 79">
+              <a:extLst>
+                <a:ext uri="{FF2B5EF4-FFF2-40B4-BE49-F238E27FC236}">
+                  <a16:creationId xmlns:a16="http://schemas.microsoft.com/office/drawing/2014/main" id="{22B87449-3824-2242-A2EE-938837E21738}"/>
+                </a:ext>
+              </a:extLst>
+            </p:cNvPr>
+            <p:cNvCxnSpPr>
+              <a:cxnSpLocks/>
+              <a:stCxn id="75" idx="0"/>
+              <a:endCxn id="83" idx="5"/>
+            </p:cNvCxnSpPr>
+            <p:nvPr/>
+          </p:nvCxnSpPr>
+          <p:spPr>
+            <a:xfrm flipH="1" flipV="1">
+              <a:off x="2028417" y="5865322"/>
+              <a:ext cx="236497" cy="456028"/>
+            </a:xfrm>
+            <a:prstGeom prst="line">
+              <a:avLst/>
+            </a:prstGeom>
+          </p:spPr>
+          <p:style>
+            <a:lnRef idx="2">
+              <a:schemeClr val="dk1"/>
+            </a:lnRef>
+            <a:fillRef idx="0">
+              <a:schemeClr val="dk1"/>
+            </a:fillRef>
+            <a:effectRef idx="1">
+              <a:schemeClr val="dk1"/>
+            </a:effectRef>
+            <a:fontRef idx="minor">
+              <a:schemeClr val="tx1"/>
+            </a:fontRef>
+          </p:style>
+        </p:cxnSp>
+        <p:cxnSp>
+          <p:nvCxnSpPr>
+            <p:cNvPr id="81" name="Straight Connector 80">
+              <a:extLst>
+                <a:ext uri="{FF2B5EF4-FFF2-40B4-BE49-F238E27FC236}">
+                  <a16:creationId xmlns:a16="http://schemas.microsoft.com/office/drawing/2014/main" id="{9079A428-D6A3-8143-9FDC-F39217563E2E}"/>
+                </a:ext>
+              </a:extLst>
+            </p:cNvPr>
+            <p:cNvCxnSpPr>
+              <a:cxnSpLocks/>
+              <a:stCxn id="76" idx="0"/>
+              <a:endCxn id="73" idx="3"/>
+            </p:cNvCxnSpPr>
+            <p:nvPr/>
+          </p:nvCxnSpPr>
+          <p:spPr>
+            <a:xfrm flipV="1">
+              <a:off x="817557" y="5209179"/>
+              <a:ext cx="274864" cy="334891"/>
+            </a:xfrm>
+            <a:prstGeom prst="line">
+              <a:avLst/>
+            </a:prstGeom>
+          </p:spPr>
+          <p:style>
+            <a:lnRef idx="2">
+              <a:schemeClr val="dk1"/>
+            </a:lnRef>
+            <a:fillRef idx="0">
+              <a:schemeClr val="dk1"/>
+            </a:fillRef>
+            <a:effectRef idx="1">
+              <a:schemeClr val="dk1"/>
+            </a:effectRef>
+            <a:fontRef idx="minor">
+              <a:schemeClr val="tx1"/>
+            </a:fontRef>
+          </p:style>
+        </p:cxnSp>
+        <p:cxnSp>
+          <p:nvCxnSpPr>
+            <p:cNvPr id="82" name="Straight Connector 81">
+              <a:extLst>
+                <a:ext uri="{FF2B5EF4-FFF2-40B4-BE49-F238E27FC236}">
+                  <a16:creationId xmlns:a16="http://schemas.microsoft.com/office/drawing/2014/main" id="{9E2122EB-AF27-0341-8E01-61309B22CCBC}"/>
+                </a:ext>
+              </a:extLst>
+            </p:cNvPr>
+            <p:cNvCxnSpPr>
+              <a:cxnSpLocks/>
+              <a:stCxn id="83" idx="1"/>
+              <a:endCxn id="73" idx="5"/>
+            </p:cNvCxnSpPr>
+            <p:nvPr/>
+          </p:nvCxnSpPr>
+          <p:spPr>
+            <a:xfrm flipH="1" flipV="1">
+              <a:off x="1468340" y="5209179"/>
+              <a:ext cx="184158" cy="272706"/>
+            </a:xfrm>
+            <a:prstGeom prst="line">
+              <a:avLst/>
+            </a:prstGeom>
+          </p:spPr>
+          <p:style>
+            <a:lnRef idx="2">
+              <a:schemeClr val="dk1"/>
+            </a:lnRef>
+            <a:fillRef idx="0">
+              <a:schemeClr val="dk1"/>
+            </a:fillRef>
+            <a:effectRef idx="1">
+              <a:schemeClr val="dk1"/>
+            </a:effectRef>
+            <a:fontRef idx="minor">
+              <a:schemeClr val="tx1"/>
+            </a:fontRef>
+          </p:style>
+        </p:cxnSp>
+        <p:sp>
+          <p:nvSpPr>
+            <p:cNvPr id="83" name="Oval 82">
+              <a:extLst>
+                <a:ext uri="{FF2B5EF4-FFF2-40B4-BE49-F238E27FC236}">
+                  <a16:creationId xmlns:a16="http://schemas.microsoft.com/office/drawing/2014/main" id="{5EC26AE0-2932-D441-847A-259DA9E1A6B1}"/>
+                </a:ext>
+              </a:extLst>
+            </p:cNvPr>
+            <p:cNvSpPr/>
+            <p:nvPr/>
+          </p:nvSpPr>
+          <p:spPr>
+            <a:xfrm>
+              <a:off x="1574643" y="5402473"/>
+              <a:ext cx="531629" cy="542261"/>
+            </a:xfrm>
+            <a:prstGeom prst="ellipse">
+              <a:avLst/>
+            </a:prstGeom>
+            <a:solidFill>
+              <a:schemeClr val="bg1">
+                <a:lumMod val="65000"/>
+              </a:schemeClr>
+            </a:solidFill>
+          </p:spPr>
+          <p:style>
+            <a:lnRef idx="2">
+              <a:schemeClr val="dk1"/>
+            </a:lnRef>
+            <a:fillRef idx="1">
+              <a:schemeClr val="lt1"/>
+            </a:fillRef>
+            <a:effectRef idx="0">
+              <a:schemeClr val="dk1"/>
+            </a:effectRef>
+            <a:fontRef idx="minor">
+              <a:schemeClr val="dk1"/>
+            </a:fontRef>
+          </p:style>
+          <p:txBody>
+            <a:bodyPr lIns="36000" tIns="36000" rIns="36000" bIns="36000" rtlCol="0" anchor="ctr" anchorCtr="1"/>
+            <a:lstStyle/>
+            <a:p>
+              <a:pPr algn="ctr"/>
+              <a:r>
+                <a:rPr lang="en-CN" i="1" dirty="0">
+                  <a:latin typeface="Times New Roman" panose="02020603050405020304" pitchFamily="18" charset="0"/>
+                  <a:cs typeface="Times New Roman" panose="02020603050405020304" pitchFamily="18" charset="0"/>
+                </a:rPr>
+                <a:t>y</a:t>
+              </a:r>
+            </a:p>
+          </p:txBody>
+        </p:sp>
+      </p:grpSp>
+      <p:cxnSp>
+        <p:nvCxnSpPr>
+          <p:cNvPr id="111" name="Straight Arrow Connector 110">
+            <a:extLst>
+              <a:ext uri="{FF2B5EF4-FFF2-40B4-BE49-F238E27FC236}">
+                <a16:creationId xmlns:a16="http://schemas.microsoft.com/office/drawing/2014/main" id="{71D1CA3A-3541-9448-8C70-15CD5B6068E1}"/>
+              </a:ext>
+            </a:extLst>
+          </p:cNvPr>
+          <p:cNvCxnSpPr>
+            <a:cxnSpLocks/>
+          </p:cNvCxnSpPr>
+          <p:nvPr/>
+        </p:nvCxnSpPr>
+        <p:spPr>
+          <a:xfrm flipV="1">
+            <a:off x="3562550" y="4094642"/>
+            <a:ext cx="547393" cy="349768"/>
+          </a:xfrm>
+          <a:prstGeom prst="straightConnector1">
+            <a:avLst/>
+          </a:prstGeom>
+          <a:ln>
+            <a:tailEnd type="triangle"/>
+          </a:ln>
+        </p:spPr>
+        <p:style>
+          <a:lnRef idx="3">
+            <a:schemeClr val="dk1"/>
+          </a:lnRef>
+          <a:fillRef idx="0">
+            <a:schemeClr val="dk1"/>
+          </a:fillRef>
+          <a:effectRef idx="2">
+            <a:schemeClr val="dk1"/>
+          </a:effectRef>
+          <a:fontRef idx="minor">
+            <a:schemeClr val="tx1"/>
+          </a:fontRef>
+        </p:style>
+      </p:cxnSp>
+      <p:grpSp>
+        <p:nvGrpSpPr>
+          <p:cNvPr id="147" name="Group 146">
+            <a:extLst>
+              <a:ext uri="{FF2B5EF4-FFF2-40B4-BE49-F238E27FC236}">
+                <a16:creationId xmlns:a16="http://schemas.microsoft.com/office/drawing/2014/main" id="{D1EE462E-D554-0645-9A9F-373155F55737}"/>
+              </a:ext>
+            </a:extLst>
+          </p:cNvPr>
+          <p:cNvGrpSpPr/>
+          <p:nvPr/>
+        </p:nvGrpSpPr>
+        <p:grpSpPr>
+          <a:xfrm>
+            <a:off x="7927039" y="612075"/>
+            <a:ext cx="3428732" cy="2756727"/>
+            <a:chOff x="7927039" y="612075"/>
+            <a:chExt cx="3428732" cy="2756727"/>
+          </a:xfrm>
+        </p:grpSpPr>
+        <p:sp>
+          <p:nvSpPr>
+            <p:cNvPr id="116" name="Oval 115">
+              <a:extLst>
+                <a:ext uri="{FF2B5EF4-FFF2-40B4-BE49-F238E27FC236}">
+                  <a16:creationId xmlns:a16="http://schemas.microsoft.com/office/drawing/2014/main" id="{452ECCEB-8B85-CD48-8ECE-07B44C319CB5}"/>
+                </a:ext>
+              </a:extLst>
+            </p:cNvPr>
+            <p:cNvSpPr/>
+            <p:nvPr/>
+          </p:nvSpPr>
+          <p:spPr>
+            <a:xfrm>
+              <a:off x="8816629" y="612075"/>
+              <a:ext cx="531629" cy="542261"/>
+            </a:xfrm>
+            <a:prstGeom prst="ellipse">
+              <a:avLst/>
+            </a:prstGeom>
+          </p:spPr>
+          <p:style>
+            <a:lnRef idx="2">
+              <a:schemeClr val="dk1">
+                <a:shade val="50000"/>
+              </a:schemeClr>
+            </a:lnRef>
+            <a:fillRef idx="1">
+              <a:schemeClr val="dk1"/>
+            </a:fillRef>
+            <a:effectRef idx="0">
+              <a:schemeClr val="dk1"/>
+            </a:effectRef>
+            <a:fontRef idx="minor">
+              <a:schemeClr val="lt1"/>
+            </a:fontRef>
+          </p:style>
+          <p:txBody>
+            <a:bodyPr lIns="36000" tIns="36000" rIns="36000" bIns="36000" rtlCol="0" anchor="ctr" anchorCtr="1"/>
+            <a:lstStyle/>
+            <a:p>
+              <a:pPr algn="ctr"/>
+              <a:r>
+                <a:rPr lang="en-CN" i="1" dirty="0">
+                  <a:latin typeface="Times New Roman" panose="02020603050405020304" pitchFamily="18" charset="0"/>
+                  <a:cs typeface="Times New Roman" panose="02020603050405020304" pitchFamily="18" charset="0"/>
+                </a:rPr>
+                <a:t>x</a:t>
+              </a:r>
+            </a:p>
+          </p:txBody>
+        </p:sp>
+        <p:sp>
+          <p:nvSpPr>
+            <p:cNvPr id="117" name="Oval 116">
+              <a:extLst>
+                <a:ext uri="{FF2B5EF4-FFF2-40B4-BE49-F238E27FC236}">
+                  <a16:creationId xmlns:a16="http://schemas.microsoft.com/office/drawing/2014/main" id="{B2E42E68-48CF-4344-A7FC-ED11C361866D}"/>
+                </a:ext>
+              </a:extLst>
+            </p:cNvPr>
+            <p:cNvSpPr/>
+            <p:nvPr/>
+          </p:nvSpPr>
+          <p:spPr>
+            <a:xfrm>
+              <a:off x="7927039" y="1242939"/>
+              <a:ext cx="531629" cy="542261"/>
+            </a:xfrm>
+            <a:prstGeom prst="ellipse">
+              <a:avLst/>
+            </a:prstGeom>
+            <a:noFill/>
+            <a:ln>
+              <a:noFill/>
+            </a:ln>
+          </p:spPr>
+          <p:style>
+            <a:lnRef idx="2">
+              <a:schemeClr val="dk1"/>
+            </a:lnRef>
+            <a:fillRef idx="1">
+              <a:schemeClr val="lt1"/>
+            </a:fillRef>
+            <a:effectRef idx="0">
+              <a:schemeClr val="dk1"/>
+            </a:effectRef>
+            <a:fontRef idx="minor">
+              <a:schemeClr val="dk1"/>
+            </a:fontRef>
+          </p:style>
+          <p:txBody>
+            <a:bodyPr lIns="36000" tIns="36000" rIns="36000" bIns="36000" rtlCol="0" anchor="ctr" anchorCtr="1"/>
+            <a:lstStyle/>
+            <a:p>
+              <a:pPr algn="ctr"/>
+              <a:r>
+                <a:rPr lang="en-CN" i="1" dirty="0">
+                  <a:latin typeface="Times New Roman" panose="02020603050405020304" pitchFamily="18" charset="0"/>
+                  <a:cs typeface="Times New Roman" panose="02020603050405020304" pitchFamily="18" charset="0"/>
+                </a:rPr>
+                <a:t>a</a:t>
+              </a:r>
+            </a:p>
+          </p:txBody>
+        </p:sp>
+        <p:sp>
+          <p:nvSpPr>
+            <p:cNvPr id="118" name="Oval 117">
+              <a:extLst>
+                <a:ext uri="{FF2B5EF4-FFF2-40B4-BE49-F238E27FC236}">
+                  <a16:creationId xmlns:a16="http://schemas.microsoft.com/office/drawing/2014/main" id="{0990B3D8-F2B1-2A43-85ED-250FEC2BA679}"/>
+                </a:ext>
+              </a:extLst>
+            </p:cNvPr>
+            <p:cNvSpPr/>
+            <p:nvPr/>
+          </p:nvSpPr>
+          <p:spPr>
+            <a:xfrm>
+              <a:off x="9577642" y="1282070"/>
+              <a:ext cx="531629" cy="542261"/>
+            </a:xfrm>
+            <a:prstGeom prst="ellipse">
+              <a:avLst/>
+            </a:prstGeom>
+            <a:solidFill>
+              <a:schemeClr val="bg1">
+                <a:lumMod val="65000"/>
+              </a:schemeClr>
+            </a:solidFill>
+          </p:spPr>
+          <p:style>
+            <a:lnRef idx="2">
+              <a:schemeClr val="dk1"/>
+            </a:lnRef>
+            <a:fillRef idx="1">
+              <a:schemeClr val="lt1"/>
+            </a:fillRef>
+            <a:effectRef idx="0">
+              <a:schemeClr val="dk1"/>
+            </a:effectRef>
+            <a:fontRef idx="minor">
+              <a:schemeClr val="dk1"/>
+            </a:fontRef>
+          </p:style>
+          <p:txBody>
+            <a:bodyPr lIns="36000" tIns="36000" rIns="36000" bIns="36000" rtlCol="0" anchor="ctr" anchorCtr="1"/>
+            <a:lstStyle/>
+            <a:p>
+              <a:pPr algn="ctr"/>
+              <a:r>
+                <a:rPr lang="en-CN" i="1" dirty="0">
+                  <a:latin typeface="Times New Roman" panose="02020603050405020304" pitchFamily="18" charset="0"/>
+                  <a:cs typeface="Times New Roman" panose="02020603050405020304" pitchFamily="18" charset="0"/>
+                </a:rPr>
+                <a:t>y</a:t>
+              </a:r>
+            </a:p>
+          </p:txBody>
+        </p:sp>
+        <p:sp>
+          <p:nvSpPr>
+            <p:cNvPr id="119" name="TextBox 118">
+              <a:extLst>
+                <a:ext uri="{FF2B5EF4-FFF2-40B4-BE49-F238E27FC236}">
+                  <a16:creationId xmlns:a16="http://schemas.microsoft.com/office/drawing/2014/main" id="{8D30C069-2F98-EE4E-BB65-AB8D9FDF3C1D}"/>
+                </a:ext>
+              </a:extLst>
+            </p:cNvPr>
+            <p:cNvSpPr txBox="1"/>
+            <p:nvPr/>
+          </p:nvSpPr>
+          <p:spPr>
+            <a:xfrm>
+              <a:off x="10126697" y="2957623"/>
+              <a:ext cx="287258" cy="369332"/>
+            </a:xfrm>
+            <a:prstGeom prst="rect">
+              <a:avLst/>
+            </a:prstGeom>
+            <a:noFill/>
+          </p:spPr>
+          <p:txBody>
+            <a:bodyPr wrap="none" rtlCol="0">
+              <a:spAutoFit/>
+            </a:bodyPr>
+            <a:lstStyle/>
+            <a:p>
+              <a:r>
+                <a:rPr lang="en-CN" i="1" dirty="0">
+                  <a:latin typeface="Times New Roman" panose="02020603050405020304" pitchFamily="18" charset="0"/>
+                  <a:cs typeface="Times New Roman" panose="02020603050405020304" pitchFamily="18" charset="0"/>
+                </a:rPr>
+                <a:t>c</a:t>
+              </a:r>
+            </a:p>
+          </p:txBody>
+        </p:sp>
+        <p:sp>
+          <p:nvSpPr>
+            <p:cNvPr id="120" name="TextBox 119">
+              <a:extLst>
+                <a:ext uri="{FF2B5EF4-FFF2-40B4-BE49-F238E27FC236}">
+                  <a16:creationId xmlns:a16="http://schemas.microsoft.com/office/drawing/2014/main" id="{D2156F6A-7E13-E74B-B16E-C8F24A63FB75}"/>
+                </a:ext>
+              </a:extLst>
+            </p:cNvPr>
+            <p:cNvSpPr txBox="1"/>
+            <p:nvPr/>
+          </p:nvSpPr>
+          <p:spPr>
+            <a:xfrm>
+              <a:off x="11055689" y="2999470"/>
+              <a:ext cx="300082" cy="369332"/>
+            </a:xfrm>
+            <a:prstGeom prst="rect">
+              <a:avLst/>
+            </a:prstGeom>
+            <a:noFill/>
+          </p:spPr>
+          <p:txBody>
+            <a:bodyPr wrap="square" rtlCol="0">
+              <a:spAutoFit/>
+            </a:bodyPr>
+            <a:lstStyle/>
+            <a:p>
+              <a:r>
+                <a:rPr lang="en-CN" i="1" dirty="0">
+                  <a:latin typeface="Times New Roman" panose="02020603050405020304" pitchFamily="18" charset="0"/>
+                  <a:cs typeface="Times New Roman" panose="02020603050405020304" pitchFamily="18" charset="0"/>
+                </a:rPr>
+                <a:t>d</a:t>
+              </a:r>
+            </a:p>
+          </p:txBody>
+        </p:sp>
+        <p:sp>
+          <p:nvSpPr>
+            <p:cNvPr id="121" name="TextBox 120">
+              <a:extLst>
+                <a:ext uri="{FF2B5EF4-FFF2-40B4-BE49-F238E27FC236}">
+                  <a16:creationId xmlns:a16="http://schemas.microsoft.com/office/drawing/2014/main" id="{0C3B85CC-D633-4842-8E91-8E26CE4E7D0D}"/>
+                </a:ext>
+              </a:extLst>
+            </p:cNvPr>
+            <p:cNvSpPr txBox="1"/>
+            <p:nvPr/>
+          </p:nvSpPr>
+          <p:spPr>
+            <a:xfrm>
+              <a:off x="9217182" y="2075696"/>
+              <a:ext cx="300082" cy="369332"/>
+            </a:xfrm>
+            <a:prstGeom prst="rect">
+              <a:avLst/>
+            </a:prstGeom>
+            <a:noFill/>
+          </p:spPr>
+          <p:txBody>
+            <a:bodyPr wrap="none" rtlCol="0">
+              <a:spAutoFit/>
+            </a:bodyPr>
+            <a:lstStyle/>
+            <a:p>
+              <a:r>
+                <a:rPr lang="en-CN" i="1" dirty="0">
+                  <a:latin typeface="Times New Roman" panose="02020603050405020304" pitchFamily="18" charset="0"/>
+                  <a:cs typeface="Times New Roman" panose="02020603050405020304" pitchFamily="18" charset="0"/>
+                </a:rPr>
+                <a:t>b</a:t>
+              </a:r>
+            </a:p>
+          </p:txBody>
+        </p:sp>
+        <p:cxnSp>
+          <p:nvCxnSpPr>
+            <p:cNvPr id="122" name="Straight Connector 121">
+              <a:extLst>
+                <a:ext uri="{FF2B5EF4-FFF2-40B4-BE49-F238E27FC236}">
+                  <a16:creationId xmlns:a16="http://schemas.microsoft.com/office/drawing/2014/main" id="{B44DA1E0-014A-5148-A942-FC81266D0224}"/>
+                </a:ext>
+              </a:extLst>
+            </p:cNvPr>
+            <p:cNvCxnSpPr>
+              <a:cxnSpLocks/>
+              <a:stCxn id="116" idx="3"/>
+              <a:endCxn id="117" idx="7"/>
+            </p:cNvCxnSpPr>
+            <p:nvPr/>
+          </p:nvCxnSpPr>
+          <p:spPr>
+            <a:xfrm flipH="1">
+              <a:off x="8380813" y="1074924"/>
+              <a:ext cx="513671" cy="247427"/>
+            </a:xfrm>
+            <a:prstGeom prst="line">
+              <a:avLst/>
+            </a:prstGeom>
+          </p:spPr>
+          <p:style>
+            <a:lnRef idx="2">
+              <a:schemeClr val="dk1"/>
+            </a:lnRef>
+            <a:fillRef idx="0">
+              <a:schemeClr val="dk1"/>
+            </a:fillRef>
+            <a:effectRef idx="1">
+              <a:schemeClr val="dk1"/>
+            </a:effectRef>
+            <a:fontRef idx="minor">
+              <a:schemeClr val="tx1"/>
+            </a:fontRef>
+          </p:style>
+        </p:cxnSp>
+        <p:cxnSp>
+          <p:nvCxnSpPr>
+            <p:cNvPr id="123" name="Straight Connector 122">
+              <a:extLst>
+                <a:ext uri="{FF2B5EF4-FFF2-40B4-BE49-F238E27FC236}">
+                  <a16:creationId xmlns:a16="http://schemas.microsoft.com/office/drawing/2014/main" id="{FE15E0C4-9ADB-684B-9D53-A040D6198E9A}"/>
+                </a:ext>
+              </a:extLst>
+            </p:cNvPr>
+            <p:cNvCxnSpPr>
+              <a:cxnSpLocks/>
+              <a:stCxn id="119" idx="0"/>
+              <a:endCxn id="128" idx="3"/>
+            </p:cNvCxnSpPr>
+            <p:nvPr/>
+          </p:nvCxnSpPr>
+          <p:spPr>
+            <a:xfrm flipV="1">
+              <a:off x="10270326" y="2487120"/>
+              <a:ext cx="179786" cy="470503"/>
+            </a:xfrm>
+            <a:prstGeom prst="line">
+              <a:avLst/>
+            </a:prstGeom>
+          </p:spPr>
+          <p:style>
+            <a:lnRef idx="2">
+              <a:schemeClr val="dk1"/>
+            </a:lnRef>
+            <a:fillRef idx="0">
+              <a:schemeClr val="dk1"/>
+            </a:fillRef>
+            <a:effectRef idx="1">
+              <a:schemeClr val="dk1"/>
+            </a:effectRef>
+            <a:fontRef idx="minor">
+              <a:schemeClr val="tx1"/>
+            </a:fontRef>
+          </p:style>
+        </p:cxnSp>
+        <p:cxnSp>
+          <p:nvCxnSpPr>
+            <p:cNvPr id="124" name="Straight Connector 123">
+              <a:extLst>
+                <a:ext uri="{FF2B5EF4-FFF2-40B4-BE49-F238E27FC236}">
+                  <a16:creationId xmlns:a16="http://schemas.microsoft.com/office/drawing/2014/main" id="{4948897C-8EDD-5145-A2D6-CF967BD2E977}"/>
+                </a:ext>
+              </a:extLst>
+            </p:cNvPr>
+            <p:cNvCxnSpPr>
+              <a:cxnSpLocks/>
+              <a:stCxn id="116" idx="5"/>
+              <a:endCxn id="118" idx="1"/>
+            </p:cNvCxnSpPr>
+            <p:nvPr/>
+          </p:nvCxnSpPr>
+          <p:spPr>
+            <a:xfrm>
+              <a:off x="9270403" y="1074924"/>
+              <a:ext cx="385094" cy="286558"/>
+            </a:xfrm>
+            <a:prstGeom prst="line">
+              <a:avLst/>
+            </a:prstGeom>
+          </p:spPr>
+          <p:style>
+            <a:lnRef idx="2">
+              <a:schemeClr val="dk1"/>
+            </a:lnRef>
+            <a:fillRef idx="0">
+              <a:schemeClr val="dk1"/>
+            </a:fillRef>
+            <a:effectRef idx="1">
+              <a:schemeClr val="dk1"/>
+            </a:effectRef>
+            <a:fontRef idx="minor">
+              <a:schemeClr val="tx1"/>
+            </a:fontRef>
+          </p:style>
+        </p:cxnSp>
+        <p:cxnSp>
+          <p:nvCxnSpPr>
+            <p:cNvPr id="125" name="Straight Connector 124">
+              <a:extLst>
+                <a:ext uri="{FF2B5EF4-FFF2-40B4-BE49-F238E27FC236}">
+                  <a16:creationId xmlns:a16="http://schemas.microsoft.com/office/drawing/2014/main" id="{7074AE2C-3672-B84C-9730-58379D02A167}"/>
+                </a:ext>
+              </a:extLst>
+            </p:cNvPr>
+            <p:cNvCxnSpPr>
+              <a:cxnSpLocks/>
+              <a:stCxn id="120" idx="0"/>
+              <a:endCxn id="128" idx="5"/>
+            </p:cNvCxnSpPr>
+            <p:nvPr/>
+          </p:nvCxnSpPr>
+          <p:spPr>
+            <a:xfrm flipH="1" flipV="1">
+              <a:off x="10826031" y="2487120"/>
+              <a:ext cx="379699" cy="512350"/>
+            </a:xfrm>
+            <a:prstGeom prst="line">
+              <a:avLst/>
+            </a:prstGeom>
+          </p:spPr>
+          <p:style>
+            <a:lnRef idx="2">
+              <a:schemeClr val="dk1"/>
+            </a:lnRef>
+            <a:fillRef idx="0">
+              <a:schemeClr val="dk1"/>
+            </a:fillRef>
+            <a:effectRef idx="1">
+              <a:schemeClr val="dk1"/>
+            </a:effectRef>
+            <a:fontRef idx="minor">
+              <a:schemeClr val="tx1"/>
+            </a:fontRef>
+          </p:style>
+        </p:cxnSp>
+        <p:cxnSp>
+          <p:nvCxnSpPr>
+            <p:cNvPr id="126" name="Straight Connector 125">
+              <a:extLst>
+                <a:ext uri="{FF2B5EF4-FFF2-40B4-BE49-F238E27FC236}">
+                  <a16:creationId xmlns:a16="http://schemas.microsoft.com/office/drawing/2014/main" id="{82F4D17F-A49E-7D46-97BA-1A97E8E14723}"/>
+                </a:ext>
+              </a:extLst>
+            </p:cNvPr>
+            <p:cNvCxnSpPr>
+              <a:cxnSpLocks/>
+              <a:stCxn id="121" idx="0"/>
+              <a:endCxn id="118" idx="3"/>
+            </p:cNvCxnSpPr>
+            <p:nvPr/>
+          </p:nvCxnSpPr>
+          <p:spPr>
+            <a:xfrm flipV="1">
+              <a:off x="9367223" y="1744919"/>
+              <a:ext cx="288274" cy="330777"/>
+            </a:xfrm>
+            <a:prstGeom prst="line">
+              <a:avLst/>
+            </a:prstGeom>
+          </p:spPr>
+          <p:style>
+            <a:lnRef idx="2">
+              <a:schemeClr val="dk1"/>
+            </a:lnRef>
+            <a:fillRef idx="0">
+              <a:schemeClr val="dk1"/>
+            </a:fillRef>
+            <a:effectRef idx="1">
+              <a:schemeClr val="dk1"/>
+            </a:effectRef>
+            <a:fontRef idx="minor">
+              <a:schemeClr val="tx1"/>
+            </a:fontRef>
+          </p:style>
+        </p:cxnSp>
+        <p:cxnSp>
+          <p:nvCxnSpPr>
+            <p:cNvPr id="127" name="Straight Connector 126">
+              <a:extLst>
+                <a:ext uri="{FF2B5EF4-FFF2-40B4-BE49-F238E27FC236}">
+                  <a16:creationId xmlns:a16="http://schemas.microsoft.com/office/drawing/2014/main" id="{2935DDD3-8473-314B-9544-3E7D32B0CDAD}"/>
+                </a:ext>
+              </a:extLst>
+            </p:cNvPr>
+            <p:cNvCxnSpPr>
+              <a:cxnSpLocks/>
+              <a:stCxn id="128" idx="1"/>
+              <a:endCxn id="118" idx="5"/>
+            </p:cNvCxnSpPr>
+            <p:nvPr/>
+          </p:nvCxnSpPr>
+          <p:spPr>
+            <a:xfrm flipH="1" flipV="1">
+              <a:off x="10031416" y="1744919"/>
+              <a:ext cx="418696" cy="358764"/>
+            </a:xfrm>
+            <a:prstGeom prst="line">
+              <a:avLst/>
+            </a:prstGeom>
+          </p:spPr>
+          <p:style>
+            <a:lnRef idx="2">
+              <a:schemeClr val="dk1"/>
+            </a:lnRef>
+            <a:fillRef idx="0">
+              <a:schemeClr val="dk1"/>
+            </a:fillRef>
+            <a:effectRef idx="1">
+              <a:schemeClr val="dk1"/>
+            </a:effectRef>
+            <a:fontRef idx="minor">
+              <a:schemeClr val="tx1"/>
+            </a:fontRef>
+          </p:style>
+        </p:cxnSp>
+        <p:sp>
+          <p:nvSpPr>
+            <p:cNvPr id="128" name="Oval 127">
+              <a:extLst>
+                <a:ext uri="{FF2B5EF4-FFF2-40B4-BE49-F238E27FC236}">
+                  <a16:creationId xmlns:a16="http://schemas.microsoft.com/office/drawing/2014/main" id="{C7C01421-ABA2-C94B-8FCE-5A5BF909DF6A}"/>
+                </a:ext>
+              </a:extLst>
+            </p:cNvPr>
+            <p:cNvSpPr/>
+            <p:nvPr/>
+          </p:nvSpPr>
+          <p:spPr>
+            <a:xfrm>
+              <a:off x="10372257" y="2024271"/>
+              <a:ext cx="531629" cy="542261"/>
+            </a:xfrm>
+            <a:prstGeom prst="ellipse">
+              <a:avLst/>
+            </a:prstGeom>
+            <a:solidFill>
+              <a:schemeClr val="bg1">
+                <a:lumMod val="65000"/>
+              </a:schemeClr>
+            </a:solidFill>
+          </p:spPr>
+          <p:style>
+            <a:lnRef idx="2">
+              <a:schemeClr val="dk1"/>
+            </a:lnRef>
+            <a:fillRef idx="1">
+              <a:schemeClr val="lt1"/>
+            </a:fillRef>
+            <a:effectRef idx="0">
+              <a:schemeClr val="dk1"/>
+            </a:effectRef>
+            <a:fontRef idx="minor">
+              <a:schemeClr val="dk1"/>
+            </a:fontRef>
+          </p:style>
+          <p:txBody>
+            <a:bodyPr lIns="36000" tIns="36000" rIns="36000" bIns="36000" rtlCol="0" anchor="ctr" anchorCtr="1"/>
+            <a:lstStyle/>
+            <a:p>
+              <a:pPr algn="ctr"/>
+              <a:r>
+                <a:rPr lang="en-CN" i="1" dirty="0">
+                  <a:latin typeface="Times New Roman" panose="02020603050405020304" pitchFamily="18" charset="0"/>
+                  <a:cs typeface="Times New Roman" panose="02020603050405020304" pitchFamily="18" charset="0"/>
+                </a:rPr>
+                <a:t>z</a:t>
+              </a:r>
+            </a:p>
+          </p:txBody>
+        </p:sp>
+      </p:grpSp>
+      <p:cxnSp>
+        <p:nvCxnSpPr>
+          <p:cNvPr id="141" name="Straight Arrow Connector 140">
+            <a:extLst>
+              <a:ext uri="{FF2B5EF4-FFF2-40B4-BE49-F238E27FC236}">
+                <a16:creationId xmlns:a16="http://schemas.microsoft.com/office/drawing/2014/main" id="{33FF1EDE-70B1-EC43-B150-E89DCB6DEFDC}"/>
+              </a:ext>
+            </a:extLst>
+          </p:cNvPr>
+          <p:cNvCxnSpPr>
+            <a:cxnSpLocks/>
+          </p:cNvCxnSpPr>
+          <p:nvPr/>
+        </p:nvCxnSpPr>
+        <p:spPr>
+          <a:xfrm flipH="1">
+            <a:off x="7647703" y="2623796"/>
+            <a:ext cx="601792" cy="329610"/>
+          </a:xfrm>
+          <a:prstGeom prst="straightConnector1">
+            <a:avLst/>
+          </a:prstGeom>
+          <a:ln>
+            <a:tailEnd type="triangle"/>
+          </a:ln>
+        </p:spPr>
+        <p:style>
+          <a:lnRef idx="3">
+            <a:schemeClr val="dk1"/>
+          </a:lnRef>
+          <a:fillRef idx="0">
+            <a:schemeClr val="dk1"/>
+          </a:fillRef>
+          <a:effectRef idx="2">
+            <a:schemeClr val="dk1"/>
+          </a:effectRef>
+          <a:fontRef idx="minor">
+            <a:schemeClr val="tx1"/>
+          </a:fontRef>
+        </p:style>
+      </p:cxnSp>
+      <p:grpSp>
+        <p:nvGrpSpPr>
+          <p:cNvPr id="176" name="Group 175">
+            <a:extLst>
+              <a:ext uri="{FF2B5EF4-FFF2-40B4-BE49-F238E27FC236}">
+                <a16:creationId xmlns:a16="http://schemas.microsoft.com/office/drawing/2014/main" id="{23E868A0-660D-FB4F-B068-B7426DC77C80}"/>
+              </a:ext>
+            </a:extLst>
+          </p:cNvPr>
+          <p:cNvGrpSpPr/>
+          <p:nvPr/>
+        </p:nvGrpSpPr>
+        <p:grpSpPr>
+          <a:xfrm>
+            <a:off x="1079464" y="798103"/>
+            <a:ext cx="2800133" cy="2700632"/>
+            <a:chOff x="7776397" y="3683461"/>
+            <a:chExt cx="2800133" cy="2700632"/>
+          </a:xfrm>
+        </p:grpSpPr>
+        <p:sp>
+          <p:nvSpPr>
+            <p:cNvPr id="149" name="Oval 148">
+              <a:extLst>
+                <a:ext uri="{FF2B5EF4-FFF2-40B4-BE49-F238E27FC236}">
+                  <a16:creationId xmlns:a16="http://schemas.microsoft.com/office/drawing/2014/main" id="{017B204F-65F7-984C-B02D-B2D18B241683}"/>
+                </a:ext>
+              </a:extLst>
+            </p:cNvPr>
+            <p:cNvSpPr/>
+            <p:nvPr/>
+          </p:nvSpPr>
+          <p:spPr>
+            <a:xfrm>
+              <a:off x="9398696" y="3683461"/>
+              <a:ext cx="531629" cy="542261"/>
+            </a:xfrm>
+            <a:prstGeom prst="ellipse">
+              <a:avLst/>
+            </a:prstGeom>
+          </p:spPr>
+          <p:style>
+            <a:lnRef idx="2">
+              <a:schemeClr val="dk1">
+                <a:shade val="50000"/>
+              </a:schemeClr>
+            </a:lnRef>
+            <a:fillRef idx="1">
+              <a:schemeClr val="dk1"/>
+            </a:fillRef>
+            <a:effectRef idx="0">
+              <a:schemeClr val="dk1"/>
+            </a:effectRef>
+            <a:fontRef idx="minor">
+              <a:schemeClr val="lt1"/>
+            </a:fontRef>
+          </p:style>
+          <p:txBody>
+            <a:bodyPr lIns="36000" tIns="36000" rIns="36000" bIns="36000" rtlCol="0" anchor="ctr" anchorCtr="1"/>
+            <a:lstStyle/>
+            <a:p>
+              <a:pPr algn="ctr"/>
+              <a:r>
+                <a:rPr lang="en-CN" i="1" dirty="0">
+                  <a:latin typeface="Times New Roman" panose="02020603050405020304" pitchFamily="18" charset="0"/>
+                  <a:cs typeface="Times New Roman" panose="02020603050405020304" pitchFamily="18" charset="0"/>
+                </a:rPr>
+                <a:t>z</a:t>
+              </a:r>
+            </a:p>
+          </p:txBody>
+        </p:sp>
+        <p:sp>
+          <p:nvSpPr>
+            <p:cNvPr id="150" name="Oval 149">
+              <a:extLst>
+                <a:ext uri="{FF2B5EF4-FFF2-40B4-BE49-F238E27FC236}">
+                  <a16:creationId xmlns:a16="http://schemas.microsoft.com/office/drawing/2014/main" id="{CCEC8046-5CB6-434C-A06D-270F1F6556A8}"/>
+                </a:ext>
+              </a:extLst>
+            </p:cNvPr>
+            <p:cNvSpPr/>
+            <p:nvPr/>
+          </p:nvSpPr>
+          <p:spPr>
+            <a:xfrm>
+              <a:off x="10044901" y="4335780"/>
+              <a:ext cx="531629" cy="542261"/>
+            </a:xfrm>
+            <a:prstGeom prst="ellipse">
+              <a:avLst/>
+            </a:prstGeom>
+            <a:noFill/>
+            <a:ln>
+              <a:noFill/>
+            </a:ln>
+          </p:spPr>
+          <p:style>
+            <a:lnRef idx="2">
+              <a:schemeClr val="dk1"/>
+            </a:lnRef>
+            <a:fillRef idx="1">
+              <a:schemeClr val="lt1"/>
+            </a:fillRef>
+            <a:effectRef idx="0">
+              <a:schemeClr val="dk1"/>
+            </a:effectRef>
+            <a:fontRef idx="minor">
+              <a:schemeClr val="dk1"/>
+            </a:fontRef>
+          </p:style>
+          <p:txBody>
+            <a:bodyPr lIns="36000" tIns="36000" rIns="36000" bIns="36000" rtlCol="0" anchor="ctr" anchorCtr="1"/>
+            <a:lstStyle/>
+            <a:p>
+              <a:pPr algn="ctr"/>
+              <a:r>
+                <a:rPr lang="en-CN" i="1" dirty="0">
+                  <a:latin typeface="Times New Roman" panose="02020603050405020304" pitchFamily="18" charset="0"/>
+                  <a:cs typeface="Times New Roman" panose="02020603050405020304" pitchFamily="18" charset="0"/>
+                </a:rPr>
+                <a:t>d</a:t>
+              </a:r>
+            </a:p>
+          </p:txBody>
+        </p:sp>
+        <p:sp>
+          <p:nvSpPr>
+            <p:cNvPr id="151" name="Oval 150">
+              <a:extLst>
+                <a:ext uri="{FF2B5EF4-FFF2-40B4-BE49-F238E27FC236}">
+                  <a16:creationId xmlns:a16="http://schemas.microsoft.com/office/drawing/2014/main" id="{02E13880-B2A1-334D-BD46-4F9494DDA2C5}"/>
+                </a:ext>
+              </a:extLst>
+            </p:cNvPr>
+            <p:cNvSpPr/>
+            <p:nvPr/>
+          </p:nvSpPr>
+          <p:spPr>
+            <a:xfrm>
+              <a:off x="8752163" y="4389718"/>
+              <a:ext cx="531629" cy="542261"/>
+            </a:xfrm>
+            <a:prstGeom prst="ellipse">
+              <a:avLst/>
+            </a:prstGeom>
+            <a:solidFill>
+              <a:schemeClr val="bg1">
+                <a:lumMod val="65000"/>
+              </a:schemeClr>
+            </a:solidFill>
+          </p:spPr>
+          <p:style>
+            <a:lnRef idx="2">
+              <a:schemeClr val="dk1"/>
+            </a:lnRef>
+            <a:fillRef idx="1">
+              <a:schemeClr val="lt1"/>
+            </a:fillRef>
+            <a:effectRef idx="0">
+              <a:schemeClr val="dk1"/>
+            </a:effectRef>
+            <a:fontRef idx="minor">
+              <a:schemeClr val="dk1"/>
+            </a:fontRef>
+          </p:style>
+          <p:txBody>
+            <a:bodyPr lIns="36000" tIns="36000" rIns="36000" bIns="36000" rtlCol="0" anchor="ctr" anchorCtr="1"/>
+            <a:lstStyle/>
+            <a:p>
+              <a:pPr algn="ctr"/>
+              <a:r>
+                <a:rPr lang="en-CN" i="1" dirty="0">
+                  <a:latin typeface="Times New Roman" panose="02020603050405020304" pitchFamily="18" charset="0"/>
+                  <a:cs typeface="Times New Roman" panose="02020603050405020304" pitchFamily="18" charset="0"/>
+                </a:rPr>
+                <a:t>y</a:t>
+              </a:r>
+            </a:p>
+          </p:txBody>
+        </p:sp>
+        <p:sp>
+          <p:nvSpPr>
+            <p:cNvPr id="152" name="TextBox 151">
+              <a:extLst>
+                <a:ext uri="{FF2B5EF4-FFF2-40B4-BE49-F238E27FC236}">
+                  <a16:creationId xmlns:a16="http://schemas.microsoft.com/office/drawing/2014/main" id="{05FE594D-105D-7648-B284-846486AEC09A}"/>
+                </a:ext>
+              </a:extLst>
+            </p:cNvPr>
+            <p:cNvSpPr txBox="1"/>
+            <p:nvPr/>
+          </p:nvSpPr>
+          <p:spPr>
+            <a:xfrm>
+              <a:off x="7776397" y="5991808"/>
+              <a:ext cx="300082" cy="369332"/>
+            </a:xfrm>
+            <a:prstGeom prst="rect">
+              <a:avLst/>
+            </a:prstGeom>
+            <a:noFill/>
+          </p:spPr>
+          <p:txBody>
+            <a:bodyPr wrap="none" rtlCol="0">
+              <a:spAutoFit/>
+            </a:bodyPr>
+            <a:lstStyle/>
+            <a:p>
+              <a:r>
+                <a:rPr lang="en-CN" i="1" dirty="0">
+                  <a:latin typeface="Times New Roman" panose="02020603050405020304" pitchFamily="18" charset="0"/>
+                  <a:cs typeface="Times New Roman" panose="02020603050405020304" pitchFamily="18" charset="0"/>
+                </a:rPr>
+                <a:t>a</a:t>
+              </a:r>
+            </a:p>
+          </p:txBody>
+        </p:sp>
+        <p:sp>
+          <p:nvSpPr>
+            <p:cNvPr id="153" name="TextBox 152">
+              <a:extLst>
+                <a:ext uri="{FF2B5EF4-FFF2-40B4-BE49-F238E27FC236}">
+                  <a16:creationId xmlns:a16="http://schemas.microsoft.com/office/drawing/2014/main" id="{9A83CBA1-C935-3E4C-B607-A746036BC130}"/>
+                </a:ext>
+              </a:extLst>
+            </p:cNvPr>
+            <p:cNvSpPr txBox="1"/>
+            <p:nvPr/>
+          </p:nvSpPr>
+          <p:spPr>
+            <a:xfrm>
+              <a:off x="8577177" y="6014761"/>
+              <a:ext cx="300082" cy="369332"/>
+            </a:xfrm>
+            <a:prstGeom prst="rect">
+              <a:avLst/>
+            </a:prstGeom>
+            <a:noFill/>
+          </p:spPr>
+          <p:txBody>
+            <a:bodyPr wrap="square" rtlCol="0">
+              <a:spAutoFit/>
+            </a:bodyPr>
+            <a:lstStyle/>
+            <a:p>
+              <a:r>
+                <a:rPr lang="en-CN" i="1" dirty="0">
+                  <a:latin typeface="Times New Roman" panose="02020603050405020304" pitchFamily="18" charset="0"/>
+                  <a:cs typeface="Times New Roman" panose="02020603050405020304" pitchFamily="18" charset="0"/>
+                </a:rPr>
+                <a:t>b</a:t>
+              </a:r>
+            </a:p>
+          </p:txBody>
+        </p:sp>
+        <p:sp>
+          <p:nvSpPr>
+            <p:cNvPr id="154" name="TextBox 153">
+              <a:extLst>
+                <a:ext uri="{FF2B5EF4-FFF2-40B4-BE49-F238E27FC236}">
+                  <a16:creationId xmlns:a16="http://schemas.microsoft.com/office/drawing/2014/main" id="{444FCB0B-C3BD-354D-A655-548E576302E6}"/>
+                </a:ext>
+              </a:extLst>
+            </p:cNvPr>
+            <p:cNvSpPr txBox="1"/>
+            <p:nvPr/>
+          </p:nvSpPr>
+          <p:spPr>
+            <a:xfrm>
+              <a:off x="9398696" y="5238700"/>
+              <a:ext cx="287258" cy="369332"/>
+            </a:xfrm>
+            <a:prstGeom prst="rect">
+              <a:avLst/>
+            </a:prstGeom>
+            <a:noFill/>
+          </p:spPr>
+          <p:txBody>
+            <a:bodyPr wrap="none" rtlCol="0">
+              <a:spAutoFit/>
+            </a:bodyPr>
+            <a:lstStyle/>
+            <a:p>
+              <a:r>
+                <a:rPr lang="en-CN" i="1" dirty="0">
+                  <a:latin typeface="Times New Roman" panose="02020603050405020304" pitchFamily="18" charset="0"/>
+                  <a:cs typeface="Times New Roman" panose="02020603050405020304" pitchFamily="18" charset="0"/>
+                </a:rPr>
+                <a:t>c</a:t>
+              </a:r>
+            </a:p>
+          </p:txBody>
+        </p:sp>
+        <p:cxnSp>
+          <p:nvCxnSpPr>
+            <p:cNvPr id="155" name="Straight Connector 154">
+              <a:extLst>
+                <a:ext uri="{FF2B5EF4-FFF2-40B4-BE49-F238E27FC236}">
+                  <a16:creationId xmlns:a16="http://schemas.microsoft.com/office/drawing/2014/main" id="{71056B59-577C-AD41-AD73-0940B8EA97E2}"/>
+                </a:ext>
+              </a:extLst>
+            </p:cNvPr>
+            <p:cNvCxnSpPr>
+              <a:cxnSpLocks/>
+              <a:stCxn id="149" idx="3"/>
+              <a:endCxn id="151" idx="7"/>
+            </p:cNvCxnSpPr>
+            <p:nvPr/>
+          </p:nvCxnSpPr>
+          <p:spPr>
+            <a:xfrm flipH="1">
+              <a:off x="9205937" y="4146310"/>
+              <a:ext cx="270614" cy="322820"/>
+            </a:xfrm>
+            <a:prstGeom prst="line">
+              <a:avLst/>
+            </a:prstGeom>
+          </p:spPr>
+          <p:style>
+            <a:lnRef idx="2">
+              <a:schemeClr val="dk1"/>
+            </a:lnRef>
+            <a:fillRef idx="0">
+              <a:schemeClr val="dk1"/>
+            </a:fillRef>
+            <a:effectRef idx="1">
+              <a:schemeClr val="dk1"/>
+            </a:effectRef>
+            <a:fontRef idx="minor">
+              <a:schemeClr val="tx1"/>
+            </a:fontRef>
+          </p:style>
+        </p:cxnSp>
+        <p:cxnSp>
+          <p:nvCxnSpPr>
+            <p:cNvPr id="156" name="Straight Connector 155">
+              <a:extLst>
+                <a:ext uri="{FF2B5EF4-FFF2-40B4-BE49-F238E27FC236}">
+                  <a16:creationId xmlns:a16="http://schemas.microsoft.com/office/drawing/2014/main" id="{5A8CE703-E3B5-2849-834A-2D2BE2D35941}"/>
+                </a:ext>
+              </a:extLst>
+            </p:cNvPr>
+            <p:cNvCxnSpPr>
+              <a:cxnSpLocks/>
+              <a:stCxn id="152" idx="0"/>
+              <a:endCxn id="161" idx="3"/>
+            </p:cNvCxnSpPr>
+            <p:nvPr/>
+          </p:nvCxnSpPr>
+          <p:spPr>
+            <a:xfrm flipV="1">
+              <a:off x="7926438" y="5564197"/>
+              <a:ext cx="227896" cy="427611"/>
+            </a:xfrm>
+            <a:prstGeom prst="line">
+              <a:avLst/>
+            </a:prstGeom>
+          </p:spPr>
+          <p:style>
+            <a:lnRef idx="2">
+              <a:schemeClr val="dk1"/>
+            </a:lnRef>
+            <a:fillRef idx="0">
+              <a:schemeClr val="dk1"/>
+            </a:fillRef>
+            <a:effectRef idx="1">
+              <a:schemeClr val="dk1"/>
+            </a:effectRef>
+            <a:fontRef idx="minor">
+              <a:schemeClr val="tx1"/>
+            </a:fontRef>
+          </p:style>
+        </p:cxnSp>
+        <p:cxnSp>
+          <p:nvCxnSpPr>
+            <p:cNvPr id="157" name="Straight Connector 156">
+              <a:extLst>
+                <a:ext uri="{FF2B5EF4-FFF2-40B4-BE49-F238E27FC236}">
+                  <a16:creationId xmlns:a16="http://schemas.microsoft.com/office/drawing/2014/main" id="{7554D4F9-5B25-ED46-B9D5-4548A4811C4D}"/>
+                </a:ext>
+              </a:extLst>
+            </p:cNvPr>
+            <p:cNvCxnSpPr>
+              <a:cxnSpLocks/>
+              <a:stCxn id="149" idx="5"/>
+              <a:endCxn id="150" idx="1"/>
+            </p:cNvCxnSpPr>
+            <p:nvPr/>
+          </p:nvCxnSpPr>
+          <p:spPr>
+            <a:xfrm>
+              <a:off x="9852470" y="4146310"/>
+              <a:ext cx="270286" cy="268882"/>
+            </a:xfrm>
+            <a:prstGeom prst="line">
+              <a:avLst/>
+            </a:prstGeom>
+          </p:spPr>
+          <p:style>
+            <a:lnRef idx="2">
+              <a:schemeClr val="dk1"/>
+            </a:lnRef>
+            <a:fillRef idx="0">
+              <a:schemeClr val="dk1"/>
+            </a:fillRef>
+            <a:effectRef idx="1">
+              <a:schemeClr val="dk1"/>
+            </a:effectRef>
+            <a:fontRef idx="minor">
+              <a:schemeClr val="tx1"/>
+            </a:fontRef>
+          </p:style>
+        </p:cxnSp>
+        <p:cxnSp>
+          <p:nvCxnSpPr>
+            <p:cNvPr id="158" name="Straight Connector 157">
+              <a:extLst>
+                <a:ext uri="{FF2B5EF4-FFF2-40B4-BE49-F238E27FC236}">
+                  <a16:creationId xmlns:a16="http://schemas.microsoft.com/office/drawing/2014/main" id="{5184D48C-8EA3-C145-A312-750BE2C424C8}"/>
+                </a:ext>
+              </a:extLst>
+            </p:cNvPr>
+            <p:cNvCxnSpPr>
+              <a:cxnSpLocks/>
+              <a:stCxn id="153" idx="0"/>
+              <a:endCxn id="161" idx="5"/>
+            </p:cNvCxnSpPr>
+            <p:nvPr/>
+          </p:nvCxnSpPr>
+          <p:spPr>
+            <a:xfrm flipH="1" flipV="1">
+              <a:off x="8530253" y="5564197"/>
+              <a:ext cx="196965" cy="450564"/>
+            </a:xfrm>
+            <a:prstGeom prst="line">
+              <a:avLst/>
+            </a:prstGeom>
+          </p:spPr>
+          <p:style>
+            <a:lnRef idx="2">
+              <a:schemeClr val="dk1"/>
+            </a:lnRef>
+            <a:fillRef idx="0">
+              <a:schemeClr val="dk1"/>
+            </a:fillRef>
+            <a:effectRef idx="1">
+              <a:schemeClr val="dk1"/>
+            </a:effectRef>
+            <a:fontRef idx="minor">
+              <a:schemeClr val="tx1"/>
+            </a:fontRef>
+          </p:style>
+        </p:cxnSp>
+        <p:cxnSp>
+          <p:nvCxnSpPr>
+            <p:cNvPr id="159" name="Straight Connector 158">
+              <a:extLst>
+                <a:ext uri="{FF2B5EF4-FFF2-40B4-BE49-F238E27FC236}">
+                  <a16:creationId xmlns:a16="http://schemas.microsoft.com/office/drawing/2014/main" id="{18FB71A4-DE9A-084D-B105-939602C76293}"/>
+                </a:ext>
+              </a:extLst>
+            </p:cNvPr>
+            <p:cNvCxnSpPr>
+              <a:cxnSpLocks/>
+              <a:stCxn id="161" idx="7"/>
+              <a:endCxn id="151" idx="3"/>
+            </p:cNvCxnSpPr>
+            <p:nvPr/>
+          </p:nvCxnSpPr>
+          <p:spPr>
+            <a:xfrm flipV="1">
+              <a:off x="8530253" y="4852567"/>
+              <a:ext cx="299765" cy="328193"/>
+            </a:xfrm>
+            <a:prstGeom prst="line">
+              <a:avLst/>
+            </a:prstGeom>
+          </p:spPr>
+          <p:style>
+            <a:lnRef idx="2">
+              <a:schemeClr val="dk1"/>
+            </a:lnRef>
+            <a:fillRef idx="0">
+              <a:schemeClr val="dk1"/>
+            </a:fillRef>
+            <a:effectRef idx="1">
+              <a:schemeClr val="dk1"/>
+            </a:effectRef>
+            <a:fontRef idx="minor">
+              <a:schemeClr val="tx1"/>
+            </a:fontRef>
+          </p:style>
+        </p:cxnSp>
+        <p:cxnSp>
+          <p:nvCxnSpPr>
+            <p:cNvPr id="160" name="Straight Connector 159">
+              <a:extLst>
+                <a:ext uri="{FF2B5EF4-FFF2-40B4-BE49-F238E27FC236}">
+                  <a16:creationId xmlns:a16="http://schemas.microsoft.com/office/drawing/2014/main" id="{695AA10B-2607-164A-AEB9-98E64F04B726}"/>
+                </a:ext>
+              </a:extLst>
+            </p:cNvPr>
+            <p:cNvCxnSpPr>
+              <a:cxnSpLocks/>
+              <a:stCxn id="154" idx="0"/>
+              <a:endCxn id="151" idx="5"/>
+            </p:cNvCxnSpPr>
+            <p:nvPr/>
+          </p:nvCxnSpPr>
+          <p:spPr>
+            <a:xfrm flipH="1" flipV="1">
+              <a:off x="9205937" y="4852567"/>
+              <a:ext cx="336388" cy="386133"/>
+            </a:xfrm>
+            <a:prstGeom prst="line">
+              <a:avLst/>
+            </a:prstGeom>
+          </p:spPr>
+          <p:style>
+            <a:lnRef idx="2">
+              <a:schemeClr val="dk1"/>
+            </a:lnRef>
+            <a:fillRef idx="0">
+              <a:schemeClr val="dk1"/>
+            </a:fillRef>
+            <a:effectRef idx="1">
+              <a:schemeClr val="dk1"/>
+            </a:effectRef>
+            <a:fontRef idx="minor">
+              <a:schemeClr val="tx1"/>
+            </a:fontRef>
+          </p:style>
+        </p:cxnSp>
+        <p:sp>
+          <p:nvSpPr>
+            <p:cNvPr id="161" name="Oval 160">
+              <a:extLst>
+                <a:ext uri="{FF2B5EF4-FFF2-40B4-BE49-F238E27FC236}">
+                  <a16:creationId xmlns:a16="http://schemas.microsoft.com/office/drawing/2014/main" id="{9FC36620-88A5-2246-8137-B7190B9B1FA9}"/>
+                </a:ext>
+              </a:extLst>
+            </p:cNvPr>
+            <p:cNvSpPr/>
+            <p:nvPr/>
+          </p:nvSpPr>
+          <p:spPr>
+            <a:xfrm>
+              <a:off x="8076479" y="5101348"/>
+              <a:ext cx="531629" cy="542261"/>
+            </a:xfrm>
+            <a:prstGeom prst="ellipse">
+              <a:avLst/>
+            </a:prstGeom>
+            <a:solidFill>
+              <a:schemeClr val="bg1">
+                <a:lumMod val="65000"/>
+              </a:schemeClr>
+            </a:solidFill>
+          </p:spPr>
+          <p:style>
+            <a:lnRef idx="2">
+              <a:schemeClr val="dk1"/>
+            </a:lnRef>
+            <a:fillRef idx="1">
+              <a:schemeClr val="lt1"/>
+            </a:fillRef>
+            <a:effectRef idx="0">
+              <a:schemeClr val="dk1"/>
+            </a:effectRef>
+            <a:fontRef idx="minor">
+              <a:schemeClr val="dk1"/>
+            </a:fontRef>
+          </p:style>
+          <p:txBody>
+            <a:bodyPr lIns="36000" tIns="36000" rIns="36000" bIns="36000" rtlCol="0" anchor="ctr" anchorCtr="1"/>
+            <a:lstStyle/>
+            <a:p>
+              <a:pPr algn="ctr"/>
+              <a:r>
+                <a:rPr lang="en-CN" i="1" dirty="0">
+                  <a:latin typeface="Times New Roman" panose="02020603050405020304" pitchFamily="18" charset="0"/>
+                  <a:cs typeface="Times New Roman" panose="02020603050405020304" pitchFamily="18" charset="0"/>
+                </a:rPr>
+                <a:t>x</a:t>
+              </a:r>
+            </a:p>
+          </p:txBody>
+        </p:sp>
+      </p:grpSp>
+      <p:cxnSp>
+        <p:nvCxnSpPr>
+          <p:cNvPr id="177" name="Straight Arrow Connector 176">
+            <a:extLst>
+              <a:ext uri="{FF2B5EF4-FFF2-40B4-BE49-F238E27FC236}">
+                <a16:creationId xmlns:a16="http://schemas.microsoft.com/office/drawing/2014/main" id="{EBE67C38-6B25-7143-8F0A-62309C93E881}"/>
+              </a:ext>
+            </a:extLst>
+          </p:cNvPr>
+          <p:cNvCxnSpPr>
+            <a:cxnSpLocks/>
+          </p:cNvCxnSpPr>
+          <p:nvPr/>
+        </p:nvCxnSpPr>
+        <p:spPr>
+          <a:xfrm flipH="1" flipV="1">
+            <a:off x="7779429" y="4126538"/>
+            <a:ext cx="529180" cy="358633"/>
+          </a:xfrm>
+          <a:prstGeom prst="straightConnector1">
+            <a:avLst/>
+          </a:prstGeom>
+          <a:ln>
+            <a:tailEnd type="triangle"/>
+          </a:ln>
+        </p:spPr>
+        <p:style>
+          <a:lnRef idx="3">
+            <a:schemeClr val="dk1"/>
+          </a:lnRef>
+          <a:fillRef idx="0">
+            <a:schemeClr val="dk1"/>
+          </a:fillRef>
+          <a:effectRef idx="2">
+            <a:schemeClr val="dk1"/>
+          </a:effectRef>
+          <a:fontRef idx="minor">
+            <a:schemeClr val="tx1"/>
+          </a:fontRef>
+        </p:style>
+      </p:cxnSp>
+    </p:spTree>
+    <p:extLst>
+      <p:ext uri="{BB962C8B-B14F-4D97-AF65-F5344CB8AC3E}">
+        <p14:creationId xmlns:p14="http://schemas.microsoft.com/office/powerpoint/2010/main" val="498755333"/>
+      </p:ext>
+    </p:extLst>
+  </p:cSld>
+  <p:clrMapOvr>
+    <a:masterClrMapping/>
+  </p:clrMapOvr>
+</p:sld>
+</file>
+
+<file path=ppt/slides/slide3.xml><?xml version="1.0" encoding="utf-8"?>
+<p:sld xmlns:a="http://schemas.openxmlformats.org/drawingml/2006/main" xmlns:r="http://schemas.openxmlformats.org/officeDocument/2006/relationships" xmlns:p="http://schemas.openxmlformats.org/presentationml/2006/main">
+  <p:cSld>
+    <p:spTree>
+      <p:nvGrpSpPr>
+        <p:cNvPr id="1" name=""/>
+        <p:cNvGrpSpPr/>
+        <p:nvPr/>
+      </p:nvGrpSpPr>
+      <p:grpSpPr>
+        <a:xfrm>
+          <a:off x="0" y="0"/>
+          <a:ext cx="0" cy="0"/>
+          <a:chOff x="0" y="0"/>
+          <a:chExt cx="0" cy="0"/>
+        </a:xfrm>
+      </p:grpSpPr>
+      <p:grpSp>
+        <p:nvGrpSpPr>
+          <p:cNvPr id="68" name="Group 67">
+            <a:extLst>
+              <a:ext uri="{FF2B5EF4-FFF2-40B4-BE49-F238E27FC236}">
+                <a16:creationId xmlns:a16="http://schemas.microsoft.com/office/drawing/2014/main" id="{89686869-8916-224C-AEAA-9377D35BC300}"/>
+              </a:ext>
+            </a:extLst>
+          </p:cNvPr>
+          <p:cNvGrpSpPr/>
+          <p:nvPr/>
+        </p:nvGrpSpPr>
+        <p:grpSpPr>
+          <a:xfrm>
+            <a:off x="4495263" y="2371061"/>
+            <a:ext cx="3130474" cy="1940143"/>
+            <a:chOff x="4495263" y="2371061"/>
+            <a:chExt cx="3130474" cy="1940143"/>
+          </a:xfrm>
+        </p:grpSpPr>
+        <p:sp>
+          <p:nvSpPr>
+            <p:cNvPr id="4" name="Oval 3">
+              <a:extLst>
+                <a:ext uri="{FF2B5EF4-FFF2-40B4-BE49-F238E27FC236}">
+                  <a16:creationId xmlns:a16="http://schemas.microsoft.com/office/drawing/2014/main" id="{7195E4E1-ACCB-104F-B55A-2FC12803335B}"/>
+                </a:ext>
+              </a:extLst>
+            </p:cNvPr>
+            <p:cNvSpPr/>
+            <p:nvPr/>
+          </p:nvSpPr>
+          <p:spPr>
+            <a:xfrm>
+              <a:off x="5667152" y="2371061"/>
+              <a:ext cx="531629" cy="542261"/>
+            </a:xfrm>
+            <a:prstGeom prst="ellipse">
+              <a:avLst/>
+            </a:prstGeom>
           </p:spPr>
           <p:style>
             <a:lnRef idx="2">
@@ -8040,7 +11275,7 @@
     </p:spTree>
     <p:extLst>
       <p:ext uri="{BB962C8B-B14F-4D97-AF65-F5344CB8AC3E}">
-        <p14:creationId xmlns:p14="http://schemas.microsoft.com/office/powerpoint/2010/main" val="498755333"/>
+        <p14:creationId xmlns:p14="http://schemas.microsoft.com/office/powerpoint/2010/main" val="2111346047"/>
       </p:ext>
     </p:extLst>
   </p:cSld>
@@ -8050,7 +11285,7 @@
 </p:sld>
 </file>
 
-<file path=ppt/slides/slide3.xml><?xml version="1.0" encoding="utf-8"?>
+<file path=ppt/slides/slide4.xml><?xml version="1.0" encoding="utf-8"?>
 <p:sld xmlns:a="http://schemas.openxmlformats.org/drawingml/2006/main" xmlns:r="http://schemas.openxmlformats.org/officeDocument/2006/relationships" xmlns:p="http://schemas.openxmlformats.org/presentationml/2006/main">
   <p:cSld>
     <p:spTree>

</xml_diff>

<commit_message>
Rewrite ch04 - delete
</commit_message>
<xml_diff>
--- a/datastruct/tree/red-black-tree/img/rbtree.pptx
+++ b/datastruct/tree/red-black-tree/img/rbtree.pptx
@@ -5,13 +5,14 @@
     <p:sldMasterId id="2147483648" r:id="rId1"/>
   </p:sldMasterIdLst>
   <p:notesMasterIdLst>
-    <p:notesMasterId r:id="rId6"/>
+    <p:notesMasterId r:id="rId7"/>
   </p:notesMasterIdLst>
   <p:sldIdLst>
     <p:sldId id="258" r:id="rId2"/>
     <p:sldId id="256" r:id="rId3"/>
     <p:sldId id="259" r:id="rId4"/>
     <p:sldId id="257" r:id="rId5"/>
+    <p:sldId id="260" r:id="rId6"/>
   </p:sldIdLst>
   <p:sldSz cx="12192000" cy="6858000"/>
   <p:notesSz cx="6858000" cy="9144000"/>
@@ -863,6 +864,98 @@
     <p:extLst>
       <p:ext uri="{BB962C8B-B14F-4D97-AF65-F5344CB8AC3E}">
         <p14:creationId xmlns:p14="http://schemas.microsoft.com/office/powerpoint/2010/main" val="2590054791"/>
+      </p:ext>
+    </p:extLst>
+  </p:cSld>
+  <p:clrMapOvr>
+    <a:masterClrMapping/>
+  </p:clrMapOvr>
+</p:notes>
+</file>
+
+<file path=ppt/notesSlides/notesSlide5.xml><?xml version="1.0" encoding="utf-8"?>
+<p:notes xmlns:a="http://schemas.openxmlformats.org/drawingml/2006/main" xmlns:r="http://schemas.openxmlformats.org/officeDocument/2006/relationships" xmlns:p="http://schemas.openxmlformats.org/presentationml/2006/main">
+  <p:cSld>
+    <p:spTree>
+      <p:nvGrpSpPr>
+        <p:cNvPr id="1" name=""/>
+        <p:cNvGrpSpPr/>
+        <p:nvPr/>
+      </p:nvGrpSpPr>
+      <p:grpSpPr>
+        <a:xfrm>
+          <a:off x="0" y="0"/>
+          <a:ext cx="0" cy="0"/>
+          <a:chOff x="0" y="0"/>
+          <a:chExt cx="0" cy="0"/>
+        </a:xfrm>
+      </p:grpSpPr>
+      <p:sp>
+        <p:nvSpPr>
+          <p:cNvPr id="2" name="Slide Image Placeholder 1"/>
+          <p:cNvSpPr>
+            <a:spLocks noGrp="1" noRot="1" noChangeAspect="1"/>
+          </p:cNvSpPr>
+          <p:nvPr>
+            <p:ph type="sldImg"/>
+          </p:nvPr>
+        </p:nvSpPr>
+        <p:spPr/>
+      </p:sp>
+      <p:sp>
+        <p:nvSpPr>
+          <p:cNvPr id="3" name="Notes Placeholder 2"/>
+          <p:cNvSpPr>
+            <a:spLocks noGrp="1"/>
+          </p:cNvSpPr>
+          <p:nvPr>
+            <p:ph type="body" idx="1"/>
+          </p:nvPr>
+        </p:nvSpPr>
+        <p:spPr/>
+        <p:txBody>
+          <a:bodyPr/>
+          <a:lstStyle/>
+          <a:p>
+            <a:r>
+              <a:rPr lang="en-CN" dirty="0"/>
+              <a:t>Delete case 3: </a:t>
+            </a:r>
+            <a:r>
+              <a:rPr lang="en-US" dirty="0"/>
+              <a:t>The sibling of the doubly-black node, and its two children are all black.</a:t>
+            </a:r>
+            <a:endParaRPr lang="en-CN" dirty="0"/>
+          </a:p>
+        </p:txBody>
+      </p:sp>
+      <p:sp>
+        <p:nvSpPr>
+          <p:cNvPr id="4" name="Slide Number Placeholder 3"/>
+          <p:cNvSpPr>
+            <a:spLocks noGrp="1"/>
+          </p:cNvSpPr>
+          <p:nvPr>
+            <p:ph type="sldNum" sz="quarter" idx="5"/>
+          </p:nvPr>
+        </p:nvSpPr>
+        <p:spPr/>
+        <p:txBody>
+          <a:bodyPr/>
+          <a:lstStyle/>
+          <a:p>
+            <a:fld id="{5A7F411E-DD35-8744-9F99-82262987EC7F}" type="slidenum">
+              <a:rPr lang="en-CN" smtClean="0"/>
+              <a:t>5</a:t>
+            </a:fld>
+            <a:endParaRPr lang="en-CN"/>
+          </a:p>
+        </p:txBody>
+      </p:sp>
+    </p:spTree>
+    <p:extLst>
+      <p:ext uri="{BB962C8B-B14F-4D97-AF65-F5344CB8AC3E}">
+        <p14:creationId xmlns:p14="http://schemas.microsoft.com/office/powerpoint/2010/main" val="603047415"/>
       </p:ext>
     </p:extLst>
   </p:cSld>
@@ -13211,6 +13304,1906 @@
 </p:sld>
 </file>
 
+<file path=ppt/slides/slide5.xml><?xml version="1.0" encoding="utf-8"?>
+<p:sld xmlns:a="http://schemas.openxmlformats.org/drawingml/2006/main" xmlns:r="http://schemas.openxmlformats.org/officeDocument/2006/relationships" xmlns:p="http://schemas.openxmlformats.org/presentationml/2006/main">
+  <p:cSld>
+    <p:spTree>
+      <p:nvGrpSpPr>
+        <p:cNvPr id="1" name=""/>
+        <p:cNvGrpSpPr/>
+        <p:nvPr/>
+      </p:nvGrpSpPr>
+      <p:grpSpPr>
+        <a:xfrm>
+          <a:off x="0" y="0"/>
+          <a:ext cx="0" cy="0"/>
+          <a:chOff x="0" y="0"/>
+          <a:chExt cx="0" cy="0"/>
+        </a:xfrm>
+      </p:grpSpPr>
+      <p:cxnSp>
+        <p:nvCxnSpPr>
+          <p:cNvPr id="67" name="Straight Arrow Connector 66">
+            <a:extLst>
+              <a:ext uri="{FF2B5EF4-FFF2-40B4-BE49-F238E27FC236}">
+                <a16:creationId xmlns:a16="http://schemas.microsoft.com/office/drawing/2014/main" id="{17FF87D7-DF6D-9B40-B439-ED233F74E7E5}"/>
+              </a:ext>
+            </a:extLst>
+          </p:cNvPr>
+          <p:cNvCxnSpPr>
+            <a:cxnSpLocks/>
+          </p:cNvCxnSpPr>
+          <p:nvPr/>
+        </p:nvCxnSpPr>
+        <p:spPr>
+          <a:xfrm>
+            <a:off x="4274742" y="1488088"/>
+            <a:ext cx="733193" cy="0"/>
+          </a:xfrm>
+          <a:prstGeom prst="straightConnector1">
+            <a:avLst/>
+          </a:prstGeom>
+          <a:ln>
+            <a:tailEnd type="triangle"/>
+          </a:ln>
+        </p:spPr>
+        <p:style>
+          <a:lnRef idx="3">
+            <a:schemeClr val="dk1"/>
+          </a:lnRef>
+          <a:fillRef idx="0">
+            <a:schemeClr val="dk1"/>
+          </a:fillRef>
+          <a:effectRef idx="2">
+            <a:schemeClr val="dk1"/>
+          </a:effectRef>
+          <a:fontRef idx="minor">
+            <a:schemeClr val="tx1"/>
+          </a:fontRef>
+        </p:style>
+      </p:cxnSp>
+      <p:cxnSp>
+        <p:nvCxnSpPr>
+          <p:cNvPr id="111" name="Straight Arrow Connector 110">
+            <a:extLst>
+              <a:ext uri="{FF2B5EF4-FFF2-40B4-BE49-F238E27FC236}">
+                <a16:creationId xmlns:a16="http://schemas.microsoft.com/office/drawing/2014/main" id="{71D1CA3A-3541-9448-8C70-15CD5B6068E1}"/>
+              </a:ext>
+            </a:extLst>
+          </p:cNvPr>
+          <p:cNvCxnSpPr>
+            <a:cxnSpLocks/>
+          </p:cNvCxnSpPr>
+          <p:nvPr/>
+        </p:nvCxnSpPr>
+        <p:spPr>
+          <a:xfrm>
+            <a:off x="4220487" y="4451609"/>
+            <a:ext cx="773485" cy="1"/>
+          </a:xfrm>
+          <a:prstGeom prst="straightConnector1">
+            <a:avLst/>
+          </a:prstGeom>
+          <a:ln>
+            <a:tailEnd type="triangle"/>
+          </a:ln>
+        </p:spPr>
+        <p:style>
+          <a:lnRef idx="3">
+            <a:schemeClr val="dk1"/>
+          </a:lnRef>
+          <a:fillRef idx="0">
+            <a:schemeClr val="dk1"/>
+          </a:fillRef>
+          <a:effectRef idx="2">
+            <a:schemeClr val="dk1"/>
+          </a:effectRef>
+          <a:fontRef idx="minor">
+            <a:schemeClr val="tx1"/>
+          </a:fontRef>
+        </p:style>
+      </p:cxnSp>
+      <p:grpSp>
+        <p:nvGrpSpPr>
+          <p:cNvPr id="27" name="Group 26">
+            <a:extLst>
+              <a:ext uri="{FF2B5EF4-FFF2-40B4-BE49-F238E27FC236}">
+                <a16:creationId xmlns:a16="http://schemas.microsoft.com/office/drawing/2014/main" id="{E6FDFCCA-189F-7146-B698-7C3A87A859B1}"/>
+              </a:ext>
+            </a:extLst>
+          </p:cNvPr>
+          <p:cNvGrpSpPr/>
+          <p:nvPr/>
+        </p:nvGrpSpPr>
+        <p:grpSpPr>
+          <a:xfrm>
+            <a:off x="775773" y="578514"/>
+            <a:ext cx="2776736" cy="2086919"/>
+            <a:chOff x="775773" y="578514"/>
+            <a:chExt cx="2776736" cy="2086919"/>
+          </a:xfrm>
+        </p:grpSpPr>
+        <p:sp>
+          <p:nvSpPr>
+            <p:cNvPr id="34" name="Oval 33">
+              <a:extLst>
+                <a:ext uri="{FF2B5EF4-FFF2-40B4-BE49-F238E27FC236}">
+                  <a16:creationId xmlns:a16="http://schemas.microsoft.com/office/drawing/2014/main" id="{9D41FAFA-11FB-4242-86B1-FBB16A82BB7B}"/>
+                </a:ext>
+              </a:extLst>
+            </p:cNvPr>
+            <p:cNvSpPr/>
+            <p:nvPr/>
+          </p:nvSpPr>
+          <p:spPr>
+            <a:xfrm>
+              <a:off x="1665363" y="578514"/>
+              <a:ext cx="531629" cy="542261"/>
+            </a:xfrm>
+            <a:prstGeom prst="ellipse">
+              <a:avLst/>
+            </a:prstGeom>
+          </p:spPr>
+          <p:style>
+            <a:lnRef idx="2">
+              <a:schemeClr val="dk1"/>
+            </a:lnRef>
+            <a:fillRef idx="1">
+              <a:schemeClr val="lt1"/>
+            </a:fillRef>
+            <a:effectRef idx="0">
+              <a:schemeClr val="dk1"/>
+            </a:effectRef>
+            <a:fontRef idx="minor">
+              <a:schemeClr val="dk1"/>
+            </a:fontRef>
+          </p:style>
+          <p:txBody>
+            <a:bodyPr lIns="36000" tIns="36000" rIns="36000" bIns="36000" rtlCol="0" anchor="ctr" anchorCtr="1"/>
+            <a:lstStyle/>
+            <a:p>
+              <a:pPr algn="ctr"/>
+              <a:r>
+                <a:rPr lang="en-CN" i="1" dirty="0">
+                  <a:latin typeface="Times New Roman" panose="02020603050405020304" pitchFamily="18" charset="0"/>
+                  <a:cs typeface="Times New Roman" panose="02020603050405020304" pitchFamily="18" charset="0"/>
+                </a:rPr>
+                <a:t>x</a:t>
+              </a:r>
+            </a:p>
+          </p:txBody>
+        </p:sp>
+        <p:sp>
+          <p:nvSpPr>
+            <p:cNvPr id="35" name="Oval 34">
+              <a:extLst>
+                <a:ext uri="{FF2B5EF4-FFF2-40B4-BE49-F238E27FC236}">
+                  <a16:creationId xmlns:a16="http://schemas.microsoft.com/office/drawing/2014/main" id="{6DBEF67F-0AB2-2A4A-8DD4-B421D05789F3}"/>
+                </a:ext>
+              </a:extLst>
+            </p:cNvPr>
+            <p:cNvSpPr/>
+            <p:nvPr/>
+          </p:nvSpPr>
+          <p:spPr>
+            <a:xfrm>
+              <a:off x="775773" y="1209378"/>
+              <a:ext cx="531629" cy="542261"/>
+            </a:xfrm>
+            <a:prstGeom prst="ellipse">
+              <a:avLst/>
+            </a:prstGeom>
+            <a:effectLst>
+              <a:glow rad="228600">
+                <a:schemeClr val="tx1">
+                  <a:lumMod val="50000"/>
+                  <a:lumOff val="50000"/>
+                  <a:alpha val="40000"/>
+                </a:schemeClr>
+              </a:glow>
+            </a:effectLst>
+          </p:spPr>
+          <p:style>
+            <a:lnRef idx="2">
+              <a:schemeClr val="dk1">
+                <a:shade val="50000"/>
+              </a:schemeClr>
+            </a:lnRef>
+            <a:fillRef idx="1">
+              <a:schemeClr val="dk1"/>
+            </a:fillRef>
+            <a:effectRef idx="0">
+              <a:schemeClr val="dk1"/>
+            </a:effectRef>
+            <a:fontRef idx="minor">
+              <a:schemeClr val="lt1"/>
+            </a:fontRef>
+          </p:style>
+          <p:txBody>
+            <a:bodyPr lIns="36000" tIns="36000" rIns="36000" bIns="36000" rtlCol="0" anchor="ctr" anchorCtr="1"/>
+            <a:lstStyle/>
+            <a:p>
+              <a:pPr algn="ctr"/>
+              <a:r>
+                <a:rPr lang="en-CN" i="1" dirty="0">
+                  <a:latin typeface="Times New Roman" panose="02020603050405020304" pitchFamily="18" charset="0"/>
+                  <a:cs typeface="Times New Roman" panose="02020603050405020304" pitchFamily="18" charset="0"/>
+                </a:rPr>
+                <a:t>a</a:t>
+              </a:r>
+            </a:p>
+          </p:txBody>
+        </p:sp>
+        <p:cxnSp>
+          <p:nvCxnSpPr>
+            <p:cNvPr id="41" name="Straight Connector 40">
+              <a:extLst>
+                <a:ext uri="{FF2B5EF4-FFF2-40B4-BE49-F238E27FC236}">
+                  <a16:creationId xmlns:a16="http://schemas.microsoft.com/office/drawing/2014/main" id="{D4418E09-8CE4-B340-8B57-57246748D8D9}"/>
+                </a:ext>
+              </a:extLst>
+            </p:cNvPr>
+            <p:cNvCxnSpPr>
+              <a:cxnSpLocks/>
+              <a:stCxn id="34" idx="3"/>
+              <a:endCxn id="35" idx="7"/>
+            </p:cNvCxnSpPr>
+            <p:nvPr/>
+          </p:nvCxnSpPr>
+          <p:spPr>
+            <a:xfrm flipH="1">
+              <a:off x="1229547" y="1041363"/>
+              <a:ext cx="513671" cy="247427"/>
+            </a:xfrm>
+            <a:prstGeom prst="line">
+              <a:avLst/>
+            </a:prstGeom>
+          </p:spPr>
+          <p:style>
+            <a:lnRef idx="2">
+              <a:schemeClr val="dk1"/>
+            </a:lnRef>
+            <a:fillRef idx="0">
+              <a:schemeClr val="dk1"/>
+            </a:fillRef>
+            <a:effectRef idx="1">
+              <a:schemeClr val="dk1"/>
+            </a:effectRef>
+            <a:fontRef idx="minor">
+              <a:schemeClr val="tx1"/>
+            </a:fontRef>
+          </p:style>
+        </p:cxnSp>
+        <p:cxnSp>
+          <p:nvCxnSpPr>
+            <p:cNvPr id="42" name="Straight Connector 41">
+              <a:extLst>
+                <a:ext uri="{FF2B5EF4-FFF2-40B4-BE49-F238E27FC236}">
+                  <a16:creationId xmlns:a16="http://schemas.microsoft.com/office/drawing/2014/main" id="{1360389F-3295-564A-A95C-547A9FDBFD84}"/>
+                </a:ext>
+              </a:extLst>
+            </p:cNvPr>
+            <p:cNvCxnSpPr>
+              <a:cxnSpLocks/>
+              <a:stCxn id="85" idx="0"/>
+              <a:endCxn id="52" idx="3"/>
+            </p:cNvCxnSpPr>
+            <p:nvPr/>
+          </p:nvCxnSpPr>
+          <p:spPr>
+            <a:xfrm flipV="1">
+              <a:off x="2413976" y="1697406"/>
+              <a:ext cx="230985" cy="425766"/>
+            </a:xfrm>
+            <a:prstGeom prst="line">
+              <a:avLst/>
+            </a:prstGeom>
+          </p:spPr>
+          <p:style>
+            <a:lnRef idx="2">
+              <a:schemeClr val="dk1"/>
+            </a:lnRef>
+            <a:fillRef idx="0">
+              <a:schemeClr val="dk1"/>
+            </a:fillRef>
+            <a:effectRef idx="1">
+              <a:schemeClr val="dk1"/>
+            </a:effectRef>
+            <a:fontRef idx="minor">
+              <a:schemeClr val="tx1"/>
+            </a:fontRef>
+          </p:style>
+        </p:cxnSp>
+        <p:cxnSp>
+          <p:nvCxnSpPr>
+            <p:cNvPr id="43" name="Straight Connector 42">
+              <a:extLst>
+                <a:ext uri="{FF2B5EF4-FFF2-40B4-BE49-F238E27FC236}">
+                  <a16:creationId xmlns:a16="http://schemas.microsoft.com/office/drawing/2014/main" id="{F17CFE58-68D1-BB41-B229-D893A48D606F}"/>
+                </a:ext>
+              </a:extLst>
+            </p:cNvPr>
+            <p:cNvCxnSpPr>
+              <a:cxnSpLocks/>
+              <a:stCxn id="34" idx="5"/>
+              <a:endCxn id="52" idx="1"/>
+            </p:cNvCxnSpPr>
+            <p:nvPr/>
+          </p:nvCxnSpPr>
+          <p:spPr>
+            <a:xfrm>
+              <a:off x="2119137" y="1041363"/>
+              <a:ext cx="525824" cy="272606"/>
+            </a:xfrm>
+            <a:prstGeom prst="line">
+              <a:avLst/>
+            </a:prstGeom>
+          </p:spPr>
+          <p:style>
+            <a:lnRef idx="2">
+              <a:schemeClr val="dk1"/>
+            </a:lnRef>
+            <a:fillRef idx="0">
+              <a:schemeClr val="dk1"/>
+            </a:fillRef>
+            <a:effectRef idx="1">
+              <a:schemeClr val="dk1"/>
+            </a:effectRef>
+            <a:fontRef idx="minor">
+              <a:schemeClr val="tx1"/>
+            </a:fontRef>
+          </p:style>
+        </p:cxnSp>
+        <p:cxnSp>
+          <p:nvCxnSpPr>
+            <p:cNvPr id="44" name="Straight Connector 43">
+              <a:extLst>
+                <a:ext uri="{FF2B5EF4-FFF2-40B4-BE49-F238E27FC236}">
+                  <a16:creationId xmlns:a16="http://schemas.microsoft.com/office/drawing/2014/main" id="{A63D039F-BC2F-B248-9B63-5C25E151FF78}"/>
+                </a:ext>
+              </a:extLst>
+            </p:cNvPr>
+            <p:cNvCxnSpPr>
+              <a:cxnSpLocks/>
+              <a:stCxn id="86" idx="0"/>
+              <a:endCxn id="52" idx="5"/>
+            </p:cNvCxnSpPr>
+            <p:nvPr/>
+          </p:nvCxnSpPr>
+          <p:spPr>
+            <a:xfrm flipH="1" flipV="1">
+              <a:off x="3020880" y="1697406"/>
+              <a:ext cx="265815" cy="425765"/>
+            </a:xfrm>
+            <a:prstGeom prst="line">
+              <a:avLst/>
+            </a:prstGeom>
+          </p:spPr>
+          <p:style>
+            <a:lnRef idx="2">
+              <a:schemeClr val="dk1"/>
+            </a:lnRef>
+            <a:fillRef idx="0">
+              <a:schemeClr val="dk1"/>
+            </a:fillRef>
+            <a:effectRef idx="1">
+              <a:schemeClr val="dk1"/>
+            </a:effectRef>
+            <a:fontRef idx="minor">
+              <a:schemeClr val="tx1"/>
+            </a:fontRef>
+          </p:style>
+        </p:cxnSp>
+        <p:sp>
+          <p:nvSpPr>
+            <p:cNvPr id="52" name="Oval 51">
+              <a:extLst>
+                <a:ext uri="{FF2B5EF4-FFF2-40B4-BE49-F238E27FC236}">
+                  <a16:creationId xmlns:a16="http://schemas.microsoft.com/office/drawing/2014/main" id="{F73AEB0F-7615-F64F-B8B1-EF9BE21609A9}"/>
+                </a:ext>
+              </a:extLst>
+            </p:cNvPr>
+            <p:cNvSpPr/>
+            <p:nvPr/>
+          </p:nvSpPr>
+          <p:spPr>
+            <a:xfrm>
+              <a:off x="2567106" y="1234557"/>
+              <a:ext cx="531629" cy="542261"/>
+            </a:xfrm>
+            <a:prstGeom prst="ellipse">
+              <a:avLst/>
+            </a:prstGeom>
+          </p:spPr>
+          <p:style>
+            <a:lnRef idx="2">
+              <a:schemeClr val="dk1">
+                <a:shade val="50000"/>
+              </a:schemeClr>
+            </a:lnRef>
+            <a:fillRef idx="1">
+              <a:schemeClr val="dk1"/>
+            </a:fillRef>
+            <a:effectRef idx="0">
+              <a:schemeClr val="dk1"/>
+            </a:effectRef>
+            <a:fontRef idx="minor">
+              <a:schemeClr val="lt1"/>
+            </a:fontRef>
+          </p:style>
+          <p:txBody>
+            <a:bodyPr lIns="36000" tIns="36000" rIns="36000" bIns="36000" rtlCol="0" anchor="ctr" anchorCtr="1"/>
+            <a:lstStyle/>
+            <a:p>
+              <a:pPr algn="ctr"/>
+              <a:r>
+                <a:rPr lang="en-CN" i="1" dirty="0">
+                  <a:latin typeface="Times New Roman" panose="02020603050405020304" pitchFamily="18" charset="0"/>
+                  <a:cs typeface="Times New Roman" panose="02020603050405020304" pitchFamily="18" charset="0"/>
+                </a:rPr>
+                <a:t>y</a:t>
+              </a:r>
+            </a:p>
+          </p:txBody>
+        </p:sp>
+        <p:sp>
+          <p:nvSpPr>
+            <p:cNvPr id="85" name="Oval 84">
+              <a:extLst>
+                <a:ext uri="{FF2B5EF4-FFF2-40B4-BE49-F238E27FC236}">
+                  <a16:creationId xmlns:a16="http://schemas.microsoft.com/office/drawing/2014/main" id="{C2D8F755-5BC9-1147-9477-2B67C9E3A5BD}"/>
+                </a:ext>
+              </a:extLst>
+            </p:cNvPr>
+            <p:cNvSpPr/>
+            <p:nvPr/>
+          </p:nvSpPr>
+          <p:spPr>
+            <a:xfrm>
+              <a:off x="2148161" y="2123172"/>
+              <a:ext cx="531629" cy="542261"/>
+            </a:xfrm>
+            <a:prstGeom prst="ellipse">
+              <a:avLst/>
+            </a:prstGeom>
+          </p:spPr>
+          <p:style>
+            <a:lnRef idx="2">
+              <a:schemeClr val="dk1">
+                <a:shade val="50000"/>
+              </a:schemeClr>
+            </a:lnRef>
+            <a:fillRef idx="1">
+              <a:schemeClr val="dk1"/>
+            </a:fillRef>
+            <a:effectRef idx="0">
+              <a:schemeClr val="dk1"/>
+            </a:effectRef>
+            <a:fontRef idx="minor">
+              <a:schemeClr val="lt1"/>
+            </a:fontRef>
+          </p:style>
+          <p:txBody>
+            <a:bodyPr lIns="36000" tIns="36000" rIns="36000" bIns="36000" rtlCol="0" anchor="ctr" anchorCtr="1"/>
+            <a:lstStyle/>
+            <a:p>
+              <a:pPr algn="ctr"/>
+              <a:r>
+                <a:rPr lang="en-CN" i="1" dirty="0">
+                  <a:latin typeface="Times New Roman" panose="02020603050405020304" pitchFamily="18" charset="0"/>
+                  <a:cs typeface="Times New Roman" panose="02020603050405020304" pitchFamily="18" charset="0"/>
+                </a:rPr>
+                <a:t>b</a:t>
+              </a:r>
+            </a:p>
+          </p:txBody>
+        </p:sp>
+        <p:sp>
+          <p:nvSpPr>
+            <p:cNvPr id="86" name="Oval 85">
+              <a:extLst>
+                <a:ext uri="{FF2B5EF4-FFF2-40B4-BE49-F238E27FC236}">
+                  <a16:creationId xmlns:a16="http://schemas.microsoft.com/office/drawing/2014/main" id="{BF6229D4-D67C-1F47-8416-F730DEB2DEA1}"/>
+                </a:ext>
+              </a:extLst>
+            </p:cNvPr>
+            <p:cNvSpPr/>
+            <p:nvPr/>
+          </p:nvSpPr>
+          <p:spPr>
+            <a:xfrm>
+              <a:off x="3020880" y="2123171"/>
+              <a:ext cx="531629" cy="542261"/>
+            </a:xfrm>
+            <a:prstGeom prst="ellipse">
+              <a:avLst/>
+            </a:prstGeom>
+          </p:spPr>
+          <p:style>
+            <a:lnRef idx="2">
+              <a:schemeClr val="dk1">
+                <a:shade val="50000"/>
+              </a:schemeClr>
+            </a:lnRef>
+            <a:fillRef idx="1">
+              <a:schemeClr val="dk1"/>
+            </a:fillRef>
+            <a:effectRef idx="0">
+              <a:schemeClr val="dk1"/>
+            </a:effectRef>
+            <a:fontRef idx="minor">
+              <a:schemeClr val="lt1"/>
+            </a:fontRef>
+          </p:style>
+          <p:txBody>
+            <a:bodyPr lIns="36000" tIns="36000" rIns="36000" bIns="36000" rtlCol="0" anchor="ctr" anchorCtr="1"/>
+            <a:lstStyle/>
+            <a:p>
+              <a:pPr algn="ctr"/>
+              <a:r>
+                <a:rPr lang="en-CN" i="1" dirty="0">
+                  <a:latin typeface="Times New Roman" panose="02020603050405020304" pitchFamily="18" charset="0"/>
+                  <a:cs typeface="Times New Roman" panose="02020603050405020304" pitchFamily="18" charset="0"/>
+                </a:rPr>
+                <a:t>c</a:t>
+              </a:r>
+            </a:p>
+          </p:txBody>
+        </p:sp>
+      </p:grpSp>
+      <p:grpSp>
+        <p:nvGrpSpPr>
+          <p:cNvPr id="114" name="Group 113">
+            <a:extLst>
+              <a:ext uri="{FF2B5EF4-FFF2-40B4-BE49-F238E27FC236}">
+                <a16:creationId xmlns:a16="http://schemas.microsoft.com/office/drawing/2014/main" id="{270797AA-7932-6C43-A535-BF4317DB933A}"/>
+              </a:ext>
+            </a:extLst>
+          </p:cNvPr>
+          <p:cNvGrpSpPr/>
+          <p:nvPr/>
+        </p:nvGrpSpPr>
+        <p:grpSpPr>
+          <a:xfrm>
+            <a:off x="5873504" y="3606387"/>
+            <a:ext cx="2322838" cy="2028252"/>
+            <a:chOff x="5462818" y="578514"/>
+            <a:chExt cx="2322838" cy="2028252"/>
+          </a:xfrm>
+        </p:grpSpPr>
+        <p:sp>
+          <p:nvSpPr>
+            <p:cNvPr id="115" name="Oval 114">
+              <a:extLst>
+                <a:ext uri="{FF2B5EF4-FFF2-40B4-BE49-F238E27FC236}">
+                  <a16:creationId xmlns:a16="http://schemas.microsoft.com/office/drawing/2014/main" id="{85D9A3A3-3F74-A341-B4A9-A7A9F23C527D}"/>
+                </a:ext>
+              </a:extLst>
+            </p:cNvPr>
+            <p:cNvSpPr/>
+            <p:nvPr/>
+          </p:nvSpPr>
+          <p:spPr>
+            <a:xfrm>
+              <a:off x="6511466" y="578514"/>
+              <a:ext cx="531629" cy="542261"/>
+            </a:xfrm>
+            <a:prstGeom prst="ellipse">
+              <a:avLst/>
+            </a:prstGeom>
+          </p:spPr>
+          <p:style>
+            <a:lnRef idx="2">
+              <a:schemeClr val="dk1">
+                <a:shade val="50000"/>
+              </a:schemeClr>
+            </a:lnRef>
+            <a:fillRef idx="1">
+              <a:schemeClr val="dk1"/>
+            </a:fillRef>
+            <a:effectRef idx="0">
+              <a:schemeClr val="dk1"/>
+            </a:effectRef>
+            <a:fontRef idx="minor">
+              <a:schemeClr val="lt1"/>
+            </a:fontRef>
+          </p:style>
+          <p:txBody>
+            <a:bodyPr lIns="36000" tIns="36000" rIns="36000" bIns="36000" rtlCol="0" anchor="ctr" anchorCtr="1"/>
+            <a:lstStyle/>
+            <a:p>
+              <a:pPr algn="ctr"/>
+              <a:r>
+                <a:rPr lang="en-CN" i="1" dirty="0">
+                  <a:latin typeface="Times New Roman" panose="02020603050405020304" pitchFamily="18" charset="0"/>
+                  <a:cs typeface="Times New Roman" panose="02020603050405020304" pitchFamily="18" charset="0"/>
+                </a:rPr>
+                <a:t>y</a:t>
+              </a:r>
+            </a:p>
+          </p:txBody>
+        </p:sp>
+        <p:sp>
+          <p:nvSpPr>
+            <p:cNvPr id="129" name="Oval 128">
+              <a:extLst>
+                <a:ext uri="{FF2B5EF4-FFF2-40B4-BE49-F238E27FC236}">
+                  <a16:creationId xmlns:a16="http://schemas.microsoft.com/office/drawing/2014/main" id="{150B8AFC-45F1-2645-BFDC-8EE037EF0F4F}"/>
+                </a:ext>
+              </a:extLst>
+            </p:cNvPr>
+            <p:cNvSpPr/>
+            <p:nvPr/>
+          </p:nvSpPr>
+          <p:spPr>
+            <a:xfrm>
+              <a:off x="5462818" y="2046472"/>
+              <a:ext cx="531629" cy="542261"/>
+            </a:xfrm>
+            <a:prstGeom prst="ellipse">
+              <a:avLst/>
+            </a:prstGeom>
+            <a:effectLst/>
+          </p:spPr>
+          <p:style>
+            <a:lnRef idx="2">
+              <a:schemeClr val="dk1">
+                <a:shade val="50000"/>
+              </a:schemeClr>
+            </a:lnRef>
+            <a:fillRef idx="1">
+              <a:schemeClr val="dk1"/>
+            </a:fillRef>
+            <a:effectRef idx="0">
+              <a:schemeClr val="dk1"/>
+            </a:effectRef>
+            <a:fontRef idx="minor">
+              <a:schemeClr val="lt1"/>
+            </a:fontRef>
+          </p:style>
+          <p:txBody>
+            <a:bodyPr lIns="36000" tIns="36000" rIns="36000" bIns="36000" rtlCol="0" anchor="ctr" anchorCtr="1"/>
+            <a:lstStyle/>
+            <a:p>
+              <a:pPr algn="ctr"/>
+              <a:r>
+                <a:rPr lang="en-CN" i="1" dirty="0">
+                  <a:latin typeface="Times New Roman" panose="02020603050405020304" pitchFamily="18" charset="0"/>
+                  <a:cs typeface="Times New Roman" panose="02020603050405020304" pitchFamily="18" charset="0"/>
+                </a:rPr>
+                <a:t>a</a:t>
+              </a:r>
+            </a:p>
+          </p:txBody>
+        </p:sp>
+        <p:cxnSp>
+          <p:nvCxnSpPr>
+            <p:cNvPr id="130" name="Straight Connector 129">
+              <a:extLst>
+                <a:ext uri="{FF2B5EF4-FFF2-40B4-BE49-F238E27FC236}">
+                  <a16:creationId xmlns:a16="http://schemas.microsoft.com/office/drawing/2014/main" id="{37EDA364-B325-3546-85F5-D221317F7499}"/>
+                </a:ext>
+              </a:extLst>
+            </p:cNvPr>
+            <p:cNvCxnSpPr>
+              <a:cxnSpLocks/>
+              <a:stCxn id="115" idx="3"/>
+              <a:endCxn id="134" idx="7"/>
+            </p:cNvCxnSpPr>
+            <p:nvPr/>
+          </p:nvCxnSpPr>
+          <p:spPr>
+            <a:xfrm flipH="1">
+              <a:off x="6351416" y="1041363"/>
+              <a:ext cx="237905" cy="326839"/>
+            </a:xfrm>
+            <a:prstGeom prst="line">
+              <a:avLst/>
+            </a:prstGeom>
+          </p:spPr>
+          <p:style>
+            <a:lnRef idx="2">
+              <a:schemeClr val="dk1"/>
+            </a:lnRef>
+            <a:fillRef idx="0">
+              <a:schemeClr val="dk1"/>
+            </a:fillRef>
+            <a:effectRef idx="1">
+              <a:schemeClr val="dk1"/>
+            </a:effectRef>
+            <a:fontRef idx="minor">
+              <a:schemeClr val="tx1"/>
+            </a:fontRef>
+          </p:style>
+        </p:cxnSp>
+        <p:cxnSp>
+          <p:nvCxnSpPr>
+            <p:cNvPr id="131" name="Straight Connector 130">
+              <a:extLst>
+                <a:ext uri="{FF2B5EF4-FFF2-40B4-BE49-F238E27FC236}">
+                  <a16:creationId xmlns:a16="http://schemas.microsoft.com/office/drawing/2014/main" id="{51725920-D2C1-2C49-B67C-99F0162643D7}"/>
+                </a:ext>
+              </a:extLst>
+            </p:cNvPr>
+            <p:cNvCxnSpPr>
+              <a:cxnSpLocks/>
+              <a:stCxn id="129" idx="0"/>
+              <a:endCxn id="134" idx="3"/>
+            </p:cNvCxnSpPr>
+            <p:nvPr/>
+          </p:nvCxnSpPr>
+          <p:spPr>
+            <a:xfrm flipV="1">
+              <a:off x="5728633" y="1751639"/>
+              <a:ext cx="246864" cy="294833"/>
+            </a:xfrm>
+            <a:prstGeom prst="line">
+              <a:avLst/>
+            </a:prstGeom>
+          </p:spPr>
+          <p:style>
+            <a:lnRef idx="2">
+              <a:schemeClr val="dk1"/>
+            </a:lnRef>
+            <a:fillRef idx="0">
+              <a:schemeClr val="dk1"/>
+            </a:fillRef>
+            <a:effectRef idx="1">
+              <a:schemeClr val="dk1"/>
+            </a:effectRef>
+            <a:fontRef idx="minor">
+              <a:schemeClr val="tx1"/>
+            </a:fontRef>
+          </p:style>
+        </p:cxnSp>
+        <p:cxnSp>
+          <p:nvCxnSpPr>
+            <p:cNvPr id="132" name="Straight Connector 131">
+              <a:extLst>
+                <a:ext uri="{FF2B5EF4-FFF2-40B4-BE49-F238E27FC236}">
+                  <a16:creationId xmlns:a16="http://schemas.microsoft.com/office/drawing/2014/main" id="{6BBEF1E5-FFB4-4441-8691-986427E6EE2D}"/>
+                </a:ext>
+              </a:extLst>
+            </p:cNvPr>
+            <p:cNvCxnSpPr>
+              <a:cxnSpLocks/>
+              <a:stCxn id="115" idx="5"/>
+              <a:endCxn id="136" idx="1"/>
+            </p:cNvCxnSpPr>
+            <p:nvPr/>
+          </p:nvCxnSpPr>
+          <p:spPr>
+            <a:xfrm>
+              <a:off x="6965240" y="1041363"/>
+              <a:ext cx="366642" cy="326839"/>
+            </a:xfrm>
+            <a:prstGeom prst="line">
+              <a:avLst/>
+            </a:prstGeom>
+          </p:spPr>
+          <p:style>
+            <a:lnRef idx="2">
+              <a:schemeClr val="dk1"/>
+            </a:lnRef>
+            <a:fillRef idx="0">
+              <a:schemeClr val="dk1"/>
+            </a:fillRef>
+            <a:effectRef idx="1">
+              <a:schemeClr val="dk1"/>
+            </a:effectRef>
+            <a:fontRef idx="minor">
+              <a:schemeClr val="tx1"/>
+            </a:fontRef>
+          </p:style>
+        </p:cxnSp>
+        <p:cxnSp>
+          <p:nvCxnSpPr>
+            <p:cNvPr id="133" name="Straight Connector 132">
+              <a:extLst>
+                <a:ext uri="{FF2B5EF4-FFF2-40B4-BE49-F238E27FC236}">
+                  <a16:creationId xmlns:a16="http://schemas.microsoft.com/office/drawing/2014/main" id="{231E0CDB-6DAA-3D40-9C58-DD797CAEAC98}"/>
+                </a:ext>
+              </a:extLst>
+            </p:cNvPr>
+            <p:cNvCxnSpPr>
+              <a:cxnSpLocks/>
+              <a:stCxn id="135" idx="0"/>
+              <a:endCxn id="134" idx="5"/>
+            </p:cNvCxnSpPr>
+            <p:nvPr/>
+          </p:nvCxnSpPr>
+          <p:spPr>
+            <a:xfrm flipH="1" flipV="1">
+              <a:off x="6351416" y="1751639"/>
+              <a:ext cx="237905" cy="312866"/>
+            </a:xfrm>
+            <a:prstGeom prst="line">
+              <a:avLst/>
+            </a:prstGeom>
+          </p:spPr>
+          <p:style>
+            <a:lnRef idx="2">
+              <a:schemeClr val="dk1"/>
+            </a:lnRef>
+            <a:fillRef idx="0">
+              <a:schemeClr val="dk1"/>
+            </a:fillRef>
+            <a:effectRef idx="1">
+              <a:schemeClr val="dk1"/>
+            </a:effectRef>
+            <a:fontRef idx="minor">
+              <a:schemeClr val="tx1"/>
+            </a:fontRef>
+          </p:style>
+        </p:cxnSp>
+        <p:sp>
+          <p:nvSpPr>
+            <p:cNvPr id="134" name="Oval 133">
+              <a:extLst>
+                <a:ext uri="{FF2B5EF4-FFF2-40B4-BE49-F238E27FC236}">
+                  <a16:creationId xmlns:a16="http://schemas.microsoft.com/office/drawing/2014/main" id="{132D9A3C-16D5-6B40-9CB8-5E4A41378589}"/>
+                </a:ext>
+              </a:extLst>
+            </p:cNvPr>
+            <p:cNvSpPr/>
+            <p:nvPr/>
+          </p:nvSpPr>
+          <p:spPr>
+            <a:xfrm>
+              <a:off x="5897642" y="1288790"/>
+              <a:ext cx="531629" cy="542261"/>
+            </a:xfrm>
+            <a:prstGeom prst="ellipse">
+              <a:avLst/>
+            </a:prstGeom>
+            <a:solidFill>
+              <a:schemeClr val="bg1">
+                <a:lumMod val="65000"/>
+              </a:schemeClr>
+            </a:solidFill>
+          </p:spPr>
+          <p:style>
+            <a:lnRef idx="2">
+              <a:schemeClr val="dk1"/>
+            </a:lnRef>
+            <a:fillRef idx="1">
+              <a:schemeClr val="lt1"/>
+            </a:fillRef>
+            <a:effectRef idx="0">
+              <a:schemeClr val="dk1"/>
+            </a:effectRef>
+            <a:fontRef idx="minor">
+              <a:schemeClr val="dk1"/>
+            </a:fontRef>
+          </p:style>
+          <p:txBody>
+            <a:bodyPr lIns="36000" tIns="36000" rIns="36000" bIns="36000" rtlCol="0" anchor="ctr" anchorCtr="1"/>
+            <a:lstStyle/>
+            <a:p>
+              <a:pPr algn="ctr"/>
+              <a:r>
+                <a:rPr lang="en-CN" i="1" dirty="0">
+                  <a:latin typeface="Times New Roman" panose="02020603050405020304" pitchFamily="18" charset="0"/>
+                  <a:cs typeface="Times New Roman" panose="02020603050405020304" pitchFamily="18" charset="0"/>
+                </a:rPr>
+                <a:t>x</a:t>
+              </a:r>
+            </a:p>
+          </p:txBody>
+        </p:sp>
+        <p:sp>
+          <p:nvSpPr>
+            <p:cNvPr id="135" name="Oval 134">
+              <a:extLst>
+                <a:ext uri="{FF2B5EF4-FFF2-40B4-BE49-F238E27FC236}">
+                  <a16:creationId xmlns:a16="http://schemas.microsoft.com/office/drawing/2014/main" id="{A02954FB-1F99-6841-ADF3-879E06717502}"/>
+                </a:ext>
+              </a:extLst>
+            </p:cNvPr>
+            <p:cNvSpPr/>
+            <p:nvPr/>
+          </p:nvSpPr>
+          <p:spPr>
+            <a:xfrm>
+              <a:off x="6323506" y="2064505"/>
+              <a:ext cx="531629" cy="542261"/>
+            </a:xfrm>
+            <a:prstGeom prst="ellipse">
+              <a:avLst/>
+            </a:prstGeom>
+          </p:spPr>
+          <p:style>
+            <a:lnRef idx="2">
+              <a:schemeClr val="dk1">
+                <a:shade val="50000"/>
+              </a:schemeClr>
+            </a:lnRef>
+            <a:fillRef idx="1">
+              <a:schemeClr val="dk1"/>
+            </a:fillRef>
+            <a:effectRef idx="0">
+              <a:schemeClr val="dk1"/>
+            </a:effectRef>
+            <a:fontRef idx="minor">
+              <a:schemeClr val="lt1"/>
+            </a:fontRef>
+          </p:style>
+          <p:txBody>
+            <a:bodyPr lIns="36000" tIns="36000" rIns="36000" bIns="36000" rtlCol="0" anchor="ctr" anchorCtr="1"/>
+            <a:lstStyle/>
+            <a:p>
+              <a:pPr algn="ctr"/>
+              <a:r>
+                <a:rPr lang="en-CN" i="1" dirty="0">
+                  <a:latin typeface="Times New Roman" panose="02020603050405020304" pitchFamily="18" charset="0"/>
+                  <a:cs typeface="Times New Roman" panose="02020603050405020304" pitchFamily="18" charset="0"/>
+                </a:rPr>
+                <a:t>b</a:t>
+              </a:r>
+            </a:p>
+          </p:txBody>
+        </p:sp>
+        <p:sp>
+          <p:nvSpPr>
+            <p:cNvPr id="136" name="Oval 135">
+              <a:extLst>
+                <a:ext uri="{FF2B5EF4-FFF2-40B4-BE49-F238E27FC236}">
+                  <a16:creationId xmlns:a16="http://schemas.microsoft.com/office/drawing/2014/main" id="{CD2C77E9-68B0-524F-AEFE-9FF974CA9DDB}"/>
+                </a:ext>
+              </a:extLst>
+            </p:cNvPr>
+            <p:cNvSpPr/>
+            <p:nvPr/>
+          </p:nvSpPr>
+          <p:spPr>
+            <a:xfrm>
+              <a:off x="7254027" y="1288790"/>
+              <a:ext cx="531629" cy="542261"/>
+            </a:xfrm>
+            <a:prstGeom prst="ellipse">
+              <a:avLst/>
+            </a:prstGeom>
+            <a:effectLst/>
+          </p:spPr>
+          <p:style>
+            <a:lnRef idx="2">
+              <a:schemeClr val="dk1">
+                <a:shade val="50000"/>
+              </a:schemeClr>
+            </a:lnRef>
+            <a:fillRef idx="1">
+              <a:schemeClr val="dk1"/>
+            </a:fillRef>
+            <a:effectRef idx="0">
+              <a:schemeClr val="dk1"/>
+            </a:effectRef>
+            <a:fontRef idx="minor">
+              <a:schemeClr val="lt1"/>
+            </a:fontRef>
+          </p:style>
+          <p:txBody>
+            <a:bodyPr lIns="36000" tIns="36000" rIns="36000" bIns="36000" rtlCol="0" anchor="ctr" anchorCtr="1"/>
+            <a:lstStyle/>
+            <a:p>
+              <a:pPr algn="ctr"/>
+              <a:r>
+                <a:rPr lang="en-CN" i="1" dirty="0">
+                  <a:latin typeface="Times New Roman" panose="02020603050405020304" pitchFamily="18" charset="0"/>
+                  <a:cs typeface="Times New Roman" panose="02020603050405020304" pitchFamily="18" charset="0"/>
+                </a:rPr>
+                <a:t>c</a:t>
+              </a:r>
+            </a:p>
+          </p:txBody>
+        </p:sp>
+      </p:grpSp>
+      <p:grpSp>
+        <p:nvGrpSpPr>
+          <p:cNvPr id="45" name="Group 44">
+            <a:extLst>
+              <a:ext uri="{FF2B5EF4-FFF2-40B4-BE49-F238E27FC236}">
+                <a16:creationId xmlns:a16="http://schemas.microsoft.com/office/drawing/2014/main" id="{BDBB999F-1E82-2B48-9DBF-1FE371707857}"/>
+              </a:ext>
+            </a:extLst>
+          </p:cNvPr>
+          <p:cNvGrpSpPr/>
+          <p:nvPr/>
+        </p:nvGrpSpPr>
+        <p:grpSpPr>
+          <a:xfrm>
+            <a:off x="5691559" y="574703"/>
+            <a:ext cx="2776736" cy="2086919"/>
+            <a:chOff x="775773" y="578514"/>
+            <a:chExt cx="2776736" cy="2086919"/>
+          </a:xfrm>
+        </p:grpSpPr>
+        <p:sp>
+          <p:nvSpPr>
+            <p:cNvPr id="46" name="Oval 45">
+              <a:extLst>
+                <a:ext uri="{FF2B5EF4-FFF2-40B4-BE49-F238E27FC236}">
+                  <a16:creationId xmlns:a16="http://schemas.microsoft.com/office/drawing/2014/main" id="{83BDC855-EF3B-7248-8B01-A82142617858}"/>
+                </a:ext>
+              </a:extLst>
+            </p:cNvPr>
+            <p:cNvSpPr/>
+            <p:nvPr/>
+          </p:nvSpPr>
+          <p:spPr>
+            <a:xfrm>
+              <a:off x="1665363" y="578514"/>
+              <a:ext cx="531629" cy="542261"/>
+            </a:xfrm>
+            <a:prstGeom prst="ellipse">
+              <a:avLst/>
+            </a:prstGeom>
+          </p:spPr>
+          <p:style>
+            <a:lnRef idx="2">
+              <a:schemeClr val="dk1">
+                <a:shade val="50000"/>
+              </a:schemeClr>
+            </a:lnRef>
+            <a:fillRef idx="1">
+              <a:schemeClr val="dk1"/>
+            </a:fillRef>
+            <a:effectRef idx="0">
+              <a:schemeClr val="dk1"/>
+            </a:effectRef>
+            <a:fontRef idx="minor">
+              <a:schemeClr val="lt1"/>
+            </a:fontRef>
+          </p:style>
+          <p:txBody>
+            <a:bodyPr lIns="36000" tIns="36000" rIns="36000" bIns="36000" rtlCol="0" anchor="ctr" anchorCtr="1"/>
+            <a:lstStyle/>
+            <a:p>
+              <a:pPr algn="ctr"/>
+              <a:r>
+                <a:rPr lang="en-CN" i="1" dirty="0">
+                  <a:latin typeface="Times New Roman" panose="02020603050405020304" pitchFamily="18" charset="0"/>
+                  <a:cs typeface="Times New Roman" panose="02020603050405020304" pitchFamily="18" charset="0"/>
+                </a:rPr>
+                <a:t>x</a:t>
+              </a:r>
+            </a:p>
+          </p:txBody>
+        </p:sp>
+        <p:sp>
+          <p:nvSpPr>
+            <p:cNvPr id="47" name="Oval 46">
+              <a:extLst>
+                <a:ext uri="{FF2B5EF4-FFF2-40B4-BE49-F238E27FC236}">
+                  <a16:creationId xmlns:a16="http://schemas.microsoft.com/office/drawing/2014/main" id="{44ACF2F3-F9D8-F24B-98CB-502BF1C70595}"/>
+                </a:ext>
+              </a:extLst>
+            </p:cNvPr>
+            <p:cNvSpPr/>
+            <p:nvPr/>
+          </p:nvSpPr>
+          <p:spPr>
+            <a:xfrm>
+              <a:off x="775773" y="1209378"/>
+              <a:ext cx="531629" cy="542261"/>
+            </a:xfrm>
+            <a:prstGeom prst="ellipse">
+              <a:avLst/>
+            </a:prstGeom>
+            <a:effectLst/>
+          </p:spPr>
+          <p:style>
+            <a:lnRef idx="2">
+              <a:schemeClr val="dk1">
+                <a:shade val="50000"/>
+              </a:schemeClr>
+            </a:lnRef>
+            <a:fillRef idx="1">
+              <a:schemeClr val="dk1"/>
+            </a:fillRef>
+            <a:effectRef idx="0">
+              <a:schemeClr val="dk1"/>
+            </a:effectRef>
+            <a:fontRef idx="minor">
+              <a:schemeClr val="lt1"/>
+            </a:fontRef>
+          </p:style>
+          <p:txBody>
+            <a:bodyPr lIns="36000" tIns="36000" rIns="36000" bIns="36000" rtlCol="0" anchor="ctr" anchorCtr="1"/>
+            <a:lstStyle/>
+            <a:p>
+              <a:pPr algn="ctr"/>
+              <a:r>
+                <a:rPr lang="en-CN" i="1" dirty="0">
+                  <a:latin typeface="Times New Roman" panose="02020603050405020304" pitchFamily="18" charset="0"/>
+                  <a:cs typeface="Times New Roman" panose="02020603050405020304" pitchFamily="18" charset="0"/>
+                </a:rPr>
+                <a:t>a</a:t>
+              </a:r>
+            </a:p>
+          </p:txBody>
+        </p:sp>
+        <p:cxnSp>
+          <p:nvCxnSpPr>
+            <p:cNvPr id="48" name="Straight Connector 47">
+              <a:extLst>
+                <a:ext uri="{FF2B5EF4-FFF2-40B4-BE49-F238E27FC236}">
+                  <a16:creationId xmlns:a16="http://schemas.microsoft.com/office/drawing/2014/main" id="{6310A104-6A72-BE4E-81BF-3B004723FE52}"/>
+                </a:ext>
+              </a:extLst>
+            </p:cNvPr>
+            <p:cNvCxnSpPr>
+              <a:cxnSpLocks/>
+              <a:stCxn id="46" idx="3"/>
+              <a:endCxn id="47" idx="7"/>
+            </p:cNvCxnSpPr>
+            <p:nvPr/>
+          </p:nvCxnSpPr>
+          <p:spPr>
+            <a:xfrm flipH="1">
+              <a:off x="1229547" y="1041363"/>
+              <a:ext cx="513671" cy="247427"/>
+            </a:xfrm>
+            <a:prstGeom prst="line">
+              <a:avLst/>
+            </a:prstGeom>
+          </p:spPr>
+          <p:style>
+            <a:lnRef idx="2">
+              <a:schemeClr val="dk1"/>
+            </a:lnRef>
+            <a:fillRef idx="0">
+              <a:schemeClr val="dk1"/>
+            </a:fillRef>
+            <a:effectRef idx="1">
+              <a:schemeClr val="dk1"/>
+            </a:effectRef>
+            <a:fontRef idx="minor">
+              <a:schemeClr val="tx1"/>
+            </a:fontRef>
+          </p:style>
+        </p:cxnSp>
+        <p:cxnSp>
+          <p:nvCxnSpPr>
+            <p:cNvPr id="49" name="Straight Connector 48">
+              <a:extLst>
+                <a:ext uri="{FF2B5EF4-FFF2-40B4-BE49-F238E27FC236}">
+                  <a16:creationId xmlns:a16="http://schemas.microsoft.com/office/drawing/2014/main" id="{4FE0E8A8-2138-E94A-BC11-83514E020AF6}"/>
+                </a:ext>
+              </a:extLst>
+            </p:cNvPr>
+            <p:cNvCxnSpPr>
+              <a:cxnSpLocks/>
+              <a:stCxn id="55" idx="0"/>
+              <a:endCxn id="54" idx="3"/>
+            </p:cNvCxnSpPr>
+            <p:nvPr/>
+          </p:nvCxnSpPr>
+          <p:spPr>
+            <a:xfrm flipV="1">
+              <a:off x="2413976" y="1697406"/>
+              <a:ext cx="230985" cy="425766"/>
+            </a:xfrm>
+            <a:prstGeom prst="line">
+              <a:avLst/>
+            </a:prstGeom>
+          </p:spPr>
+          <p:style>
+            <a:lnRef idx="2">
+              <a:schemeClr val="dk1"/>
+            </a:lnRef>
+            <a:fillRef idx="0">
+              <a:schemeClr val="dk1"/>
+            </a:fillRef>
+            <a:effectRef idx="1">
+              <a:schemeClr val="dk1"/>
+            </a:effectRef>
+            <a:fontRef idx="minor">
+              <a:schemeClr val="tx1"/>
+            </a:fontRef>
+          </p:style>
+        </p:cxnSp>
+        <p:cxnSp>
+          <p:nvCxnSpPr>
+            <p:cNvPr id="50" name="Straight Connector 49">
+              <a:extLst>
+                <a:ext uri="{FF2B5EF4-FFF2-40B4-BE49-F238E27FC236}">
+                  <a16:creationId xmlns:a16="http://schemas.microsoft.com/office/drawing/2014/main" id="{D7E5ECCF-A903-1B49-822A-DD14002F353D}"/>
+                </a:ext>
+              </a:extLst>
+            </p:cNvPr>
+            <p:cNvCxnSpPr>
+              <a:cxnSpLocks/>
+              <a:stCxn id="46" idx="5"/>
+              <a:endCxn id="54" idx="1"/>
+            </p:cNvCxnSpPr>
+            <p:nvPr/>
+          </p:nvCxnSpPr>
+          <p:spPr>
+            <a:xfrm>
+              <a:off x="2119137" y="1041363"/>
+              <a:ext cx="525824" cy="272606"/>
+            </a:xfrm>
+            <a:prstGeom prst="line">
+              <a:avLst/>
+            </a:prstGeom>
+          </p:spPr>
+          <p:style>
+            <a:lnRef idx="2">
+              <a:schemeClr val="dk1"/>
+            </a:lnRef>
+            <a:fillRef idx="0">
+              <a:schemeClr val="dk1"/>
+            </a:fillRef>
+            <a:effectRef idx="1">
+              <a:schemeClr val="dk1"/>
+            </a:effectRef>
+            <a:fontRef idx="minor">
+              <a:schemeClr val="tx1"/>
+            </a:fontRef>
+          </p:style>
+        </p:cxnSp>
+        <p:cxnSp>
+          <p:nvCxnSpPr>
+            <p:cNvPr id="51" name="Straight Connector 50">
+              <a:extLst>
+                <a:ext uri="{FF2B5EF4-FFF2-40B4-BE49-F238E27FC236}">
+                  <a16:creationId xmlns:a16="http://schemas.microsoft.com/office/drawing/2014/main" id="{BDF622BD-3E46-C346-948D-6B95D83C1B3F}"/>
+                </a:ext>
+              </a:extLst>
+            </p:cNvPr>
+            <p:cNvCxnSpPr>
+              <a:cxnSpLocks/>
+              <a:stCxn id="56" idx="0"/>
+              <a:endCxn id="54" idx="5"/>
+            </p:cNvCxnSpPr>
+            <p:nvPr/>
+          </p:nvCxnSpPr>
+          <p:spPr>
+            <a:xfrm flipH="1" flipV="1">
+              <a:off x="3020880" y="1697406"/>
+              <a:ext cx="265815" cy="425765"/>
+            </a:xfrm>
+            <a:prstGeom prst="line">
+              <a:avLst/>
+            </a:prstGeom>
+          </p:spPr>
+          <p:style>
+            <a:lnRef idx="2">
+              <a:schemeClr val="dk1"/>
+            </a:lnRef>
+            <a:fillRef idx="0">
+              <a:schemeClr val="dk1"/>
+            </a:fillRef>
+            <a:effectRef idx="1">
+              <a:schemeClr val="dk1"/>
+            </a:effectRef>
+            <a:fontRef idx="minor">
+              <a:schemeClr val="tx1"/>
+            </a:fontRef>
+          </p:style>
+        </p:cxnSp>
+        <p:sp>
+          <p:nvSpPr>
+            <p:cNvPr id="54" name="Oval 53">
+              <a:extLst>
+                <a:ext uri="{FF2B5EF4-FFF2-40B4-BE49-F238E27FC236}">
+                  <a16:creationId xmlns:a16="http://schemas.microsoft.com/office/drawing/2014/main" id="{9801B546-4189-9A4E-B368-8B5A440C81BC}"/>
+                </a:ext>
+              </a:extLst>
+            </p:cNvPr>
+            <p:cNvSpPr/>
+            <p:nvPr/>
+          </p:nvSpPr>
+          <p:spPr>
+            <a:xfrm>
+              <a:off x="2567106" y="1234557"/>
+              <a:ext cx="531629" cy="542261"/>
+            </a:xfrm>
+            <a:prstGeom prst="ellipse">
+              <a:avLst/>
+            </a:prstGeom>
+            <a:solidFill>
+              <a:schemeClr val="bg1">
+                <a:lumMod val="65000"/>
+              </a:schemeClr>
+            </a:solidFill>
+          </p:spPr>
+          <p:style>
+            <a:lnRef idx="2">
+              <a:schemeClr val="dk1"/>
+            </a:lnRef>
+            <a:fillRef idx="1">
+              <a:schemeClr val="lt1"/>
+            </a:fillRef>
+            <a:effectRef idx="0">
+              <a:schemeClr val="dk1"/>
+            </a:effectRef>
+            <a:fontRef idx="minor">
+              <a:schemeClr val="dk1"/>
+            </a:fontRef>
+          </p:style>
+          <p:txBody>
+            <a:bodyPr lIns="36000" tIns="36000" rIns="36000" bIns="36000" rtlCol="0" anchor="ctr" anchorCtr="1"/>
+            <a:lstStyle/>
+            <a:p>
+              <a:pPr algn="ctr"/>
+              <a:r>
+                <a:rPr lang="en-CN" i="1" dirty="0">
+                  <a:latin typeface="Times New Roman" panose="02020603050405020304" pitchFamily="18" charset="0"/>
+                  <a:cs typeface="Times New Roman" panose="02020603050405020304" pitchFamily="18" charset="0"/>
+                </a:rPr>
+                <a:t>y</a:t>
+              </a:r>
+            </a:p>
+          </p:txBody>
+        </p:sp>
+        <p:sp>
+          <p:nvSpPr>
+            <p:cNvPr id="55" name="Oval 54">
+              <a:extLst>
+                <a:ext uri="{FF2B5EF4-FFF2-40B4-BE49-F238E27FC236}">
+                  <a16:creationId xmlns:a16="http://schemas.microsoft.com/office/drawing/2014/main" id="{BE17EA3B-B493-4A4B-B4D0-4EB2C342F316}"/>
+                </a:ext>
+              </a:extLst>
+            </p:cNvPr>
+            <p:cNvSpPr/>
+            <p:nvPr/>
+          </p:nvSpPr>
+          <p:spPr>
+            <a:xfrm>
+              <a:off x="2148161" y="2123172"/>
+              <a:ext cx="531629" cy="542261"/>
+            </a:xfrm>
+            <a:prstGeom prst="ellipse">
+              <a:avLst/>
+            </a:prstGeom>
+          </p:spPr>
+          <p:style>
+            <a:lnRef idx="2">
+              <a:schemeClr val="dk1">
+                <a:shade val="50000"/>
+              </a:schemeClr>
+            </a:lnRef>
+            <a:fillRef idx="1">
+              <a:schemeClr val="dk1"/>
+            </a:fillRef>
+            <a:effectRef idx="0">
+              <a:schemeClr val="dk1"/>
+            </a:effectRef>
+            <a:fontRef idx="minor">
+              <a:schemeClr val="lt1"/>
+            </a:fontRef>
+          </p:style>
+          <p:txBody>
+            <a:bodyPr lIns="36000" tIns="36000" rIns="36000" bIns="36000" rtlCol="0" anchor="ctr" anchorCtr="1"/>
+            <a:lstStyle/>
+            <a:p>
+              <a:pPr algn="ctr"/>
+              <a:r>
+                <a:rPr lang="en-CN" i="1" dirty="0">
+                  <a:latin typeface="Times New Roman" panose="02020603050405020304" pitchFamily="18" charset="0"/>
+                  <a:cs typeface="Times New Roman" panose="02020603050405020304" pitchFamily="18" charset="0"/>
+                </a:rPr>
+                <a:t>b</a:t>
+              </a:r>
+            </a:p>
+          </p:txBody>
+        </p:sp>
+        <p:sp>
+          <p:nvSpPr>
+            <p:cNvPr id="56" name="Oval 55">
+              <a:extLst>
+                <a:ext uri="{FF2B5EF4-FFF2-40B4-BE49-F238E27FC236}">
+                  <a16:creationId xmlns:a16="http://schemas.microsoft.com/office/drawing/2014/main" id="{B8D431F4-5195-4C4D-A1A5-F702624FC5B9}"/>
+                </a:ext>
+              </a:extLst>
+            </p:cNvPr>
+            <p:cNvSpPr/>
+            <p:nvPr/>
+          </p:nvSpPr>
+          <p:spPr>
+            <a:xfrm>
+              <a:off x="3020880" y="2123171"/>
+              <a:ext cx="531629" cy="542261"/>
+            </a:xfrm>
+            <a:prstGeom prst="ellipse">
+              <a:avLst/>
+            </a:prstGeom>
+          </p:spPr>
+          <p:style>
+            <a:lnRef idx="2">
+              <a:schemeClr val="dk1">
+                <a:shade val="50000"/>
+              </a:schemeClr>
+            </a:lnRef>
+            <a:fillRef idx="1">
+              <a:schemeClr val="dk1"/>
+            </a:fillRef>
+            <a:effectRef idx="0">
+              <a:schemeClr val="dk1"/>
+            </a:effectRef>
+            <a:fontRef idx="minor">
+              <a:schemeClr val="lt1"/>
+            </a:fontRef>
+          </p:style>
+          <p:txBody>
+            <a:bodyPr lIns="36000" tIns="36000" rIns="36000" bIns="36000" rtlCol="0" anchor="ctr" anchorCtr="1"/>
+            <a:lstStyle/>
+            <a:p>
+              <a:pPr algn="ctr"/>
+              <a:r>
+                <a:rPr lang="en-CN" i="1" dirty="0">
+                  <a:latin typeface="Times New Roman" panose="02020603050405020304" pitchFamily="18" charset="0"/>
+                  <a:cs typeface="Times New Roman" panose="02020603050405020304" pitchFamily="18" charset="0"/>
+                </a:rPr>
+                <a:t>c</a:t>
+              </a:r>
+            </a:p>
+          </p:txBody>
+        </p:sp>
+      </p:grpSp>
+      <p:grpSp>
+        <p:nvGrpSpPr>
+          <p:cNvPr id="57" name="Group 56">
+            <a:extLst>
+              <a:ext uri="{FF2B5EF4-FFF2-40B4-BE49-F238E27FC236}">
+                <a16:creationId xmlns:a16="http://schemas.microsoft.com/office/drawing/2014/main" id="{6931AB73-E167-8C4D-A279-9280F6922CD1}"/>
+              </a:ext>
+            </a:extLst>
+          </p:cNvPr>
+          <p:cNvGrpSpPr/>
+          <p:nvPr/>
+        </p:nvGrpSpPr>
+        <p:grpSpPr>
+          <a:xfrm>
+            <a:off x="1207815" y="3608237"/>
+            <a:ext cx="2322838" cy="2028252"/>
+            <a:chOff x="5462818" y="578514"/>
+            <a:chExt cx="2322838" cy="2028252"/>
+          </a:xfrm>
+        </p:grpSpPr>
+        <p:sp>
+          <p:nvSpPr>
+            <p:cNvPr id="58" name="Oval 57">
+              <a:extLst>
+                <a:ext uri="{FF2B5EF4-FFF2-40B4-BE49-F238E27FC236}">
+                  <a16:creationId xmlns:a16="http://schemas.microsoft.com/office/drawing/2014/main" id="{A3FD6F10-A282-6A4D-A505-9A466CF38DAF}"/>
+                </a:ext>
+              </a:extLst>
+            </p:cNvPr>
+            <p:cNvSpPr/>
+            <p:nvPr/>
+          </p:nvSpPr>
+          <p:spPr>
+            <a:xfrm>
+              <a:off x="6511466" y="578514"/>
+              <a:ext cx="531629" cy="542261"/>
+            </a:xfrm>
+            <a:prstGeom prst="ellipse">
+              <a:avLst/>
+            </a:prstGeom>
+          </p:spPr>
+          <p:style>
+            <a:lnRef idx="2">
+              <a:schemeClr val="dk1"/>
+            </a:lnRef>
+            <a:fillRef idx="1">
+              <a:schemeClr val="lt1"/>
+            </a:fillRef>
+            <a:effectRef idx="0">
+              <a:schemeClr val="dk1"/>
+            </a:effectRef>
+            <a:fontRef idx="minor">
+              <a:schemeClr val="dk1"/>
+            </a:fontRef>
+          </p:style>
+          <p:txBody>
+            <a:bodyPr lIns="36000" tIns="36000" rIns="36000" bIns="36000" rtlCol="0" anchor="ctr" anchorCtr="1"/>
+            <a:lstStyle/>
+            <a:p>
+              <a:pPr algn="ctr"/>
+              <a:r>
+                <a:rPr lang="en-CN" i="1" dirty="0">
+                  <a:latin typeface="Times New Roman" panose="02020603050405020304" pitchFamily="18" charset="0"/>
+                  <a:cs typeface="Times New Roman" panose="02020603050405020304" pitchFamily="18" charset="0"/>
+                </a:rPr>
+                <a:t>y</a:t>
+              </a:r>
+            </a:p>
+          </p:txBody>
+        </p:sp>
+        <p:sp>
+          <p:nvSpPr>
+            <p:cNvPr id="59" name="Oval 58">
+              <a:extLst>
+                <a:ext uri="{FF2B5EF4-FFF2-40B4-BE49-F238E27FC236}">
+                  <a16:creationId xmlns:a16="http://schemas.microsoft.com/office/drawing/2014/main" id="{B8B4EE68-E182-0448-B59A-A11C8F711B13}"/>
+                </a:ext>
+              </a:extLst>
+            </p:cNvPr>
+            <p:cNvSpPr/>
+            <p:nvPr/>
+          </p:nvSpPr>
+          <p:spPr>
+            <a:xfrm>
+              <a:off x="5462818" y="2046472"/>
+              <a:ext cx="531629" cy="542261"/>
+            </a:xfrm>
+            <a:prstGeom prst="ellipse">
+              <a:avLst/>
+            </a:prstGeom>
+            <a:effectLst/>
+          </p:spPr>
+          <p:style>
+            <a:lnRef idx="2">
+              <a:schemeClr val="dk1">
+                <a:shade val="50000"/>
+              </a:schemeClr>
+            </a:lnRef>
+            <a:fillRef idx="1">
+              <a:schemeClr val="dk1"/>
+            </a:fillRef>
+            <a:effectRef idx="0">
+              <a:schemeClr val="dk1"/>
+            </a:effectRef>
+            <a:fontRef idx="minor">
+              <a:schemeClr val="lt1"/>
+            </a:fontRef>
+          </p:style>
+          <p:txBody>
+            <a:bodyPr lIns="36000" tIns="36000" rIns="36000" bIns="36000" rtlCol="0" anchor="ctr" anchorCtr="1"/>
+            <a:lstStyle/>
+            <a:p>
+              <a:pPr algn="ctr"/>
+              <a:r>
+                <a:rPr lang="en-CN" i="1" dirty="0">
+                  <a:latin typeface="Times New Roman" panose="02020603050405020304" pitchFamily="18" charset="0"/>
+                  <a:cs typeface="Times New Roman" panose="02020603050405020304" pitchFamily="18" charset="0"/>
+                </a:rPr>
+                <a:t>a</a:t>
+              </a:r>
+            </a:p>
+          </p:txBody>
+        </p:sp>
+        <p:cxnSp>
+          <p:nvCxnSpPr>
+            <p:cNvPr id="60" name="Straight Connector 59">
+              <a:extLst>
+                <a:ext uri="{FF2B5EF4-FFF2-40B4-BE49-F238E27FC236}">
+                  <a16:creationId xmlns:a16="http://schemas.microsoft.com/office/drawing/2014/main" id="{9A8350E4-AEC2-C94E-806C-C6FC2B812F08}"/>
+                </a:ext>
+              </a:extLst>
+            </p:cNvPr>
+            <p:cNvCxnSpPr>
+              <a:cxnSpLocks/>
+              <a:stCxn id="58" idx="3"/>
+              <a:endCxn id="64" idx="7"/>
+            </p:cNvCxnSpPr>
+            <p:nvPr/>
+          </p:nvCxnSpPr>
+          <p:spPr>
+            <a:xfrm flipH="1">
+              <a:off x="6351416" y="1041363"/>
+              <a:ext cx="237905" cy="326839"/>
+            </a:xfrm>
+            <a:prstGeom prst="line">
+              <a:avLst/>
+            </a:prstGeom>
+          </p:spPr>
+          <p:style>
+            <a:lnRef idx="2">
+              <a:schemeClr val="dk1"/>
+            </a:lnRef>
+            <a:fillRef idx="0">
+              <a:schemeClr val="dk1"/>
+            </a:fillRef>
+            <a:effectRef idx="1">
+              <a:schemeClr val="dk1"/>
+            </a:effectRef>
+            <a:fontRef idx="minor">
+              <a:schemeClr val="tx1"/>
+            </a:fontRef>
+          </p:style>
+        </p:cxnSp>
+        <p:cxnSp>
+          <p:nvCxnSpPr>
+            <p:cNvPr id="61" name="Straight Connector 60">
+              <a:extLst>
+                <a:ext uri="{FF2B5EF4-FFF2-40B4-BE49-F238E27FC236}">
+                  <a16:creationId xmlns:a16="http://schemas.microsoft.com/office/drawing/2014/main" id="{BF9C1203-4185-5147-AF63-A68CB1C90952}"/>
+                </a:ext>
+              </a:extLst>
+            </p:cNvPr>
+            <p:cNvCxnSpPr>
+              <a:cxnSpLocks/>
+              <a:stCxn id="59" idx="0"/>
+              <a:endCxn id="64" idx="3"/>
+            </p:cNvCxnSpPr>
+            <p:nvPr/>
+          </p:nvCxnSpPr>
+          <p:spPr>
+            <a:xfrm flipV="1">
+              <a:off x="5728633" y="1751639"/>
+              <a:ext cx="246864" cy="294833"/>
+            </a:xfrm>
+            <a:prstGeom prst="line">
+              <a:avLst/>
+            </a:prstGeom>
+          </p:spPr>
+          <p:style>
+            <a:lnRef idx="2">
+              <a:schemeClr val="dk1"/>
+            </a:lnRef>
+            <a:fillRef idx="0">
+              <a:schemeClr val="dk1"/>
+            </a:fillRef>
+            <a:effectRef idx="1">
+              <a:schemeClr val="dk1"/>
+            </a:effectRef>
+            <a:fontRef idx="minor">
+              <a:schemeClr val="tx1"/>
+            </a:fontRef>
+          </p:style>
+        </p:cxnSp>
+        <p:cxnSp>
+          <p:nvCxnSpPr>
+            <p:cNvPr id="62" name="Straight Connector 61">
+              <a:extLst>
+                <a:ext uri="{FF2B5EF4-FFF2-40B4-BE49-F238E27FC236}">
+                  <a16:creationId xmlns:a16="http://schemas.microsoft.com/office/drawing/2014/main" id="{6AB5E710-091A-694C-813C-081DD8E0D6DF}"/>
+                </a:ext>
+              </a:extLst>
+            </p:cNvPr>
+            <p:cNvCxnSpPr>
+              <a:cxnSpLocks/>
+              <a:stCxn id="58" idx="5"/>
+              <a:endCxn id="66" idx="1"/>
+            </p:cNvCxnSpPr>
+            <p:nvPr/>
+          </p:nvCxnSpPr>
+          <p:spPr>
+            <a:xfrm>
+              <a:off x="6965240" y="1041363"/>
+              <a:ext cx="366642" cy="326839"/>
+            </a:xfrm>
+            <a:prstGeom prst="line">
+              <a:avLst/>
+            </a:prstGeom>
+          </p:spPr>
+          <p:style>
+            <a:lnRef idx="2">
+              <a:schemeClr val="dk1"/>
+            </a:lnRef>
+            <a:fillRef idx="0">
+              <a:schemeClr val="dk1"/>
+            </a:fillRef>
+            <a:effectRef idx="1">
+              <a:schemeClr val="dk1"/>
+            </a:effectRef>
+            <a:fontRef idx="minor">
+              <a:schemeClr val="tx1"/>
+            </a:fontRef>
+          </p:style>
+        </p:cxnSp>
+        <p:cxnSp>
+          <p:nvCxnSpPr>
+            <p:cNvPr id="63" name="Straight Connector 62">
+              <a:extLst>
+                <a:ext uri="{FF2B5EF4-FFF2-40B4-BE49-F238E27FC236}">
+                  <a16:creationId xmlns:a16="http://schemas.microsoft.com/office/drawing/2014/main" id="{E90D361A-7874-3940-BD0B-8F0F42165789}"/>
+                </a:ext>
+              </a:extLst>
+            </p:cNvPr>
+            <p:cNvCxnSpPr>
+              <a:cxnSpLocks/>
+              <a:stCxn id="65" idx="0"/>
+              <a:endCxn id="64" idx="5"/>
+            </p:cNvCxnSpPr>
+            <p:nvPr/>
+          </p:nvCxnSpPr>
+          <p:spPr>
+            <a:xfrm flipH="1" flipV="1">
+              <a:off x="6351416" y="1751639"/>
+              <a:ext cx="237905" cy="312866"/>
+            </a:xfrm>
+            <a:prstGeom prst="line">
+              <a:avLst/>
+            </a:prstGeom>
+          </p:spPr>
+          <p:style>
+            <a:lnRef idx="2">
+              <a:schemeClr val="dk1"/>
+            </a:lnRef>
+            <a:fillRef idx="0">
+              <a:schemeClr val="dk1"/>
+            </a:fillRef>
+            <a:effectRef idx="1">
+              <a:schemeClr val="dk1"/>
+            </a:effectRef>
+            <a:fontRef idx="minor">
+              <a:schemeClr val="tx1"/>
+            </a:fontRef>
+          </p:style>
+        </p:cxnSp>
+        <p:sp>
+          <p:nvSpPr>
+            <p:cNvPr id="64" name="Oval 63">
+              <a:extLst>
+                <a:ext uri="{FF2B5EF4-FFF2-40B4-BE49-F238E27FC236}">
+                  <a16:creationId xmlns:a16="http://schemas.microsoft.com/office/drawing/2014/main" id="{094C8ACC-FBC8-5C40-90AB-E5BE143B1464}"/>
+                </a:ext>
+              </a:extLst>
+            </p:cNvPr>
+            <p:cNvSpPr/>
+            <p:nvPr/>
+          </p:nvSpPr>
+          <p:spPr>
+            <a:xfrm>
+              <a:off x="5897642" y="1288790"/>
+              <a:ext cx="531629" cy="542261"/>
+            </a:xfrm>
+            <a:prstGeom prst="ellipse">
+              <a:avLst/>
+            </a:prstGeom>
+          </p:spPr>
+          <p:style>
+            <a:lnRef idx="2">
+              <a:schemeClr val="dk1">
+                <a:shade val="50000"/>
+              </a:schemeClr>
+            </a:lnRef>
+            <a:fillRef idx="1">
+              <a:schemeClr val="dk1"/>
+            </a:fillRef>
+            <a:effectRef idx="0">
+              <a:schemeClr val="dk1"/>
+            </a:effectRef>
+            <a:fontRef idx="minor">
+              <a:schemeClr val="lt1"/>
+            </a:fontRef>
+          </p:style>
+          <p:txBody>
+            <a:bodyPr lIns="36000" tIns="36000" rIns="36000" bIns="36000" rtlCol="0" anchor="ctr" anchorCtr="1"/>
+            <a:lstStyle/>
+            <a:p>
+              <a:pPr algn="ctr"/>
+              <a:r>
+                <a:rPr lang="en-CN" i="1" dirty="0">
+                  <a:latin typeface="Times New Roman" panose="02020603050405020304" pitchFamily="18" charset="0"/>
+                  <a:cs typeface="Times New Roman" panose="02020603050405020304" pitchFamily="18" charset="0"/>
+                </a:rPr>
+                <a:t>x</a:t>
+              </a:r>
+            </a:p>
+          </p:txBody>
+        </p:sp>
+        <p:sp>
+          <p:nvSpPr>
+            <p:cNvPr id="65" name="Oval 64">
+              <a:extLst>
+                <a:ext uri="{FF2B5EF4-FFF2-40B4-BE49-F238E27FC236}">
+                  <a16:creationId xmlns:a16="http://schemas.microsoft.com/office/drawing/2014/main" id="{ACC3183B-4682-5148-AF2D-E92C51D76E09}"/>
+                </a:ext>
+              </a:extLst>
+            </p:cNvPr>
+            <p:cNvSpPr/>
+            <p:nvPr/>
+          </p:nvSpPr>
+          <p:spPr>
+            <a:xfrm>
+              <a:off x="6323506" y="2064505"/>
+              <a:ext cx="531629" cy="542261"/>
+            </a:xfrm>
+            <a:prstGeom prst="ellipse">
+              <a:avLst/>
+            </a:prstGeom>
+          </p:spPr>
+          <p:style>
+            <a:lnRef idx="2">
+              <a:schemeClr val="dk1">
+                <a:shade val="50000"/>
+              </a:schemeClr>
+            </a:lnRef>
+            <a:fillRef idx="1">
+              <a:schemeClr val="dk1"/>
+            </a:fillRef>
+            <a:effectRef idx="0">
+              <a:schemeClr val="dk1"/>
+            </a:effectRef>
+            <a:fontRef idx="minor">
+              <a:schemeClr val="lt1"/>
+            </a:fontRef>
+          </p:style>
+          <p:txBody>
+            <a:bodyPr lIns="36000" tIns="36000" rIns="36000" bIns="36000" rtlCol="0" anchor="ctr" anchorCtr="1"/>
+            <a:lstStyle/>
+            <a:p>
+              <a:pPr algn="ctr"/>
+              <a:r>
+                <a:rPr lang="en-CN" i="1" dirty="0">
+                  <a:latin typeface="Times New Roman" panose="02020603050405020304" pitchFamily="18" charset="0"/>
+                  <a:cs typeface="Times New Roman" panose="02020603050405020304" pitchFamily="18" charset="0"/>
+                </a:rPr>
+                <a:t>b</a:t>
+              </a:r>
+            </a:p>
+          </p:txBody>
+        </p:sp>
+        <p:sp>
+          <p:nvSpPr>
+            <p:cNvPr id="66" name="Oval 65">
+              <a:extLst>
+                <a:ext uri="{FF2B5EF4-FFF2-40B4-BE49-F238E27FC236}">
+                  <a16:creationId xmlns:a16="http://schemas.microsoft.com/office/drawing/2014/main" id="{53EB7D7C-257B-5A4F-B09B-D7293330F01B}"/>
+                </a:ext>
+              </a:extLst>
+            </p:cNvPr>
+            <p:cNvSpPr/>
+            <p:nvPr/>
+          </p:nvSpPr>
+          <p:spPr>
+            <a:xfrm>
+              <a:off x="7254027" y="1288790"/>
+              <a:ext cx="531629" cy="542261"/>
+            </a:xfrm>
+            <a:prstGeom prst="ellipse">
+              <a:avLst/>
+            </a:prstGeom>
+            <a:effectLst>
+              <a:glow rad="228600">
+                <a:schemeClr val="tx1">
+                  <a:lumMod val="50000"/>
+                  <a:lumOff val="50000"/>
+                  <a:alpha val="40000"/>
+                </a:schemeClr>
+              </a:glow>
+            </a:effectLst>
+          </p:spPr>
+          <p:style>
+            <a:lnRef idx="2">
+              <a:schemeClr val="dk1">
+                <a:shade val="50000"/>
+              </a:schemeClr>
+            </a:lnRef>
+            <a:fillRef idx="1">
+              <a:schemeClr val="dk1"/>
+            </a:fillRef>
+            <a:effectRef idx="0">
+              <a:schemeClr val="dk1"/>
+            </a:effectRef>
+            <a:fontRef idx="minor">
+              <a:schemeClr val="lt1"/>
+            </a:fontRef>
+          </p:style>
+          <p:txBody>
+            <a:bodyPr lIns="36000" tIns="36000" rIns="36000" bIns="36000" rtlCol="0" anchor="ctr" anchorCtr="1"/>
+            <a:lstStyle/>
+            <a:p>
+              <a:pPr algn="ctr"/>
+              <a:r>
+                <a:rPr lang="en-CN" i="1" dirty="0">
+                  <a:latin typeface="Times New Roman" panose="02020603050405020304" pitchFamily="18" charset="0"/>
+                  <a:cs typeface="Times New Roman" panose="02020603050405020304" pitchFamily="18" charset="0"/>
+                </a:rPr>
+                <a:t>c</a:t>
+              </a:r>
+            </a:p>
+          </p:txBody>
+        </p:sp>
+      </p:grpSp>
+    </p:spTree>
+    <p:extLst>
+      <p:ext uri="{BB962C8B-B14F-4D97-AF65-F5344CB8AC3E}">
+        <p14:creationId xmlns:p14="http://schemas.microsoft.com/office/powerpoint/2010/main" val="1997121349"/>
+      </p:ext>
+    </p:extLst>
+  </p:cSld>
+  <p:clrMapOvr>
+    <a:masterClrMapping/>
+  </p:clrMapOvr>
+</p:sld>
+</file>
+
 <file path=ppt/theme/theme1.xml><?xml version="1.0" encoding="utf-8"?>
 <a:theme xmlns:a="http://schemas.openxmlformats.org/drawingml/2006/main" name="Office Theme">
   <a:themeElements>

</xml_diff>